<commit_message>
Update Presentazione and Grafici
</commit_message>
<xml_diff>
--- a/Presentazione COMSOL.pptx
+++ b/Presentazione COMSOL.pptx
@@ -10,9 +10,10 @@
     <p:sldId id="263" r:id="rId4"/>
     <p:sldId id="258" r:id="rId5"/>
     <p:sldId id="259" r:id="rId6"/>
-    <p:sldId id="260" r:id="rId7"/>
-    <p:sldId id="261" r:id="rId8"/>
-    <p:sldId id="256" r:id="rId9"/>
+    <p:sldId id="266" r:id="rId7"/>
+    <p:sldId id="260" r:id="rId8"/>
+    <p:sldId id="261" r:id="rId9"/>
+    <p:sldId id="256" r:id="rId10"/>
   </p:sldIdLst>
   <p:sldSz cx="12192000" cy="6858000"/>
   <p:notesSz cx="6858000" cy="9144000"/>
@@ -266,7 +267,7 @@
           <a:p>
             <a:fld id="{3654AF55-DA74-4F8E-B7CA-625C9D81A063}" type="datetimeFigureOut">
               <a:rPr lang="it-IT" smtClean="0"/>
-              <a:t>21/05/2020</a:t>
+              <a:t>22/05/2020</a:t>
             </a:fld>
             <a:endParaRPr lang="it-IT"/>
           </a:p>
@@ -464,7 +465,7 @@
           <a:p>
             <a:fld id="{3654AF55-DA74-4F8E-B7CA-625C9D81A063}" type="datetimeFigureOut">
               <a:rPr lang="it-IT" smtClean="0"/>
-              <a:t>21/05/2020</a:t>
+              <a:t>22/05/2020</a:t>
             </a:fld>
             <a:endParaRPr lang="it-IT"/>
           </a:p>
@@ -672,7 +673,7 @@
           <a:p>
             <a:fld id="{3654AF55-DA74-4F8E-B7CA-625C9D81A063}" type="datetimeFigureOut">
               <a:rPr lang="it-IT" smtClean="0"/>
-              <a:t>21/05/2020</a:t>
+              <a:t>22/05/2020</a:t>
             </a:fld>
             <a:endParaRPr lang="it-IT"/>
           </a:p>
@@ -870,7 +871,7 @@
           <a:p>
             <a:fld id="{3654AF55-DA74-4F8E-B7CA-625C9D81A063}" type="datetimeFigureOut">
               <a:rPr lang="it-IT" smtClean="0"/>
-              <a:t>21/05/2020</a:t>
+              <a:t>22/05/2020</a:t>
             </a:fld>
             <a:endParaRPr lang="it-IT"/>
           </a:p>
@@ -1145,7 +1146,7 @@
           <a:p>
             <a:fld id="{3654AF55-DA74-4F8E-B7CA-625C9D81A063}" type="datetimeFigureOut">
               <a:rPr lang="it-IT" smtClean="0"/>
-              <a:t>21/05/2020</a:t>
+              <a:t>22/05/2020</a:t>
             </a:fld>
             <a:endParaRPr lang="it-IT"/>
           </a:p>
@@ -1410,7 +1411,7 @@
           <a:p>
             <a:fld id="{3654AF55-DA74-4F8E-B7CA-625C9D81A063}" type="datetimeFigureOut">
               <a:rPr lang="it-IT" smtClean="0"/>
-              <a:t>21/05/2020</a:t>
+              <a:t>22/05/2020</a:t>
             </a:fld>
             <a:endParaRPr lang="it-IT"/>
           </a:p>
@@ -1822,7 +1823,7 @@
           <a:p>
             <a:fld id="{3654AF55-DA74-4F8E-B7CA-625C9D81A063}" type="datetimeFigureOut">
               <a:rPr lang="it-IT" smtClean="0"/>
-              <a:t>21/05/2020</a:t>
+              <a:t>22/05/2020</a:t>
             </a:fld>
             <a:endParaRPr lang="it-IT"/>
           </a:p>
@@ -1963,7 +1964,7 @@
           <a:p>
             <a:fld id="{3654AF55-DA74-4F8E-B7CA-625C9D81A063}" type="datetimeFigureOut">
               <a:rPr lang="it-IT" smtClean="0"/>
-              <a:t>21/05/2020</a:t>
+              <a:t>22/05/2020</a:t>
             </a:fld>
             <a:endParaRPr lang="it-IT"/>
           </a:p>
@@ -2076,7 +2077,7 @@
           <a:p>
             <a:fld id="{3654AF55-DA74-4F8E-B7CA-625C9D81A063}" type="datetimeFigureOut">
               <a:rPr lang="it-IT" smtClean="0"/>
-              <a:t>21/05/2020</a:t>
+              <a:t>22/05/2020</a:t>
             </a:fld>
             <a:endParaRPr lang="it-IT"/>
           </a:p>
@@ -2387,7 +2388,7 @@
           <a:p>
             <a:fld id="{3654AF55-DA74-4F8E-B7CA-625C9D81A063}" type="datetimeFigureOut">
               <a:rPr lang="it-IT" smtClean="0"/>
-              <a:t>21/05/2020</a:t>
+              <a:t>22/05/2020</a:t>
             </a:fld>
             <a:endParaRPr lang="it-IT"/>
           </a:p>
@@ -2675,7 +2676,7 @@
           <a:p>
             <a:fld id="{3654AF55-DA74-4F8E-B7CA-625C9D81A063}" type="datetimeFigureOut">
               <a:rPr lang="it-IT" smtClean="0"/>
-              <a:t>21/05/2020</a:t>
+              <a:t>22/05/2020</a:t>
             </a:fld>
             <a:endParaRPr lang="it-IT"/>
           </a:p>
@@ -2916,7 +2917,7 @@
           <a:p>
             <a:fld id="{3654AF55-DA74-4F8E-B7CA-625C9D81A063}" type="datetimeFigureOut">
               <a:rPr lang="it-IT" smtClean="0"/>
-              <a:t>21/05/2020</a:t>
+              <a:t>22/05/2020</a:t>
             </a:fld>
             <a:endParaRPr lang="it-IT"/>
           </a:p>
@@ -4120,14 +4121,14 @@
         </p:blipFill>
         <p:spPr>
           <a:xfrm>
-            <a:off x="1485296" y="95048"/>
-            <a:ext cx="4334480" cy="3400158"/>
+            <a:off x="-1" y="1696069"/>
+            <a:ext cx="8795103" cy="4673600"/>
           </a:xfrm>
         </p:spPr>
       </p:pic>
       <p:pic>
         <p:nvPicPr>
-          <p:cNvPr id="8" name="Segnaposto contenuto 7" descr="Immagine che contiene mappa&#10;&#10;Descrizione generata automaticamente">
+          <p:cNvPr id="8" name="Segnaposto contenuto 7">
             <a:extLst>
               <a:ext uri="{FF2B5EF4-FFF2-40B4-BE49-F238E27FC236}">
                 <a16:creationId xmlns:a16="http://schemas.microsoft.com/office/drawing/2014/main" id="{24A2864D-007A-4855-9783-1AA8550AB9AD}"/>
@@ -4149,88 +4150,277 @@
               </a:ext>
             </a:extLst>
           </a:blip>
-          <a:stretch>
-            <a:fillRect/>
-          </a:stretch>
+          <a:srcRect/>
+          <a:stretch/>
         </p:blipFill>
         <p:spPr>
           <a:xfrm>
-            <a:off x="6372226" y="1795127"/>
-            <a:ext cx="5181600" cy="3968885"/>
+            <a:off x="8795102" y="2647766"/>
+            <a:ext cx="3184995" cy="2770206"/>
           </a:xfrm>
         </p:spPr>
       </p:pic>
-      <p:pic>
-        <p:nvPicPr>
-          <p:cNvPr id="12" name="Immagine 11">
-            <a:extLst>
-              <a:ext uri="{FF2B5EF4-FFF2-40B4-BE49-F238E27FC236}">
-                <a16:creationId xmlns:a16="http://schemas.microsoft.com/office/drawing/2014/main" id="{71617238-8D8E-4247-8DA8-F54A22A856AE}"/>
-              </a:ext>
-            </a:extLst>
-          </p:cNvPr>
-          <p:cNvPicPr>
-            <a:picLocks noChangeAspect="1"/>
-          </p:cNvPicPr>
-          <p:nvPr/>
-        </p:nvPicPr>
-        <p:blipFill>
-          <a:blip r:embed="rId4">
-            <a:extLst>
-              <a:ext uri="{28A0092B-C50C-407E-A947-70E740481C1C}">
-                <a14:useLocalDpi xmlns:a14="http://schemas.microsoft.com/office/drawing/2010/main" val="0"/>
-              </a:ext>
-            </a:extLst>
-          </a:blip>
-          <a:stretch>
-            <a:fillRect/>
-          </a:stretch>
-        </p:blipFill>
-        <p:spPr>
-          <a:xfrm>
-            <a:off x="1532928" y="3495206"/>
-            <a:ext cx="4286848" cy="3362794"/>
-          </a:xfrm>
-          <a:prstGeom prst="rect">
-            <a:avLst/>
-          </a:prstGeom>
-        </p:spPr>
-      </p:pic>
-      <p:sp>
-        <p:nvSpPr>
-          <p:cNvPr id="5" name="CasellaDiTesto 4">
-            <a:extLst>
-              <a:ext uri="{FF2B5EF4-FFF2-40B4-BE49-F238E27FC236}">
-                <a16:creationId xmlns:a16="http://schemas.microsoft.com/office/drawing/2014/main" id="{1F8217A0-199C-47CD-A970-3292BADB9690}"/>
-              </a:ext>
-            </a:extLst>
-          </p:cNvPr>
-          <p:cNvSpPr txBox="1"/>
-          <p:nvPr/>
-        </p:nvSpPr>
-        <p:spPr>
-          <a:xfrm>
-            <a:off x="7000875" y="1257300"/>
-            <a:ext cx="2238375" cy="369332"/>
-          </a:xfrm>
-          <a:prstGeom prst="rect">
-            <a:avLst/>
-          </a:prstGeom>
-          <a:noFill/>
-        </p:spPr>
-        <p:txBody>
-          <a:bodyPr wrap="square" rtlCol="0">
-            <a:spAutoFit/>
-          </a:bodyPr>
-          <a:lstStyle/>
-          <a:p>
-            <a:r>
-              <a:rPr lang="it-IT" dirty="0"/>
-              <a:t>Top Gate sconnesso</a:t>
-            </a:r>
-          </a:p>
-        </p:txBody>
-      </p:sp>
+      <mc:AlternateContent xmlns:mc="http://schemas.openxmlformats.org/markup-compatibility/2006">
+        <mc:Choice xmlns:a14="http://schemas.microsoft.com/office/drawing/2010/main" Requires="a14">
+          <p:sp>
+            <p:nvSpPr>
+              <p:cNvPr id="5" name="CasellaDiTesto 4">
+                <a:extLst>
+                  <a:ext uri="{FF2B5EF4-FFF2-40B4-BE49-F238E27FC236}">
+                    <a16:creationId xmlns:a16="http://schemas.microsoft.com/office/drawing/2014/main" id="{1F8217A0-199C-47CD-A970-3292BADB9690}"/>
+                  </a:ext>
+                </a:extLst>
+              </p:cNvPr>
+              <p:cNvSpPr txBox="1"/>
+              <p:nvPr/>
+            </p:nvSpPr>
+            <p:spPr>
+              <a:xfrm>
+                <a:off x="186743" y="126409"/>
+                <a:ext cx="11818513" cy="1649682"/>
+              </a:xfrm>
+              <a:prstGeom prst="rect">
+                <a:avLst/>
+              </a:prstGeom>
+              <a:noFill/>
+            </p:spPr>
+            <p:txBody>
+              <a:bodyPr wrap="square" rtlCol="0">
+                <a:spAutoFit/>
+              </a:bodyPr>
+              <a:lstStyle/>
+              <a:p>
+                <a:r>
+                  <a:rPr lang="en-US" sz="3200" dirty="0"/>
+                  <a:t>Transfer characteristic for the FET with 10 mV applied bias voltage </a:t>
+                </a:r>
+                <a14:m>
+                  <m:oMath xmlns:m="http://schemas.openxmlformats.org/officeDocument/2006/math">
+                    <m:sSub>
+                      <m:sSubPr>
+                        <m:ctrlPr>
+                          <a:rPr lang="en-US" sz="3200" i="1">
+                            <a:latin typeface="Cambria Math" panose="02040503050406030204" pitchFamily="18" charset="0"/>
+                          </a:rPr>
+                        </m:ctrlPr>
+                      </m:sSubPr>
+                      <m:e>
+                        <m:r>
+                          <a:rPr lang="it-IT" sz="3200" i="1">
+                            <a:latin typeface="Cambria Math" panose="02040503050406030204" pitchFamily="18" charset="0"/>
+                          </a:rPr>
+                          <m:t>𝑉</m:t>
+                        </m:r>
+                      </m:e>
+                      <m:sub>
+                        <m:r>
+                          <a:rPr lang="it-IT" sz="3200" b="0" i="1" smtClean="0">
+                            <a:latin typeface="Cambria Math" panose="02040503050406030204" pitchFamily="18" charset="0"/>
+                          </a:rPr>
+                          <m:t>𝑑𝑠</m:t>
+                        </m:r>
+                      </m:sub>
+                    </m:sSub>
+                  </m:oMath>
+                </a14:m>
+                <a:r>
+                  <a:rPr lang="en-US" sz="3200" dirty="0"/>
+                  <a:t>. </a:t>
+                </a:r>
+                <a:r>
+                  <a:rPr lang="en-US" sz="3200" dirty="0" err="1"/>
+                  <a:t>Backgate</a:t>
+                </a:r>
+                <a:r>
+                  <a:rPr lang="en-US" sz="3200" dirty="0"/>
+                  <a:t> voltage </a:t>
+                </a:r>
+                <a14:m>
+                  <m:oMath xmlns:m="http://schemas.openxmlformats.org/officeDocument/2006/math">
+                    <m:sSub>
+                      <m:sSubPr>
+                        <m:ctrlPr>
+                          <a:rPr lang="en-US" sz="3200" i="1">
+                            <a:latin typeface="Cambria Math" panose="02040503050406030204" pitchFamily="18" charset="0"/>
+                          </a:rPr>
+                        </m:ctrlPr>
+                      </m:sSubPr>
+                      <m:e>
+                        <m:r>
+                          <a:rPr lang="it-IT" sz="3200" i="1">
+                            <a:latin typeface="Cambria Math" panose="02040503050406030204" pitchFamily="18" charset="0"/>
+                          </a:rPr>
+                          <m:t>𝑉</m:t>
+                        </m:r>
+                      </m:e>
+                      <m:sub>
+                        <m:r>
+                          <a:rPr lang="it-IT" sz="3200" i="1">
+                            <a:latin typeface="Cambria Math" panose="02040503050406030204" pitchFamily="18" charset="0"/>
+                          </a:rPr>
+                          <m:t>𝑏𝑔</m:t>
+                        </m:r>
+                      </m:sub>
+                    </m:sSub>
+                  </m:oMath>
+                </a14:m>
+                <a:r>
+                  <a:rPr lang="en-US" sz="3200" dirty="0"/>
+                  <a:t> is applied to the substrate and the top gate is disconnected. </a:t>
+                </a:r>
+                <a14:m>
+                  <m:oMath xmlns:m="http://schemas.openxmlformats.org/officeDocument/2006/math">
+                    <m:sSub>
+                      <m:sSubPr>
+                        <m:ctrlPr>
+                          <a:rPr lang="en-US" sz="3200" i="1">
+                            <a:latin typeface="Cambria Math" panose="02040503050406030204" pitchFamily="18" charset="0"/>
+                          </a:rPr>
+                        </m:ctrlPr>
+                      </m:sSubPr>
+                      <m:e>
+                        <m:r>
+                          <a:rPr lang="it-IT" sz="3200" b="0" i="1" smtClean="0">
+                            <a:latin typeface="Cambria Math" panose="02040503050406030204" pitchFamily="18" charset="0"/>
+                          </a:rPr>
+                          <m:t>𝐼</m:t>
+                        </m:r>
+                      </m:e>
+                      <m:sub>
+                        <m:r>
+                          <a:rPr lang="it-IT" sz="3200" b="0" i="1" smtClean="0">
+                            <a:latin typeface="Cambria Math" panose="02040503050406030204" pitchFamily="18" charset="0"/>
+                          </a:rPr>
+                          <m:t>𝑑𝑠</m:t>
+                        </m:r>
+                      </m:sub>
+                    </m:sSub>
+                    <m:r>
+                      <a:rPr lang="it-IT" sz="3200" b="0" i="1" smtClean="0">
+                        <a:latin typeface="Cambria Math" panose="02040503050406030204" pitchFamily="18" charset="0"/>
+                      </a:rPr>
+                      <m:t>−</m:t>
+                    </m:r>
+                    <m:r>
+                      <a:rPr lang="en-US" sz="3200" i="1">
+                        <a:latin typeface="Cambria Math" panose="02040503050406030204" pitchFamily="18" charset="0"/>
+                      </a:rPr>
+                      <m:t> </m:t>
+                    </m:r>
+                    <m:sSub>
+                      <m:sSubPr>
+                        <m:ctrlPr>
+                          <a:rPr lang="en-US" sz="3200" i="1">
+                            <a:latin typeface="Cambria Math" panose="02040503050406030204" pitchFamily="18" charset="0"/>
+                          </a:rPr>
+                        </m:ctrlPr>
+                      </m:sSubPr>
+                      <m:e>
+                        <m:r>
+                          <a:rPr lang="it-IT" sz="3200" b="0" i="1" smtClean="0">
+                            <a:latin typeface="Cambria Math" panose="02040503050406030204" pitchFamily="18" charset="0"/>
+                          </a:rPr>
+                          <m:t>𝑉</m:t>
+                        </m:r>
+                      </m:e>
+                      <m:sub>
+                        <m:r>
+                          <a:rPr lang="it-IT" sz="3200" b="0" i="1" smtClean="0">
+                            <a:latin typeface="Cambria Math" panose="02040503050406030204" pitchFamily="18" charset="0"/>
+                          </a:rPr>
+                          <m:t>𝑑𝑠</m:t>
+                        </m:r>
+                      </m:sub>
+                    </m:sSub>
+                  </m:oMath>
+                </a14:m>
+                <a:r>
+                  <a:rPr lang="en-US" sz="3200" dirty="0"/>
+                  <a:t> curve acquired for </a:t>
+                </a:r>
+                <a14:m>
+                  <m:oMath xmlns:m="http://schemas.openxmlformats.org/officeDocument/2006/math">
+                    <m:sSub>
+                      <m:sSubPr>
+                        <m:ctrlPr>
+                          <a:rPr lang="en-US" sz="3200" i="1">
+                            <a:latin typeface="Cambria Math" panose="02040503050406030204" pitchFamily="18" charset="0"/>
+                          </a:rPr>
+                        </m:ctrlPr>
+                      </m:sSubPr>
+                      <m:e>
+                        <m:r>
+                          <a:rPr lang="it-IT" sz="3200" b="0" i="1" smtClean="0">
+                            <a:latin typeface="Cambria Math" panose="02040503050406030204" pitchFamily="18" charset="0"/>
+                          </a:rPr>
+                          <m:t>𝑉</m:t>
+                        </m:r>
+                      </m:e>
+                      <m:sub>
+                        <m:r>
+                          <a:rPr lang="it-IT" sz="3200" b="0" i="1" smtClean="0">
+                            <a:latin typeface="Cambria Math" panose="02040503050406030204" pitchFamily="18" charset="0"/>
+                          </a:rPr>
+                          <m:t>𝑏𝑔</m:t>
+                        </m:r>
+                      </m:sub>
+                    </m:sSub>
+                  </m:oMath>
+                </a14:m>
+                <a:r>
+                  <a:rPr lang="en-US" sz="3200" dirty="0"/>
+                  <a:t> values of 0, 1 and 5 V.</a:t>
+                </a:r>
+                <a:endParaRPr lang="it-IT" sz="3200" dirty="0"/>
+              </a:p>
+            </p:txBody>
+          </p:sp>
+        </mc:Choice>
+        <mc:Fallback>
+          <p:sp>
+            <p:nvSpPr>
+              <p:cNvPr id="5" name="CasellaDiTesto 4">
+                <a:extLst>
+                  <a:ext uri="{FF2B5EF4-FFF2-40B4-BE49-F238E27FC236}">
+                    <a16:creationId xmlns:a16="http://schemas.microsoft.com/office/drawing/2014/main" id="{1F8217A0-199C-47CD-A970-3292BADB9690}"/>
+                  </a:ext>
+                </a:extLst>
+              </p:cNvPr>
+              <p:cNvSpPr txBox="1">
+                <a:spLocks noRot="1" noChangeAspect="1" noMove="1" noResize="1" noEditPoints="1" noAdjustHandles="1" noChangeArrowheads="1" noChangeShapeType="1" noTextEdit="1"/>
+              </p:cNvSpPr>
+              <p:nvPr/>
+            </p:nvSpPr>
+            <p:spPr>
+              <a:xfrm>
+                <a:off x="186743" y="126409"/>
+                <a:ext cx="11818513" cy="1649682"/>
+              </a:xfrm>
+              <a:prstGeom prst="rect">
+                <a:avLst/>
+              </a:prstGeom>
+              <a:blipFill>
+                <a:blip r:embed="rId4"/>
+                <a:stretch>
+                  <a:fillRect l="-1342" t="-4444" r="-1858" b="-9630"/>
+                </a:stretch>
+              </a:blipFill>
+            </p:spPr>
+            <p:txBody>
+              <a:bodyPr/>
+              <a:lstStyle/>
+              <a:p>
+                <a:r>
+                  <a:rPr lang="it-IT">
+                    <a:noFill/>
+                  </a:rPr>
+                  <a:t> </a:t>
+                </a:r>
+              </a:p>
+            </p:txBody>
+          </p:sp>
+        </mc:Fallback>
+      </mc:AlternateContent>
     </p:spTree>
     <p:extLst>
       <p:ext uri="{BB962C8B-B14F-4D97-AF65-F5344CB8AC3E}">
@@ -4263,17 +4453,19 @@
       </p:grpSpPr>
       <p:pic>
         <p:nvPicPr>
-          <p:cNvPr id="3" name="Immagine 2" descr="Immagine che contiene testo, mappa&#10;&#10;Descrizione generata automaticamente">
-            <a:extLst>
-              <a:ext uri="{FF2B5EF4-FFF2-40B4-BE49-F238E27FC236}">
-                <a16:creationId xmlns:a16="http://schemas.microsoft.com/office/drawing/2014/main" id="{471BD45B-222E-4CB4-B05F-6321CBE02586}"/>
+          <p:cNvPr id="13" name="Segnaposto contenuto 12" descr="Immagine che contiene testo, mappa, tavolo, bianco&#10;&#10;Descrizione generata automaticamente">
+            <a:extLst>
+              <a:ext uri="{FF2B5EF4-FFF2-40B4-BE49-F238E27FC236}">
+                <a16:creationId xmlns:a16="http://schemas.microsoft.com/office/drawing/2014/main" id="{063D6D24-BB89-4D5B-981B-A0C8CEFE756D}"/>
               </a:ext>
             </a:extLst>
           </p:cNvPr>
           <p:cNvPicPr>
-            <a:picLocks noChangeAspect="1"/>
+            <a:picLocks noGrp="1" noChangeAspect="1"/>
           </p:cNvPicPr>
-          <p:nvPr/>
+          <p:nvPr>
+            <p:ph sz="half" idx="1"/>
+          </p:nvPr>
         </p:nvPicPr>
         <p:blipFill>
           <a:blip r:embed="rId2">
@@ -4289,8 +4481,8 @@
         </p:blipFill>
         <p:spPr>
           <a:xfrm>
-            <a:off x="5838480" y="1561237"/>
-            <a:ext cx="5864477" cy="4336004"/>
+            <a:off x="0" y="2085628"/>
+            <a:ext cx="6829683" cy="3629203"/>
           </a:xfrm>
           <a:prstGeom prst="rect">
             <a:avLst/>
@@ -4299,17 +4491,19 @@
       </p:pic>
       <p:pic>
         <p:nvPicPr>
-          <p:cNvPr id="5" name="Immagine 4" descr="Immagine che contiene testo, mappa&#10;&#10;Descrizione generata automaticamente">
-            <a:extLst>
-              <a:ext uri="{FF2B5EF4-FFF2-40B4-BE49-F238E27FC236}">
-                <a16:creationId xmlns:a16="http://schemas.microsoft.com/office/drawing/2014/main" id="{EBC0B823-B232-4E79-A171-E035D67F0388}"/>
+          <p:cNvPr id="14" name="Segnaposto contenuto 13" descr="Immagine che contiene screenshot&#10;&#10;Descrizione generata automaticamente">
+            <a:extLst>
+              <a:ext uri="{FF2B5EF4-FFF2-40B4-BE49-F238E27FC236}">
+                <a16:creationId xmlns:a16="http://schemas.microsoft.com/office/drawing/2014/main" id="{CECC5DE1-9F6E-4C63-A877-5D1016EB58CE}"/>
               </a:ext>
             </a:extLst>
           </p:cNvPr>
           <p:cNvPicPr>
-            <a:picLocks noChangeAspect="1"/>
+            <a:picLocks noGrp="1" noChangeAspect="1"/>
           </p:cNvPicPr>
-          <p:nvPr/>
+          <p:nvPr>
+            <p:ph sz="half" idx="2"/>
+          </p:nvPr>
         </p:nvPicPr>
         <p:blipFill>
           <a:blip r:embed="rId3">
@@ -4325,54 +4519,206 @@
         </p:blipFill>
         <p:spPr>
           <a:xfrm>
-            <a:off x="999474" y="541807"/>
-            <a:ext cx="4839006" cy="3187432"/>
+            <a:off x="6829683" y="2055871"/>
+            <a:ext cx="5193819" cy="3933110"/>
           </a:xfrm>
           <a:prstGeom prst="rect">
             <a:avLst/>
           </a:prstGeom>
         </p:spPr>
       </p:pic>
-      <p:pic>
-        <p:nvPicPr>
-          <p:cNvPr id="7" name="Immagine 6" descr="Immagine che contiene testo, mappa&#10;&#10;Descrizione generata automaticamente">
-            <a:extLst>
-              <a:ext uri="{FF2B5EF4-FFF2-40B4-BE49-F238E27FC236}">
-                <a16:creationId xmlns:a16="http://schemas.microsoft.com/office/drawing/2014/main" id="{DF593015-B5C2-4808-ABD2-7FB673602CE9}"/>
-              </a:ext>
-            </a:extLst>
-          </p:cNvPr>
-          <p:cNvPicPr>
-            <a:picLocks noChangeAspect="1"/>
-          </p:cNvPicPr>
-          <p:nvPr/>
-        </p:nvPicPr>
-        <p:blipFill>
-          <a:blip r:embed="rId4">
-            <a:extLst>
-              <a:ext uri="{28A0092B-C50C-407E-A947-70E740481C1C}">
-                <a14:useLocalDpi xmlns:a14="http://schemas.microsoft.com/office/drawing/2010/main" val="0"/>
-              </a:ext>
-            </a:extLst>
-          </a:blip>
-          <a:stretch>
-            <a:fillRect/>
-          </a:stretch>
-        </p:blipFill>
-        <p:spPr>
-          <a:xfrm>
-            <a:off x="1248163" y="4076700"/>
-            <a:ext cx="4590317" cy="2439234"/>
-          </a:xfrm>
-          <a:prstGeom prst="rect">
-            <a:avLst/>
-          </a:prstGeom>
-        </p:spPr>
-      </p:pic>
+      <mc:AlternateContent xmlns:mc="http://schemas.openxmlformats.org/markup-compatibility/2006">
+        <mc:Choice xmlns:a14="http://schemas.microsoft.com/office/drawing/2010/main" Requires="a14">
+          <p:sp>
+            <p:nvSpPr>
+              <p:cNvPr id="15" name="Titolo 14">
+                <a:extLst>
+                  <a:ext uri="{FF2B5EF4-FFF2-40B4-BE49-F238E27FC236}">
+                    <a16:creationId xmlns:a16="http://schemas.microsoft.com/office/drawing/2014/main" id="{AA50E5DD-85D4-4886-BA6F-EAE9F842ACCD}"/>
+                  </a:ext>
+                </a:extLst>
+              </p:cNvPr>
+              <p:cNvSpPr txBox="1">
+                <a:spLocks noGrp="1"/>
+              </p:cNvSpPr>
+              <p:nvPr>
+                <p:ph type="title"/>
+              </p:nvPr>
+            </p:nvSpPr>
+            <p:spPr>
+              <a:xfrm>
+                <a:off x="762000" y="286995"/>
+                <a:ext cx="10515600" cy="1457963"/>
+              </a:xfrm>
+              <a:prstGeom prst="rect">
+                <a:avLst/>
+              </a:prstGeom>
+              <a:noFill/>
+            </p:spPr>
+            <p:txBody>
+              <a:bodyPr wrap="square" rtlCol="0">
+                <a:spAutoFit/>
+              </a:bodyPr>
+              <a:lstStyle/>
+              <a:p>
+                <a:r>
+                  <a:rPr lang="it-IT" sz="3200" dirty="0">
+                    <a:latin typeface="+mn-lt"/>
+                  </a:rPr>
+                  <a:t>T</a:t>
+                </a:r>
+                <a:r>
+                  <a:rPr lang="en-US" sz="3200" dirty="0" err="1">
+                    <a:latin typeface="+mn-lt"/>
+                  </a:rPr>
+                  <a:t>ransfer</a:t>
+                </a:r>
+                <a:r>
+                  <a:rPr lang="en-US" sz="3200" dirty="0">
+                    <a:latin typeface="+mn-lt"/>
+                  </a:rPr>
+                  <a:t> characteristic for the FET with 10 mV applied bias voltage </a:t>
+                </a:r>
+                <a14:m>
+                  <m:oMath xmlns:m="http://schemas.openxmlformats.org/officeDocument/2006/math">
+                    <m:sSub>
+                      <m:sSubPr>
+                        <m:ctrlPr>
+                          <a:rPr lang="en-US" sz="3200" i="1">
+                            <a:latin typeface="+mn-lt"/>
+                          </a:rPr>
+                        </m:ctrlPr>
+                      </m:sSubPr>
+                      <m:e>
+                        <m:r>
+                          <a:rPr lang="it-IT" sz="3200" b="0" i="1" smtClean="0">
+                            <a:latin typeface="+mn-lt"/>
+                          </a:rPr>
+                          <m:t>𝑉</m:t>
+                        </m:r>
+                      </m:e>
+                      <m:sub>
+                        <m:r>
+                          <a:rPr lang="it-IT" sz="3200" b="0" i="1" smtClean="0">
+                            <a:latin typeface="+mn-lt"/>
+                          </a:rPr>
+                          <m:t>𝑑𝑠</m:t>
+                        </m:r>
+                      </m:sub>
+                    </m:sSub>
+                  </m:oMath>
+                </a14:m>
+                <a:r>
+                  <a:rPr lang="en-US" sz="3200" dirty="0">
+                    <a:latin typeface="+mn-lt"/>
+                  </a:rPr>
+                  <a:t>. </a:t>
+                </a:r>
+                <a:r>
+                  <a:rPr lang="en-US" sz="3200" dirty="0" err="1">
+                    <a:latin typeface="+mn-lt"/>
+                  </a:rPr>
+                  <a:t>Backgate</a:t>
+                </a:r>
+                <a:r>
+                  <a:rPr lang="en-US" sz="3200" dirty="0">
+                    <a:latin typeface="+mn-lt"/>
+                  </a:rPr>
+                  <a:t> voltage </a:t>
+                </a:r>
+                <a14:m>
+                  <m:oMath xmlns:m="http://schemas.openxmlformats.org/officeDocument/2006/math">
+                    <m:sSub>
+                      <m:sSubPr>
+                        <m:ctrlPr>
+                          <a:rPr lang="en-US" sz="3200" i="1">
+                            <a:latin typeface="+mn-lt"/>
+                          </a:rPr>
+                        </m:ctrlPr>
+                      </m:sSubPr>
+                      <m:e>
+                        <m:r>
+                          <a:rPr lang="it-IT" sz="3200" b="0" i="1" smtClean="0">
+                            <a:latin typeface="+mn-lt"/>
+                          </a:rPr>
+                          <m:t>𝑉</m:t>
+                        </m:r>
+                      </m:e>
+                      <m:sub>
+                        <m:r>
+                          <a:rPr lang="it-IT" sz="3200" b="0" i="1" smtClean="0">
+                            <a:latin typeface="+mn-lt"/>
+                          </a:rPr>
+                          <m:t>𝑏𝑔</m:t>
+                        </m:r>
+                      </m:sub>
+                    </m:sSub>
+                  </m:oMath>
+                </a14:m>
+                <a:r>
+                  <a:rPr lang="en-US" sz="3200" dirty="0">
+                    <a:latin typeface="+mn-lt"/>
+                  </a:rPr>
+                  <a:t> is applied to the substrate and the top gate is disconnected.</a:t>
+                </a:r>
+                <a:endParaRPr lang="it-IT" sz="3200" dirty="0">
+                  <a:latin typeface="+mn-lt"/>
+                </a:endParaRPr>
+              </a:p>
+            </p:txBody>
+          </p:sp>
+        </mc:Choice>
+        <mc:Fallback>
+          <p:sp>
+            <p:nvSpPr>
+              <p:cNvPr id="15" name="Titolo 14">
+                <a:extLst>
+                  <a:ext uri="{FF2B5EF4-FFF2-40B4-BE49-F238E27FC236}">
+                    <a16:creationId xmlns:a16="http://schemas.microsoft.com/office/drawing/2014/main" id="{AA50E5DD-85D4-4886-BA6F-EAE9F842ACCD}"/>
+                  </a:ext>
+                </a:extLst>
+              </p:cNvPr>
+              <p:cNvSpPr txBox="1">
+                <a:spLocks noGrp="1" noRot="1" noChangeAspect="1" noMove="1" noResize="1" noEditPoints="1" noAdjustHandles="1" noChangeArrowheads="1" noChangeShapeType="1" noTextEdit="1"/>
+              </p:cNvSpPr>
+              <p:nvPr>
+                <p:ph type="title"/>
+              </p:nvPr>
+            </p:nvSpPr>
+            <p:spPr>
+              <a:xfrm>
+                <a:off x="762000" y="286995"/>
+                <a:ext cx="10515600" cy="1457963"/>
+              </a:xfrm>
+              <a:prstGeom prst="rect">
+                <a:avLst/>
+              </a:prstGeom>
+              <a:blipFill>
+                <a:blip r:embed="rId4"/>
+                <a:stretch>
+                  <a:fillRect l="-1449" t="-8368" b="-13808"/>
+                </a:stretch>
+              </a:blipFill>
+            </p:spPr>
+            <p:txBody>
+              <a:bodyPr/>
+              <a:lstStyle/>
+              <a:p>
+                <a:r>
+                  <a:rPr lang="it-IT">
+                    <a:noFill/>
+                  </a:rPr>
+                  <a:t> </a:t>
+                </a:r>
+              </a:p>
+            </p:txBody>
+          </p:sp>
+        </mc:Fallback>
+      </mc:AlternateContent>
     </p:spTree>
     <p:extLst>
       <p:ext uri="{BB962C8B-B14F-4D97-AF65-F5344CB8AC3E}">
-        <p14:creationId xmlns:p14="http://schemas.microsoft.com/office/powerpoint/2010/main" val="4214566959"/>
+        <p14:creationId xmlns:p14="http://schemas.microsoft.com/office/powerpoint/2010/main" val="1948871581"/>
       </p:ext>
     </p:extLst>
   </p:cSld>
@@ -4401,10 +4747,10 @@
       </p:grpSpPr>
       <p:pic>
         <p:nvPicPr>
-          <p:cNvPr id="3" name="Immagine 2" descr="Immagine che contiene mappa, testo&#10;&#10;Descrizione generata automaticamente">
-            <a:extLst>
-              <a:ext uri="{FF2B5EF4-FFF2-40B4-BE49-F238E27FC236}">
-                <a16:creationId xmlns:a16="http://schemas.microsoft.com/office/drawing/2014/main" id="{2B9C19D9-77BF-4D7A-80A0-98A9BBD1B78C}"/>
+          <p:cNvPr id="4" name="Immagine 3" descr="Immagine che contiene testo, mappa&#10;&#10;Descrizione generata automaticamente">
+            <a:extLst>
+              <a:ext uri="{FF2B5EF4-FFF2-40B4-BE49-F238E27FC236}">
+                <a16:creationId xmlns:a16="http://schemas.microsoft.com/office/drawing/2014/main" id="{80E64D1E-5AD0-4A09-8A31-170734A8BFBA}"/>
               </a:ext>
             </a:extLst>
           </p:cNvPr>
@@ -4427,8 +4773,8 @@
         </p:blipFill>
         <p:spPr>
           <a:xfrm>
-            <a:off x="6243126" y="1685924"/>
-            <a:ext cx="5478637" cy="4181703"/>
+            <a:off x="6714446" y="1996225"/>
+            <a:ext cx="5477554" cy="4114009"/>
           </a:xfrm>
           <a:prstGeom prst="rect">
             <a:avLst/>
@@ -4437,10 +4783,10 @@
       </p:pic>
       <p:pic>
         <p:nvPicPr>
-          <p:cNvPr id="5" name="Immagine 4" descr="Immagine che contiene bianco&#10;&#10;Descrizione generata automaticamente">
-            <a:extLst>
-              <a:ext uri="{FF2B5EF4-FFF2-40B4-BE49-F238E27FC236}">
-                <a16:creationId xmlns:a16="http://schemas.microsoft.com/office/drawing/2014/main" id="{BB3EF421-D1D9-44B3-B15D-D4780028CAA6}"/>
+          <p:cNvPr id="8" name="Immagine 7" descr="Immagine che contiene testo, mappa&#10;&#10;Descrizione generata automaticamente">
+            <a:extLst>
+              <a:ext uri="{FF2B5EF4-FFF2-40B4-BE49-F238E27FC236}">
+                <a16:creationId xmlns:a16="http://schemas.microsoft.com/office/drawing/2014/main" id="{9B20CAF4-B57D-418C-A127-258CE8103A70}"/>
               </a:ext>
             </a:extLst>
           </p:cNvPr>
@@ -4463,18 +4809,173 @@
         </p:blipFill>
         <p:spPr>
           <a:xfrm>
-            <a:off x="304722" y="1890295"/>
-            <a:ext cx="5791278" cy="3077409"/>
+            <a:off x="0" y="1996225"/>
+            <a:ext cx="6714446" cy="3567969"/>
           </a:xfrm>
           <a:prstGeom prst="rect">
             <a:avLst/>
           </a:prstGeom>
         </p:spPr>
       </p:pic>
+      <mc:AlternateContent xmlns:mc="http://schemas.openxmlformats.org/markup-compatibility/2006">
+        <mc:Choice xmlns:a14="http://schemas.microsoft.com/office/drawing/2010/main" Requires="a14">
+          <p:sp>
+            <p:nvSpPr>
+              <p:cNvPr id="9" name="CasellaDiTesto 8">
+                <a:extLst>
+                  <a:ext uri="{FF2B5EF4-FFF2-40B4-BE49-F238E27FC236}">
+                    <a16:creationId xmlns:a16="http://schemas.microsoft.com/office/drawing/2014/main" id="{56694026-3AB4-43A8-B701-1B9DC896DB30}"/>
+                  </a:ext>
+                </a:extLst>
+              </p:cNvPr>
+              <p:cNvSpPr txBox="1"/>
+              <p:nvPr/>
+            </p:nvSpPr>
+            <p:spPr>
+              <a:xfrm>
+                <a:off x="686873" y="128789"/>
+                <a:ext cx="10818254" cy="1609671"/>
+              </a:xfrm>
+              <a:prstGeom prst="rect">
+                <a:avLst/>
+              </a:prstGeom>
+              <a:noFill/>
+            </p:spPr>
+            <p:txBody>
+              <a:bodyPr wrap="square" rtlCol="0">
+                <a:spAutoFit/>
+              </a:bodyPr>
+              <a:lstStyle/>
+              <a:p>
+                <a14:m>
+                  <m:oMath xmlns:m="http://schemas.openxmlformats.org/officeDocument/2006/math">
+                    <m:sSub>
+                      <m:sSubPr>
+                        <m:ctrlPr>
+                          <a:rPr lang="en-US" sz="3200" i="1" smtClean="0">
+                            <a:latin typeface="Cambria Math" panose="02040503050406030204" pitchFamily="18" charset="0"/>
+                          </a:rPr>
+                        </m:ctrlPr>
+                      </m:sSubPr>
+                      <m:e>
+                        <m:r>
+                          <a:rPr lang="it-IT" sz="3200" b="0" i="1" smtClean="0">
+                            <a:latin typeface="Cambria Math" panose="02040503050406030204" pitchFamily="18" charset="0"/>
+                          </a:rPr>
+                          <m:t>𝐼</m:t>
+                        </m:r>
+                      </m:e>
+                      <m:sub>
+                        <m:r>
+                          <a:rPr lang="it-IT" sz="3200" b="0" i="1" smtClean="0">
+                            <a:latin typeface="Cambria Math" panose="02040503050406030204" pitchFamily="18" charset="0"/>
+                          </a:rPr>
+                          <m:t>𝑑𝑠</m:t>
+                        </m:r>
+                      </m:sub>
+                    </m:sSub>
+                    <m:r>
+                      <a:rPr lang="it-IT" sz="3200" b="0" i="1" smtClean="0">
+                        <a:latin typeface="Cambria Math" panose="02040503050406030204" pitchFamily="18" charset="0"/>
+                      </a:rPr>
+                      <m:t>−</m:t>
+                    </m:r>
+                    <m:sSub>
+                      <m:sSubPr>
+                        <m:ctrlPr>
+                          <a:rPr lang="en-US" sz="3200" i="1">
+                            <a:latin typeface="Cambria Math" panose="02040503050406030204" pitchFamily="18" charset="0"/>
+                          </a:rPr>
+                        </m:ctrlPr>
+                      </m:sSubPr>
+                      <m:e>
+                        <m:r>
+                          <a:rPr lang="it-IT" sz="3200" b="0" i="1" smtClean="0">
+                            <a:latin typeface="Cambria Math" panose="02040503050406030204" pitchFamily="18" charset="0"/>
+                          </a:rPr>
+                          <m:t>𝑉</m:t>
+                        </m:r>
+                      </m:e>
+                      <m:sub>
+                        <m:r>
+                          <a:rPr lang="it-IT" sz="3200" b="0" i="1" smtClean="0">
+                            <a:latin typeface="Cambria Math" panose="02040503050406030204" pitchFamily="18" charset="0"/>
+                          </a:rPr>
+                          <m:t>𝑡𝑔</m:t>
+                        </m:r>
+                      </m:sub>
+                    </m:sSub>
+                  </m:oMath>
+                </a14:m>
+                <a:r>
+                  <a:rPr lang="it-IT" sz="3200" dirty="0"/>
+                  <a:t> </a:t>
+                </a:r>
+                <a:r>
+                  <a:rPr lang="en-US" sz="3200" dirty="0"/>
+                  <a:t>curve recorded for a bias voltage ranging from 10 mV to 500 mV. Measurements are performed with the back gate </a:t>
+                </a:r>
+                <a:r>
+                  <a:rPr lang="it-IT" sz="3200" dirty="0" err="1"/>
+                  <a:t>grounded</a:t>
+                </a:r>
+                <a:r>
+                  <a:rPr lang="it-IT" sz="3200" dirty="0"/>
+                  <a:t>.</a:t>
+                </a:r>
+              </a:p>
+            </p:txBody>
+          </p:sp>
+        </mc:Choice>
+        <mc:Fallback>
+          <p:sp>
+            <p:nvSpPr>
+              <p:cNvPr id="9" name="CasellaDiTesto 8">
+                <a:extLst>
+                  <a:ext uri="{FF2B5EF4-FFF2-40B4-BE49-F238E27FC236}">
+                    <a16:creationId xmlns:a16="http://schemas.microsoft.com/office/drawing/2014/main" id="{56694026-3AB4-43A8-B701-1B9DC896DB30}"/>
+                  </a:ext>
+                </a:extLst>
+              </p:cNvPr>
+              <p:cNvSpPr txBox="1">
+                <a:spLocks noRot="1" noChangeAspect="1" noMove="1" noResize="1" noEditPoints="1" noAdjustHandles="1" noChangeArrowheads="1" noChangeShapeType="1" noTextEdit="1"/>
+              </p:cNvSpPr>
+              <p:nvPr/>
+            </p:nvSpPr>
+            <p:spPr>
+              <a:xfrm>
+                <a:off x="686873" y="128789"/>
+                <a:ext cx="10818254" cy="1609671"/>
+              </a:xfrm>
+              <a:prstGeom prst="rect">
+                <a:avLst/>
+              </a:prstGeom>
+              <a:blipFill>
+                <a:blip r:embed="rId4"/>
+                <a:stretch>
+                  <a:fillRect l="-1466" t="-4545" b="-11742"/>
+                </a:stretch>
+              </a:blipFill>
+            </p:spPr>
+            <p:txBody>
+              <a:bodyPr/>
+              <a:lstStyle/>
+              <a:p>
+                <a:r>
+                  <a:rPr lang="it-IT">
+                    <a:noFill/>
+                  </a:rPr>
+                  <a:t> </a:t>
+                </a:r>
+              </a:p>
+            </p:txBody>
+          </p:sp>
+        </mc:Fallback>
+      </mc:AlternateContent>
     </p:spTree>
     <p:extLst>
       <p:ext uri="{BB962C8B-B14F-4D97-AF65-F5344CB8AC3E}">
-        <p14:creationId xmlns:p14="http://schemas.microsoft.com/office/powerpoint/2010/main" val="184799789"/>
+        <p14:creationId xmlns:p14="http://schemas.microsoft.com/office/powerpoint/2010/main" val="4214566959"/>
       </p:ext>
     </p:extLst>
   </p:cSld>
@@ -4503,10 +5004,10 @@
       </p:grpSpPr>
       <p:pic>
         <p:nvPicPr>
-          <p:cNvPr id="5" name="Immagine 4" descr="Immagine che contiene testo&#10;&#10;Descrizione generata automaticamente">
-            <a:extLst>
-              <a:ext uri="{FF2B5EF4-FFF2-40B4-BE49-F238E27FC236}">
-                <a16:creationId xmlns:a16="http://schemas.microsoft.com/office/drawing/2014/main" id="{6DE5CD78-498D-4059-A54A-CA50A516BF4A}"/>
+          <p:cNvPr id="4" name="Immagine 3" descr="Immagine che contiene testo, mappa&#10;&#10;Descrizione generata automaticamente">
+            <a:extLst>
+              <a:ext uri="{FF2B5EF4-FFF2-40B4-BE49-F238E27FC236}">
+                <a16:creationId xmlns:a16="http://schemas.microsoft.com/office/drawing/2014/main" id="{2AF9E266-F1DC-4F7C-B513-0881B40CB7E0}"/>
               </a:ext>
             </a:extLst>
           </p:cNvPr>
@@ -4529,49 +5030,594 @@
         </p:blipFill>
         <p:spPr>
           <a:xfrm>
-            <a:off x="2886075" y="1232972"/>
-            <a:ext cx="6667806" cy="4392055"/>
+            <a:off x="8693239" y="2516615"/>
+            <a:ext cx="3498761" cy="2686146"/>
           </a:xfrm>
           <a:prstGeom prst="rect">
             <a:avLst/>
           </a:prstGeom>
         </p:spPr>
       </p:pic>
-      <p:sp>
-        <p:nvSpPr>
-          <p:cNvPr id="6" name="CasellaDiTesto 5">
-            <a:extLst>
-              <a:ext uri="{FF2B5EF4-FFF2-40B4-BE49-F238E27FC236}">
-                <a16:creationId xmlns:a16="http://schemas.microsoft.com/office/drawing/2014/main" id="{8A41B6BA-7D70-402B-B1B0-43A3ED3D31BC}"/>
-              </a:ext>
-            </a:extLst>
-          </p:cNvPr>
-          <p:cNvSpPr txBox="1"/>
+      <p:pic>
+        <p:nvPicPr>
+          <p:cNvPr id="7" name="Immagine 6" descr="Immagine che contiene testo, mappa&#10;&#10;Descrizione generata automaticamente">
+            <a:extLst>
+              <a:ext uri="{FF2B5EF4-FFF2-40B4-BE49-F238E27FC236}">
+                <a16:creationId xmlns:a16="http://schemas.microsoft.com/office/drawing/2014/main" id="{7C2C6B5C-A78F-4033-B4C5-EF38FA28CA62}"/>
+              </a:ext>
+            </a:extLst>
+          </p:cNvPr>
+          <p:cNvPicPr>
+            <a:picLocks noChangeAspect="1"/>
+          </p:cNvPicPr>
           <p:nvPr/>
-        </p:nvSpPr>
+        </p:nvPicPr>
+        <p:blipFill>
+          <a:blip r:embed="rId3">
+            <a:extLst>
+              <a:ext uri="{28A0092B-C50C-407E-A947-70E740481C1C}">
+                <a14:useLocalDpi xmlns:a14="http://schemas.microsoft.com/office/drawing/2010/main" val="0"/>
+              </a:ext>
+            </a:extLst>
+          </a:blip>
+          <a:stretch>
+            <a:fillRect/>
+          </a:stretch>
+        </p:blipFill>
         <p:spPr>
           <a:xfrm>
-            <a:off x="885825" y="5591174"/>
-            <a:ext cx="2238375" cy="369332"/>
+            <a:off x="0" y="1549952"/>
+            <a:ext cx="8693239" cy="4619473"/>
           </a:xfrm>
           <a:prstGeom prst="rect">
             <a:avLst/>
           </a:prstGeom>
-          <a:noFill/>
         </p:spPr>
-        <p:txBody>
-          <a:bodyPr wrap="square" rtlCol="0">
-            <a:spAutoFit/>
-          </a:bodyPr>
-          <a:lstStyle/>
-          <a:p>
-            <a:r>
-              <a:rPr lang="it-IT" dirty="0"/>
-              <a:t>Top Gate sconnesso</a:t>
-            </a:r>
-          </a:p>
-        </p:txBody>
-      </p:sp>
+      </p:pic>
+      <mc:AlternateContent xmlns:mc="http://schemas.openxmlformats.org/markup-compatibility/2006">
+        <mc:Choice xmlns:a14="http://schemas.microsoft.com/office/drawing/2010/main" Requires="a14">
+          <p:sp>
+            <p:nvSpPr>
+              <p:cNvPr id="8" name="CasellaDiTesto 7">
+                <a:extLst>
+                  <a:ext uri="{FF2B5EF4-FFF2-40B4-BE49-F238E27FC236}">
+                    <a16:creationId xmlns:a16="http://schemas.microsoft.com/office/drawing/2014/main" id="{ECD81CD1-B376-4951-8157-577E18092CE9}"/>
+                  </a:ext>
+                </a:extLst>
+              </p:cNvPr>
+              <p:cNvSpPr txBox="1"/>
+              <p:nvPr/>
+            </p:nvSpPr>
+            <p:spPr>
+              <a:xfrm>
+                <a:off x="772732" y="90153"/>
+                <a:ext cx="10740981" cy="1649682"/>
+              </a:xfrm>
+              <a:prstGeom prst="rect">
+                <a:avLst/>
+              </a:prstGeom>
+              <a:noFill/>
+            </p:spPr>
+            <p:txBody>
+              <a:bodyPr wrap="square" rtlCol="0">
+                <a:spAutoFit/>
+              </a:bodyPr>
+              <a:lstStyle/>
+              <a:p>
+                <a14:m>
+                  <m:oMath xmlns:m="http://schemas.openxmlformats.org/officeDocument/2006/math">
+                    <m:sSub>
+                      <m:sSubPr>
+                        <m:ctrlPr>
+                          <a:rPr lang="en-US" sz="3200" i="1" smtClean="0">
+                            <a:latin typeface="Cambria Math" panose="02040503050406030204" pitchFamily="18" charset="0"/>
+                          </a:rPr>
+                        </m:ctrlPr>
+                      </m:sSubPr>
+                      <m:e>
+                        <m:r>
+                          <a:rPr lang="it-IT" sz="3200" b="0" i="1" smtClean="0">
+                            <a:latin typeface="Cambria Math" panose="02040503050406030204" pitchFamily="18" charset="0"/>
+                          </a:rPr>
+                          <m:t>𝐼</m:t>
+                        </m:r>
+                      </m:e>
+                      <m:sub>
+                        <m:r>
+                          <a:rPr lang="it-IT" sz="3200" b="0" i="1" smtClean="0">
+                            <a:latin typeface="Cambria Math" panose="02040503050406030204" pitchFamily="18" charset="0"/>
+                          </a:rPr>
+                          <m:t>𝑑𝑠</m:t>
+                        </m:r>
+                      </m:sub>
+                    </m:sSub>
+                    <m:r>
+                      <a:rPr lang="it-IT" sz="3200" b="0" i="0" smtClean="0">
+                        <a:latin typeface="Cambria Math" panose="02040503050406030204" pitchFamily="18" charset="0"/>
+                      </a:rPr>
+                      <m:t>−</m:t>
+                    </m:r>
+                    <m:sSub>
+                      <m:sSubPr>
+                        <m:ctrlPr>
+                          <a:rPr lang="en-US" sz="3200" i="1">
+                            <a:latin typeface="Cambria Math" panose="02040503050406030204" pitchFamily="18" charset="0"/>
+                          </a:rPr>
+                        </m:ctrlPr>
+                      </m:sSubPr>
+                      <m:e>
+                        <m:r>
+                          <a:rPr lang="it-IT" sz="3200" b="0" i="1" smtClean="0">
+                            <a:latin typeface="Cambria Math" panose="02040503050406030204" pitchFamily="18" charset="0"/>
+                          </a:rPr>
+                          <m:t>𝑉</m:t>
+                        </m:r>
+                      </m:e>
+                      <m:sub>
+                        <m:r>
+                          <a:rPr lang="it-IT" sz="3200" b="0" i="1" smtClean="0">
+                            <a:latin typeface="Cambria Math" panose="02040503050406030204" pitchFamily="18" charset="0"/>
+                          </a:rPr>
+                          <m:t>𝑡𝑔</m:t>
+                        </m:r>
+                      </m:sub>
+                    </m:sSub>
+                  </m:oMath>
+                </a14:m>
+                <a:r>
+                  <a:rPr lang="it-IT" sz="3200" dirty="0"/>
+                  <a:t> </a:t>
+                </a:r>
+                <a:r>
+                  <a:rPr lang="en-US" sz="3200" dirty="0"/>
+                  <a:t>curve. Measurements are performed with the back gate </a:t>
+                </a:r>
+                <a:r>
+                  <a:rPr lang="it-IT" sz="3200" dirty="0" err="1"/>
+                  <a:t>grounded</a:t>
+                </a:r>
+                <a:r>
+                  <a:rPr lang="it-IT" sz="3200" dirty="0"/>
+                  <a:t>. </a:t>
+                </a:r>
+                <a14:m>
+                  <m:oMath xmlns:m="http://schemas.openxmlformats.org/officeDocument/2006/math">
+                    <m:sSub>
+                      <m:sSubPr>
+                        <m:ctrlPr>
+                          <a:rPr lang="en-US" sz="3200" i="1">
+                            <a:latin typeface="Cambria Math" panose="02040503050406030204" pitchFamily="18" charset="0"/>
+                          </a:rPr>
+                        </m:ctrlPr>
+                      </m:sSubPr>
+                      <m:e>
+                        <m:r>
+                          <a:rPr lang="it-IT" sz="3200" b="0" i="1" smtClean="0">
+                            <a:latin typeface="Cambria Math" panose="02040503050406030204" pitchFamily="18" charset="0"/>
+                          </a:rPr>
+                          <m:t>𝐼</m:t>
+                        </m:r>
+                      </m:e>
+                      <m:sub>
+                        <m:r>
+                          <a:rPr lang="it-IT" sz="3200" b="0" i="1" smtClean="0">
+                            <a:latin typeface="Cambria Math" panose="02040503050406030204" pitchFamily="18" charset="0"/>
+                          </a:rPr>
+                          <m:t>𝑑𝑠</m:t>
+                        </m:r>
+                      </m:sub>
+                    </m:sSub>
+                  </m:oMath>
+                </a14:m>
+                <a:r>
+                  <a:rPr lang="en-US" sz="3200" dirty="0"/>
+                  <a:t>–</a:t>
+                </a:r>
+                <a14:m>
+                  <m:oMath xmlns:m="http://schemas.openxmlformats.org/officeDocument/2006/math">
+                    <m:sSub>
+                      <m:sSubPr>
+                        <m:ctrlPr>
+                          <a:rPr lang="en-US" sz="3200" i="1">
+                            <a:latin typeface="Cambria Math" panose="02040503050406030204" pitchFamily="18" charset="0"/>
+                          </a:rPr>
+                        </m:ctrlPr>
+                      </m:sSubPr>
+                      <m:e>
+                        <m:r>
+                          <a:rPr lang="it-IT" sz="3200" b="0" i="1" smtClean="0">
+                            <a:latin typeface="Cambria Math" panose="02040503050406030204" pitchFamily="18" charset="0"/>
+                          </a:rPr>
+                          <m:t>𝑉</m:t>
+                        </m:r>
+                      </m:e>
+                      <m:sub>
+                        <m:r>
+                          <a:rPr lang="it-IT" sz="3200" b="0" i="1" smtClean="0">
+                            <a:latin typeface="Cambria Math" panose="02040503050406030204" pitchFamily="18" charset="0"/>
+                          </a:rPr>
+                          <m:t>𝑡𝑔</m:t>
+                        </m:r>
+                      </m:sub>
+                    </m:sSub>
+                  </m:oMath>
+                </a14:m>
+                <a:r>
+                  <a:rPr lang="en-US" sz="3200" dirty="0"/>
+                  <a:t> for values of </a:t>
+                </a:r>
+                <a14:m>
+                  <m:oMath xmlns:m="http://schemas.openxmlformats.org/officeDocument/2006/math">
+                    <m:sSub>
+                      <m:sSubPr>
+                        <m:ctrlPr>
+                          <a:rPr lang="en-US" sz="3200" i="1">
+                            <a:latin typeface="Cambria Math" panose="02040503050406030204" pitchFamily="18" charset="0"/>
+                          </a:rPr>
+                        </m:ctrlPr>
+                      </m:sSubPr>
+                      <m:e>
+                        <m:r>
+                          <a:rPr lang="it-IT" sz="3200" b="0" i="1" smtClean="0">
+                            <a:latin typeface="Cambria Math" panose="02040503050406030204" pitchFamily="18" charset="0"/>
+                          </a:rPr>
+                          <m:t>𝑉</m:t>
+                        </m:r>
+                      </m:e>
+                      <m:sub>
+                        <m:r>
+                          <a:rPr lang="it-IT" sz="3200" b="0" i="1" smtClean="0">
+                            <a:latin typeface="Cambria Math" panose="02040503050406030204" pitchFamily="18" charset="0"/>
+                          </a:rPr>
+                          <m:t>𝑏𝑔</m:t>
+                        </m:r>
+                      </m:sub>
+                    </m:sSub>
+                    <m:r>
+                      <a:rPr lang="en-US" sz="3200" i="1">
+                        <a:latin typeface="Cambria Math" panose="02040503050406030204" pitchFamily="18" charset="0"/>
+                      </a:rPr>
+                      <m:t> </m:t>
+                    </m:r>
+                  </m:oMath>
+                </a14:m>
+                <a:r>
+                  <a:rPr lang="en-US" sz="3200" dirty="0"/>
+                  <a:t>=–10, –5, 0, 5 and 10 V.</a:t>
+                </a:r>
+                <a:endParaRPr lang="it-IT" sz="3200" dirty="0"/>
+              </a:p>
+            </p:txBody>
+          </p:sp>
+        </mc:Choice>
+        <mc:Fallback>
+          <p:sp>
+            <p:nvSpPr>
+              <p:cNvPr id="8" name="CasellaDiTesto 7">
+                <a:extLst>
+                  <a:ext uri="{FF2B5EF4-FFF2-40B4-BE49-F238E27FC236}">
+                    <a16:creationId xmlns:a16="http://schemas.microsoft.com/office/drawing/2014/main" id="{ECD81CD1-B376-4951-8157-577E18092CE9}"/>
+                  </a:ext>
+                </a:extLst>
+              </p:cNvPr>
+              <p:cNvSpPr txBox="1">
+                <a:spLocks noRot="1" noChangeAspect="1" noMove="1" noResize="1" noEditPoints="1" noAdjustHandles="1" noChangeArrowheads="1" noChangeShapeType="1" noTextEdit="1"/>
+              </p:cNvSpPr>
+              <p:nvPr/>
+            </p:nvSpPr>
+            <p:spPr>
+              <a:xfrm>
+                <a:off x="772732" y="90153"/>
+                <a:ext cx="10740981" cy="1649682"/>
+              </a:xfrm>
+              <a:prstGeom prst="rect">
+                <a:avLst/>
+              </a:prstGeom>
+              <a:blipFill>
+                <a:blip r:embed="rId4"/>
+                <a:stretch>
+                  <a:fillRect l="-1476" t="-4444" b="-11481"/>
+                </a:stretch>
+              </a:blipFill>
+            </p:spPr>
+            <p:txBody>
+              <a:bodyPr/>
+              <a:lstStyle/>
+              <a:p>
+                <a:r>
+                  <a:rPr lang="it-IT">
+                    <a:noFill/>
+                  </a:rPr>
+                  <a:t> </a:t>
+                </a:r>
+              </a:p>
+            </p:txBody>
+          </p:sp>
+        </mc:Fallback>
+      </mc:AlternateContent>
+    </p:spTree>
+    <p:extLst>
+      <p:ext uri="{BB962C8B-B14F-4D97-AF65-F5344CB8AC3E}">
+        <p14:creationId xmlns:p14="http://schemas.microsoft.com/office/powerpoint/2010/main" val="184799789"/>
+      </p:ext>
+    </p:extLst>
+  </p:cSld>
+  <p:clrMapOvr>
+    <a:masterClrMapping/>
+  </p:clrMapOvr>
+</p:sld>
+</file>
+
+<file path=ppt/slides/slide9.xml><?xml version="1.0" encoding="utf-8"?>
+<p:sld xmlns:a="http://schemas.openxmlformats.org/drawingml/2006/main" xmlns:r="http://schemas.openxmlformats.org/officeDocument/2006/relationships" xmlns:p="http://schemas.openxmlformats.org/presentationml/2006/main">
+  <p:cSld>
+    <p:spTree>
+      <p:nvGrpSpPr>
+        <p:cNvPr id="1" name=""/>
+        <p:cNvGrpSpPr/>
+        <p:nvPr/>
+      </p:nvGrpSpPr>
+      <p:grpSpPr>
+        <a:xfrm>
+          <a:off x="0" y="0"/>
+          <a:ext cx="0" cy="0"/>
+          <a:chOff x="0" y="0"/>
+          <a:chExt cx="0" cy="0"/>
+        </a:xfrm>
+      </p:grpSpPr>
+      <p:pic>
+        <p:nvPicPr>
+          <p:cNvPr id="3" name="Immagine 2" descr="Immagine che contiene mappa, testo&#10;&#10;Descrizione generata automaticamente">
+            <a:extLst>
+              <a:ext uri="{FF2B5EF4-FFF2-40B4-BE49-F238E27FC236}">
+                <a16:creationId xmlns:a16="http://schemas.microsoft.com/office/drawing/2014/main" id="{AAB1280C-8D08-489C-BEB3-30FF5F208E60}"/>
+              </a:ext>
+            </a:extLst>
+          </p:cNvPr>
+          <p:cNvPicPr>
+            <a:picLocks noChangeAspect="1"/>
+          </p:cNvPicPr>
+          <p:nvPr/>
+        </p:nvPicPr>
+        <p:blipFill>
+          <a:blip r:embed="rId2">
+            <a:extLst>
+              <a:ext uri="{28A0092B-C50C-407E-A947-70E740481C1C}">
+                <a14:useLocalDpi xmlns:a14="http://schemas.microsoft.com/office/drawing/2010/main" val="0"/>
+              </a:ext>
+            </a:extLst>
+          </a:blip>
+          <a:stretch>
+            <a:fillRect/>
+          </a:stretch>
+        </p:blipFill>
+        <p:spPr>
+          <a:xfrm>
+            <a:off x="6720566" y="1872117"/>
+            <a:ext cx="5471434" cy="3113765"/>
+          </a:xfrm>
+          <a:prstGeom prst="rect">
+            <a:avLst/>
+          </a:prstGeom>
+        </p:spPr>
+      </p:pic>
+      <p:pic>
+        <p:nvPicPr>
+          <p:cNvPr id="7" name="Immagine 6" descr="Immagine che contiene testo, mappa, tavolo&#10;&#10;Descrizione generata automaticamente">
+            <a:extLst>
+              <a:ext uri="{FF2B5EF4-FFF2-40B4-BE49-F238E27FC236}">
+                <a16:creationId xmlns:a16="http://schemas.microsoft.com/office/drawing/2014/main" id="{5C9AC49E-B754-4455-A816-767C0DED6774}"/>
+              </a:ext>
+            </a:extLst>
+          </p:cNvPr>
+          <p:cNvPicPr>
+            <a:picLocks noChangeAspect="1"/>
+          </p:cNvPicPr>
+          <p:nvPr/>
+        </p:nvPicPr>
+        <p:blipFill>
+          <a:blip r:embed="rId3">
+            <a:extLst>
+              <a:ext uri="{28A0092B-C50C-407E-A947-70E740481C1C}">
+                <a14:useLocalDpi xmlns:a14="http://schemas.microsoft.com/office/drawing/2010/main" val="0"/>
+              </a:ext>
+            </a:extLst>
+          </a:blip>
+          <a:stretch>
+            <a:fillRect/>
+          </a:stretch>
+        </p:blipFill>
+        <p:spPr>
+          <a:xfrm>
+            <a:off x="0" y="1537266"/>
+            <a:ext cx="6659495" cy="3538768"/>
+          </a:xfrm>
+          <a:prstGeom prst="rect">
+            <a:avLst/>
+          </a:prstGeom>
+        </p:spPr>
+      </p:pic>
+      <mc:AlternateContent xmlns:mc="http://schemas.openxmlformats.org/markup-compatibility/2006">
+        <mc:Choice xmlns:a14="http://schemas.microsoft.com/office/drawing/2010/main" Requires="a14">
+          <p:sp>
+            <p:nvSpPr>
+              <p:cNvPr id="8" name="CasellaDiTesto 7">
+                <a:extLst>
+                  <a:ext uri="{FF2B5EF4-FFF2-40B4-BE49-F238E27FC236}">
+                    <a16:creationId xmlns:a16="http://schemas.microsoft.com/office/drawing/2014/main" id="{FB87B9F4-35C1-4DD5-93DB-ACC2C9859F9B}"/>
+                  </a:ext>
+                </a:extLst>
+              </p:cNvPr>
+              <p:cNvSpPr txBox="1"/>
+              <p:nvPr/>
+            </p:nvSpPr>
+            <p:spPr>
+              <a:xfrm>
+                <a:off x="1530380" y="218941"/>
+                <a:ext cx="8862871" cy="624786"/>
+              </a:xfrm>
+              <a:prstGeom prst="rect">
+                <a:avLst/>
+              </a:prstGeom>
+              <a:noFill/>
+            </p:spPr>
+            <p:txBody>
+              <a:bodyPr wrap="square" rtlCol="0">
+                <a:spAutoFit/>
+              </a:bodyPr>
+              <a:lstStyle/>
+              <a:p>
+                <a14:m>
+                  <m:oMath xmlns:m="http://schemas.openxmlformats.org/officeDocument/2006/math">
+                    <m:sSub>
+                      <m:sSubPr>
+                        <m:ctrlPr>
+                          <a:rPr lang="en-US" sz="3200" i="1" smtClean="0">
+                            <a:latin typeface="Cambria Math" panose="02040503050406030204" pitchFamily="18" charset="0"/>
+                          </a:rPr>
+                        </m:ctrlPr>
+                      </m:sSubPr>
+                      <m:e>
+                        <m:r>
+                          <a:rPr lang="it-IT" sz="3200" b="0" i="1" smtClean="0">
+                            <a:latin typeface="Cambria Math" panose="02040503050406030204" pitchFamily="18" charset="0"/>
+                          </a:rPr>
+                          <m:t>𝐼</m:t>
+                        </m:r>
+                      </m:e>
+                      <m:sub>
+                        <m:r>
+                          <a:rPr lang="it-IT" sz="3200" b="0" i="1" smtClean="0">
+                            <a:latin typeface="Cambria Math" panose="02040503050406030204" pitchFamily="18" charset="0"/>
+                          </a:rPr>
+                          <m:t>𝑑𝑠</m:t>
+                        </m:r>
+                      </m:sub>
+                    </m:sSub>
+                    <m:r>
+                      <a:rPr lang="it-IT" sz="3200" b="0" i="0" smtClean="0">
+                        <a:latin typeface="Cambria Math" panose="02040503050406030204" pitchFamily="18" charset="0"/>
+                      </a:rPr>
+                      <m:t>−</m:t>
+                    </m:r>
+                    <m:sSub>
+                      <m:sSubPr>
+                        <m:ctrlPr>
+                          <a:rPr lang="en-US" sz="3200" i="1">
+                            <a:latin typeface="Cambria Math" panose="02040503050406030204" pitchFamily="18" charset="0"/>
+                          </a:rPr>
+                        </m:ctrlPr>
+                      </m:sSubPr>
+                      <m:e>
+                        <m:r>
+                          <a:rPr lang="it-IT" sz="3200" b="0" i="1" smtClean="0">
+                            <a:latin typeface="Cambria Math" panose="02040503050406030204" pitchFamily="18" charset="0"/>
+                          </a:rPr>
+                          <m:t>𝑉</m:t>
+                        </m:r>
+                      </m:e>
+                      <m:sub>
+                        <m:r>
+                          <a:rPr lang="it-IT" sz="3200" b="0" i="1" smtClean="0">
+                            <a:latin typeface="Cambria Math" panose="02040503050406030204" pitchFamily="18" charset="0"/>
+                          </a:rPr>
+                          <m:t>𝑑𝑠</m:t>
+                        </m:r>
+                      </m:sub>
+                    </m:sSub>
+                  </m:oMath>
+                </a14:m>
+                <a:r>
+                  <a:rPr lang="it-IT" sz="3200" dirty="0"/>
+                  <a:t> </a:t>
+                </a:r>
+                <a:r>
+                  <a:rPr lang="en-US" sz="3200" dirty="0"/>
+                  <a:t>curves recorded for different values of </a:t>
+                </a:r>
+                <a14:m>
+                  <m:oMath xmlns:m="http://schemas.openxmlformats.org/officeDocument/2006/math">
+                    <m:sSub>
+                      <m:sSubPr>
+                        <m:ctrlPr>
+                          <a:rPr lang="en-US" sz="3200" i="1">
+                            <a:latin typeface="Cambria Math" panose="02040503050406030204" pitchFamily="18" charset="0"/>
+                          </a:rPr>
+                        </m:ctrlPr>
+                      </m:sSubPr>
+                      <m:e>
+                        <m:r>
+                          <a:rPr lang="it-IT" sz="3200" b="0" i="1" smtClean="0">
+                            <a:latin typeface="Cambria Math" panose="02040503050406030204" pitchFamily="18" charset="0"/>
+                          </a:rPr>
+                          <m:t>𝑉</m:t>
+                        </m:r>
+                      </m:e>
+                      <m:sub>
+                        <m:r>
+                          <a:rPr lang="it-IT" sz="3200" b="0" i="1" smtClean="0">
+                            <a:latin typeface="Cambria Math" panose="02040503050406030204" pitchFamily="18" charset="0"/>
+                          </a:rPr>
+                          <m:t>𝑡𝑔</m:t>
+                        </m:r>
+                      </m:sub>
+                    </m:sSub>
+                  </m:oMath>
+                </a14:m>
+                <a:r>
+                  <a:rPr lang="en-US" sz="3200" dirty="0"/>
+                  <a:t>.</a:t>
+                </a:r>
+                <a:endParaRPr lang="it-IT" sz="3200" dirty="0"/>
+              </a:p>
+            </p:txBody>
+          </p:sp>
+        </mc:Choice>
+        <mc:Fallback>
+          <p:sp>
+            <p:nvSpPr>
+              <p:cNvPr id="8" name="CasellaDiTesto 7">
+                <a:extLst>
+                  <a:ext uri="{FF2B5EF4-FFF2-40B4-BE49-F238E27FC236}">
+                    <a16:creationId xmlns:a16="http://schemas.microsoft.com/office/drawing/2014/main" id="{FB87B9F4-35C1-4DD5-93DB-ACC2C9859F9B}"/>
+                  </a:ext>
+                </a:extLst>
+              </p:cNvPr>
+              <p:cNvSpPr txBox="1">
+                <a:spLocks noRot="1" noChangeAspect="1" noMove="1" noResize="1" noEditPoints="1" noAdjustHandles="1" noChangeArrowheads="1" noChangeShapeType="1" noTextEdit="1"/>
+              </p:cNvSpPr>
+              <p:nvPr/>
+            </p:nvSpPr>
+            <p:spPr>
+              <a:xfrm>
+                <a:off x="1530380" y="218941"/>
+                <a:ext cx="8862871" cy="624786"/>
+              </a:xfrm>
+              <a:prstGeom prst="rect">
+                <a:avLst/>
+              </a:prstGeom>
+              <a:blipFill>
+                <a:blip r:embed="rId4"/>
+                <a:stretch>
+                  <a:fillRect t="-11765" r="-1513" b="-26471"/>
+                </a:stretch>
+              </a:blipFill>
+            </p:spPr>
+            <p:txBody>
+              <a:bodyPr/>
+              <a:lstStyle/>
+              <a:p>
+                <a:r>
+                  <a:rPr lang="it-IT">
+                    <a:noFill/>
+                  </a:rPr>
+                  <a:t> </a:t>
+                </a:r>
+              </a:p>
+            </p:txBody>
+          </p:sp>
+        </mc:Fallback>
+      </mc:AlternateContent>
     </p:spTree>
     <p:extLst>
       <p:ext uri="{BB962C8B-B14F-4D97-AF65-F5344CB8AC3E}">

</xml_diff>

<commit_message>
update Monolayer and 4 Layer MoS2
</commit_message>
<xml_diff>
--- a/Presentazione COMSOL.pptx
+++ b/Presentazione COMSOL.pptx
@@ -7,13 +7,15 @@
   <p:sldIdLst>
     <p:sldId id="265" r:id="rId2"/>
     <p:sldId id="264" r:id="rId3"/>
-    <p:sldId id="263" r:id="rId4"/>
-    <p:sldId id="258" r:id="rId5"/>
-    <p:sldId id="259" r:id="rId6"/>
-    <p:sldId id="266" r:id="rId7"/>
-    <p:sldId id="260" r:id="rId8"/>
-    <p:sldId id="261" r:id="rId9"/>
-    <p:sldId id="256" r:id="rId10"/>
+    <p:sldId id="267" r:id="rId4"/>
+    <p:sldId id="268" r:id="rId5"/>
+    <p:sldId id="263" r:id="rId6"/>
+    <p:sldId id="258" r:id="rId7"/>
+    <p:sldId id="259" r:id="rId8"/>
+    <p:sldId id="266" r:id="rId9"/>
+    <p:sldId id="260" r:id="rId10"/>
+    <p:sldId id="261" r:id="rId11"/>
+    <p:sldId id="256" r:id="rId12"/>
   </p:sldIdLst>
   <p:sldSz cx="12192000" cy="6858000"/>
   <p:notesSz cx="6858000" cy="9144000"/>
@@ -3481,36 +3483,6 @@
       </p:sp>
       <p:pic>
         <p:nvPicPr>
-          <p:cNvPr id="6" name="Immagine 5">
-            <a:extLst>
-              <a:ext uri="{FF2B5EF4-FFF2-40B4-BE49-F238E27FC236}">
-                <a16:creationId xmlns:a16="http://schemas.microsoft.com/office/drawing/2014/main" id="{0E21A42C-EBBD-4F59-9A4B-07C8341AC1D0}"/>
-              </a:ext>
-            </a:extLst>
-          </p:cNvPr>
-          <p:cNvPicPr>
-            <a:picLocks noChangeAspect="1"/>
-          </p:cNvPicPr>
-          <p:nvPr/>
-        </p:nvPicPr>
-        <p:blipFill>
-          <a:blip r:embed="rId2"/>
-          <a:stretch>
-            <a:fillRect/>
-          </a:stretch>
-        </p:blipFill>
-        <p:spPr>
-          <a:xfrm>
-            <a:off x="1750775" y="3357001"/>
-            <a:ext cx="4229750" cy="2387043"/>
-          </a:xfrm>
-          <a:prstGeom prst="rect">
-            <a:avLst/>
-          </a:prstGeom>
-        </p:spPr>
-      </p:pic>
-      <p:pic>
-        <p:nvPicPr>
           <p:cNvPr id="13" name="Segnaposto contenuto 4">
             <a:extLst>
               <a:ext uri="{FF2B5EF4-FFF2-40B4-BE49-F238E27FC236}">
@@ -3526,7 +3498,7 @@
           </p:nvPr>
         </p:nvPicPr>
         <p:blipFill>
-          <a:blip r:embed="rId3">
+          <a:blip r:embed="rId2">
             <a:extLst>
               <a:ext uri="{28A0092B-C50C-407E-A947-70E740481C1C}">
                 <a14:useLocalDpi xmlns:a14="http://schemas.microsoft.com/office/drawing/2010/main" val="0"/>
@@ -3544,10 +3516,686 @@
           </a:xfrm>
         </p:spPr>
       </p:pic>
+      <p:pic>
+        <p:nvPicPr>
+          <p:cNvPr id="7" name="Immagine 6">
+            <a:extLst>
+              <a:ext uri="{FF2B5EF4-FFF2-40B4-BE49-F238E27FC236}">
+                <a16:creationId xmlns:a16="http://schemas.microsoft.com/office/drawing/2014/main" id="{F3CC0F8D-F046-4EB8-82C3-04F8F17159A1}"/>
+              </a:ext>
+            </a:extLst>
+          </p:cNvPr>
+          <p:cNvPicPr>
+            <a:picLocks noChangeAspect="1"/>
+          </p:cNvPicPr>
+          <p:nvPr/>
+        </p:nvPicPr>
+        <p:blipFill>
+          <a:blip r:embed="rId3"/>
+          <a:stretch>
+            <a:fillRect/>
+          </a:stretch>
+        </p:blipFill>
+        <p:spPr>
+          <a:xfrm>
+            <a:off x="1646147" y="4152903"/>
+            <a:ext cx="4314825" cy="1752600"/>
+          </a:xfrm>
+          <a:prstGeom prst="rect">
+            <a:avLst/>
+          </a:prstGeom>
+        </p:spPr>
+      </p:pic>
     </p:spTree>
     <p:extLst>
       <p:ext uri="{BB962C8B-B14F-4D97-AF65-F5344CB8AC3E}">
         <p14:creationId xmlns:p14="http://schemas.microsoft.com/office/powerpoint/2010/main" val="1707600928"/>
+      </p:ext>
+    </p:extLst>
+  </p:cSld>
+  <p:clrMapOvr>
+    <a:masterClrMapping/>
+  </p:clrMapOvr>
+</p:sld>
+</file>
+
+<file path=ppt/slides/slide10.xml><?xml version="1.0" encoding="utf-8"?>
+<p:sld xmlns:a="http://schemas.openxmlformats.org/drawingml/2006/main" xmlns:r="http://schemas.openxmlformats.org/officeDocument/2006/relationships" xmlns:p="http://schemas.openxmlformats.org/presentationml/2006/main">
+  <p:cSld>
+    <p:spTree>
+      <p:nvGrpSpPr>
+        <p:cNvPr id="1" name=""/>
+        <p:cNvGrpSpPr/>
+        <p:nvPr/>
+      </p:nvGrpSpPr>
+      <p:grpSpPr>
+        <a:xfrm>
+          <a:off x="0" y="0"/>
+          <a:ext cx="0" cy="0"/>
+          <a:chOff x="0" y="0"/>
+          <a:chExt cx="0" cy="0"/>
+        </a:xfrm>
+      </p:grpSpPr>
+      <p:pic>
+        <p:nvPicPr>
+          <p:cNvPr id="4" name="Immagine 3" descr="Immagine che contiene testo, mappa&#10;&#10;Descrizione generata automaticamente">
+            <a:extLst>
+              <a:ext uri="{FF2B5EF4-FFF2-40B4-BE49-F238E27FC236}">
+                <a16:creationId xmlns:a16="http://schemas.microsoft.com/office/drawing/2014/main" id="{2AF9E266-F1DC-4F7C-B513-0881B40CB7E0}"/>
+              </a:ext>
+            </a:extLst>
+          </p:cNvPr>
+          <p:cNvPicPr>
+            <a:picLocks noChangeAspect="1"/>
+          </p:cNvPicPr>
+          <p:nvPr/>
+        </p:nvPicPr>
+        <p:blipFill>
+          <a:blip r:embed="rId2">
+            <a:extLst>
+              <a:ext uri="{28A0092B-C50C-407E-A947-70E740481C1C}">
+                <a14:useLocalDpi xmlns:a14="http://schemas.microsoft.com/office/drawing/2010/main" val="0"/>
+              </a:ext>
+            </a:extLst>
+          </a:blip>
+          <a:stretch>
+            <a:fillRect/>
+          </a:stretch>
+        </p:blipFill>
+        <p:spPr>
+          <a:xfrm>
+            <a:off x="8693239" y="2516615"/>
+            <a:ext cx="3498761" cy="2686146"/>
+          </a:xfrm>
+          <a:prstGeom prst="rect">
+            <a:avLst/>
+          </a:prstGeom>
+        </p:spPr>
+      </p:pic>
+      <p:pic>
+        <p:nvPicPr>
+          <p:cNvPr id="7" name="Immagine 6" descr="Immagine che contiene testo, mappa&#10;&#10;Descrizione generata automaticamente">
+            <a:extLst>
+              <a:ext uri="{FF2B5EF4-FFF2-40B4-BE49-F238E27FC236}">
+                <a16:creationId xmlns:a16="http://schemas.microsoft.com/office/drawing/2014/main" id="{7C2C6B5C-A78F-4033-B4C5-EF38FA28CA62}"/>
+              </a:ext>
+            </a:extLst>
+          </p:cNvPr>
+          <p:cNvPicPr>
+            <a:picLocks noChangeAspect="1"/>
+          </p:cNvPicPr>
+          <p:nvPr/>
+        </p:nvPicPr>
+        <p:blipFill>
+          <a:blip r:embed="rId3">
+            <a:extLst>
+              <a:ext uri="{28A0092B-C50C-407E-A947-70E740481C1C}">
+                <a14:useLocalDpi xmlns:a14="http://schemas.microsoft.com/office/drawing/2010/main" val="0"/>
+              </a:ext>
+            </a:extLst>
+          </a:blip>
+          <a:stretch>
+            <a:fillRect/>
+          </a:stretch>
+        </p:blipFill>
+        <p:spPr>
+          <a:xfrm>
+            <a:off x="0" y="1549952"/>
+            <a:ext cx="8693239" cy="4619473"/>
+          </a:xfrm>
+          <a:prstGeom prst="rect">
+            <a:avLst/>
+          </a:prstGeom>
+        </p:spPr>
+      </p:pic>
+      <mc:AlternateContent xmlns:mc="http://schemas.openxmlformats.org/markup-compatibility/2006" xmlns:a14="http://schemas.microsoft.com/office/drawing/2010/main">
+        <mc:Choice Requires="a14">
+          <p:sp>
+            <p:nvSpPr>
+              <p:cNvPr id="8" name="CasellaDiTesto 7">
+                <a:extLst>
+                  <a:ext uri="{FF2B5EF4-FFF2-40B4-BE49-F238E27FC236}">
+                    <a16:creationId xmlns:a16="http://schemas.microsoft.com/office/drawing/2014/main" id="{ECD81CD1-B376-4951-8157-577E18092CE9}"/>
+                  </a:ext>
+                </a:extLst>
+              </p:cNvPr>
+              <p:cNvSpPr txBox="1"/>
+              <p:nvPr/>
+            </p:nvSpPr>
+            <p:spPr>
+              <a:xfrm>
+                <a:off x="772732" y="90153"/>
+                <a:ext cx="10740981" cy="1024127"/>
+              </a:xfrm>
+              <a:prstGeom prst="rect">
+                <a:avLst/>
+              </a:prstGeom>
+              <a:noFill/>
+            </p:spPr>
+            <p:txBody>
+              <a:bodyPr wrap="square" rtlCol="0">
+                <a:spAutoFit/>
+              </a:bodyPr>
+              <a:lstStyle/>
+              <a:p>
+                <a14:m>
+                  <m:oMath xmlns:m="http://schemas.openxmlformats.org/officeDocument/2006/math">
+                    <m:sSub>
+                      <m:sSubPr>
+                        <m:ctrlPr>
+                          <a:rPr lang="en-US" sz="2800" i="1" smtClean="0">
+                            <a:latin typeface="Cambria Math" panose="02040503050406030204" pitchFamily="18" charset="0"/>
+                          </a:rPr>
+                        </m:ctrlPr>
+                      </m:sSubPr>
+                      <m:e>
+                        <m:r>
+                          <a:rPr lang="it-IT" sz="2800" b="0" i="1" smtClean="0">
+                            <a:latin typeface="Cambria Math" panose="02040503050406030204" pitchFamily="18" charset="0"/>
+                          </a:rPr>
+                          <m:t>𝐼</m:t>
+                        </m:r>
+                      </m:e>
+                      <m:sub>
+                        <m:r>
+                          <a:rPr lang="it-IT" sz="2800" b="0" i="1" smtClean="0">
+                            <a:latin typeface="Cambria Math" panose="02040503050406030204" pitchFamily="18" charset="0"/>
+                          </a:rPr>
+                          <m:t>𝑑𝑠</m:t>
+                        </m:r>
+                      </m:sub>
+                    </m:sSub>
+                    <m:r>
+                      <a:rPr lang="it-IT" sz="2800" b="0" i="0" smtClean="0">
+                        <a:latin typeface="Cambria Math" panose="02040503050406030204" pitchFamily="18" charset="0"/>
+                      </a:rPr>
+                      <m:t>−</m:t>
+                    </m:r>
+                    <m:sSub>
+                      <m:sSubPr>
+                        <m:ctrlPr>
+                          <a:rPr lang="en-US" sz="2800" i="1">
+                            <a:latin typeface="Cambria Math" panose="02040503050406030204" pitchFamily="18" charset="0"/>
+                          </a:rPr>
+                        </m:ctrlPr>
+                      </m:sSubPr>
+                      <m:e>
+                        <m:r>
+                          <a:rPr lang="it-IT" sz="2800" b="0" i="1" smtClean="0">
+                            <a:latin typeface="Cambria Math" panose="02040503050406030204" pitchFamily="18" charset="0"/>
+                          </a:rPr>
+                          <m:t>𝑉</m:t>
+                        </m:r>
+                      </m:e>
+                      <m:sub>
+                        <m:r>
+                          <a:rPr lang="it-IT" sz="2800" b="0" i="1" smtClean="0">
+                            <a:latin typeface="Cambria Math" panose="02040503050406030204" pitchFamily="18" charset="0"/>
+                          </a:rPr>
+                          <m:t>𝑡𝑔</m:t>
+                        </m:r>
+                      </m:sub>
+                    </m:sSub>
+                  </m:oMath>
+                </a14:m>
+                <a:r>
+                  <a:rPr lang="it-IT" sz="2800" dirty="0"/>
+                  <a:t> </a:t>
+                </a:r>
+                <a:r>
+                  <a:rPr lang="en-US" sz="2800" dirty="0"/>
+                  <a:t>curve. Measurements are performed with the back gate </a:t>
+                </a:r>
+                <a:r>
+                  <a:rPr lang="it-IT" sz="2800" dirty="0" err="1"/>
+                  <a:t>grounded</a:t>
+                </a:r>
+                <a:r>
+                  <a:rPr lang="it-IT" sz="2800" dirty="0"/>
+                  <a:t>. </a:t>
+                </a:r>
+                <a14:m>
+                  <m:oMath xmlns:m="http://schemas.openxmlformats.org/officeDocument/2006/math">
+                    <m:sSub>
+                      <m:sSubPr>
+                        <m:ctrlPr>
+                          <a:rPr lang="en-US" sz="2800" i="1">
+                            <a:latin typeface="Cambria Math" panose="02040503050406030204" pitchFamily="18" charset="0"/>
+                          </a:rPr>
+                        </m:ctrlPr>
+                      </m:sSubPr>
+                      <m:e>
+                        <m:r>
+                          <a:rPr lang="it-IT" sz="2800" b="0" i="1" smtClean="0">
+                            <a:latin typeface="Cambria Math" panose="02040503050406030204" pitchFamily="18" charset="0"/>
+                          </a:rPr>
+                          <m:t>𝐼</m:t>
+                        </m:r>
+                      </m:e>
+                      <m:sub>
+                        <m:r>
+                          <a:rPr lang="it-IT" sz="2800" b="0" i="1" smtClean="0">
+                            <a:latin typeface="Cambria Math" panose="02040503050406030204" pitchFamily="18" charset="0"/>
+                          </a:rPr>
+                          <m:t>𝑑𝑠</m:t>
+                        </m:r>
+                      </m:sub>
+                    </m:sSub>
+                  </m:oMath>
+                </a14:m>
+                <a:r>
+                  <a:rPr lang="en-US" sz="2800" dirty="0"/>
+                  <a:t>–</a:t>
+                </a:r>
+                <a14:m>
+                  <m:oMath xmlns:m="http://schemas.openxmlformats.org/officeDocument/2006/math">
+                    <m:sSub>
+                      <m:sSubPr>
+                        <m:ctrlPr>
+                          <a:rPr lang="en-US" sz="2800" i="1">
+                            <a:latin typeface="Cambria Math" panose="02040503050406030204" pitchFamily="18" charset="0"/>
+                          </a:rPr>
+                        </m:ctrlPr>
+                      </m:sSubPr>
+                      <m:e>
+                        <m:r>
+                          <a:rPr lang="it-IT" sz="2800" b="0" i="1" smtClean="0">
+                            <a:latin typeface="Cambria Math" panose="02040503050406030204" pitchFamily="18" charset="0"/>
+                          </a:rPr>
+                          <m:t>𝑉</m:t>
+                        </m:r>
+                      </m:e>
+                      <m:sub>
+                        <m:r>
+                          <a:rPr lang="it-IT" sz="2800" b="0" i="1" smtClean="0">
+                            <a:latin typeface="Cambria Math" panose="02040503050406030204" pitchFamily="18" charset="0"/>
+                          </a:rPr>
+                          <m:t>𝑡𝑔</m:t>
+                        </m:r>
+                      </m:sub>
+                    </m:sSub>
+                  </m:oMath>
+                </a14:m>
+                <a:r>
+                  <a:rPr lang="en-US" sz="2800" dirty="0"/>
+                  <a:t> for values of </a:t>
+                </a:r>
+                <a14:m>
+                  <m:oMath xmlns:m="http://schemas.openxmlformats.org/officeDocument/2006/math">
+                    <m:sSub>
+                      <m:sSubPr>
+                        <m:ctrlPr>
+                          <a:rPr lang="en-US" sz="2800" i="1">
+                            <a:latin typeface="Cambria Math" panose="02040503050406030204" pitchFamily="18" charset="0"/>
+                          </a:rPr>
+                        </m:ctrlPr>
+                      </m:sSubPr>
+                      <m:e>
+                        <m:r>
+                          <a:rPr lang="it-IT" sz="2800" b="0" i="1" smtClean="0">
+                            <a:latin typeface="Cambria Math" panose="02040503050406030204" pitchFamily="18" charset="0"/>
+                          </a:rPr>
+                          <m:t>𝑉</m:t>
+                        </m:r>
+                      </m:e>
+                      <m:sub>
+                        <m:r>
+                          <a:rPr lang="it-IT" sz="2800" b="0" i="1" smtClean="0">
+                            <a:latin typeface="Cambria Math" panose="02040503050406030204" pitchFamily="18" charset="0"/>
+                          </a:rPr>
+                          <m:t>𝑏𝑔</m:t>
+                        </m:r>
+                      </m:sub>
+                    </m:sSub>
+                    <m:r>
+                      <a:rPr lang="en-US" sz="2800" i="1">
+                        <a:latin typeface="Cambria Math" panose="02040503050406030204" pitchFamily="18" charset="0"/>
+                      </a:rPr>
+                      <m:t> </m:t>
+                    </m:r>
+                  </m:oMath>
+                </a14:m>
+                <a:r>
+                  <a:rPr lang="en-US" sz="2800" dirty="0"/>
+                  <a:t>=–10, –5, 0, 5 and 10 V.</a:t>
+                </a:r>
+                <a:endParaRPr lang="it-IT" sz="2800" dirty="0"/>
+              </a:p>
+            </p:txBody>
+          </p:sp>
+        </mc:Choice>
+        <mc:Fallback xmlns="">
+          <p:sp>
+            <p:nvSpPr>
+              <p:cNvPr id="8" name="CasellaDiTesto 7">
+                <a:extLst>
+                  <a:ext uri="{FF2B5EF4-FFF2-40B4-BE49-F238E27FC236}">
+                    <a16:creationId xmlns:a16="http://schemas.microsoft.com/office/drawing/2014/main" id="{ECD81CD1-B376-4951-8157-577E18092CE9}"/>
+                  </a:ext>
+                </a:extLst>
+              </p:cNvPr>
+              <p:cNvSpPr txBox="1">
+                <a:spLocks noRot="1" noChangeAspect="1" noMove="1" noResize="1" noEditPoints="1" noAdjustHandles="1" noChangeArrowheads="1" noChangeShapeType="1" noTextEdit="1"/>
+              </p:cNvSpPr>
+              <p:nvPr/>
+            </p:nvSpPr>
+            <p:spPr>
+              <a:xfrm>
+                <a:off x="772732" y="90153"/>
+                <a:ext cx="10740981" cy="1024127"/>
+              </a:xfrm>
+              <a:prstGeom prst="rect">
+                <a:avLst/>
+              </a:prstGeom>
+              <a:blipFill>
+                <a:blip r:embed="rId4"/>
+                <a:stretch>
+                  <a:fillRect l="-1192" t="-5952" b="-13095"/>
+                </a:stretch>
+              </a:blipFill>
+            </p:spPr>
+            <p:txBody>
+              <a:bodyPr/>
+              <a:lstStyle/>
+              <a:p>
+                <a:r>
+                  <a:rPr lang="it-IT">
+                    <a:noFill/>
+                  </a:rPr>
+                  <a:t> </a:t>
+                </a:r>
+              </a:p>
+            </p:txBody>
+          </p:sp>
+        </mc:Fallback>
+      </mc:AlternateContent>
+    </p:spTree>
+    <p:extLst>
+      <p:ext uri="{BB962C8B-B14F-4D97-AF65-F5344CB8AC3E}">
+        <p14:creationId xmlns:p14="http://schemas.microsoft.com/office/powerpoint/2010/main" val="184799789"/>
+      </p:ext>
+    </p:extLst>
+  </p:cSld>
+  <p:clrMapOvr>
+    <a:masterClrMapping/>
+  </p:clrMapOvr>
+</p:sld>
+</file>
+
+<file path=ppt/slides/slide11.xml><?xml version="1.0" encoding="utf-8"?>
+<p:sld xmlns:a="http://schemas.openxmlformats.org/drawingml/2006/main" xmlns:r="http://schemas.openxmlformats.org/officeDocument/2006/relationships" xmlns:p="http://schemas.openxmlformats.org/presentationml/2006/main">
+  <p:cSld>
+    <p:spTree>
+      <p:nvGrpSpPr>
+        <p:cNvPr id="1" name=""/>
+        <p:cNvGrpSpPr/>
+        <p:nvPr/>
+      </p:nvGrpSpPr>
+      <p:grpSpPr>
+        <a:xfrm>
+          <a:off x="0" y="0"/>
+          <a:ext cx="0" cy="0"/>
+          <a:chOff x="0" y="0"/>
+          <a:chExt cx="0" cy="0"/>
+        </a:xfrm>
+      </p:grpSpPr>
+      <p:pic>
+        <p:nvPicPr>
+          <p:cNvPr id="3" name="Immagine 2" descr="Immagine che contiene mappa, testo&#10;&#10;Descrizione generata automaticamente">
+            <a:extLst>
+              <a:ext uri="{FF2B5EF4-FFF2-40B4-BE49-F238E27FC236}">
+                <a16:creationId xmlns:a16="http://schemas.microsoft.com/office/drawing/2014/main" id="{AAB1280C-8D08-489C-BEB3-30FF5F208E60}"/>
+              </a:ext>
+            </a:extLst>
+          </p:cNvPr>
+          <p:cNvPicPr>
+            <a:picLocks noChangeAspect="1"/>
+          </p:cNvPicPr>
+          <p:nvPr/>
+        </p:nvPicPr>
+        <p:blipFill>
+          <a:blip r:embed="rId2">
+            <a:extLst>
+              <a:ext uri="{28A0092B-C50C-407E-A947-70E740481C1C}">
+                <a14:useLocalDpi xmlns:a14="http://schemas.microsoft.com/office/drawing/2010/main" val="0"/>
+              </a:ext>
+            </a:extLst>
+          </a:blip>
+          <a:stretch>
+            <a:fillRect/>
+          </a:stretch>
+        </p:blipFill>
+        <p:spPr>
+          <a:xfrm>
+            <a:off x="6720566" y="1872117"/>
+            <a:ext cx="5471434" cy="3113765"/>
+          </a:xfrm>
+          <a:prstGeom prst="rect">
+            <a:avLst/>
+          </a:prstGeom>
+        </p:spPr>
+      </p:pic>
+      <p:pic>
+        <p:nvPicPr>
+          <p:cNvPr id="7" name="Immagine 6" descr="Immagine che contiene testo, mappa, tavolo&#10;&#10;Descrizione generata automaticamente">
+            <a:extLst>
+              <a:ext uri="{FF2B5EF4-FFF2-40B4-BE49-F238E27FC236}">
+                <a16:creationId xmlns:a16="http://schemas.microsoft.com/office/drawing/2014/main" id="{5C9AC49E-B754-4455-A816-767C0DED6774}"/>
+              </a:ext>
+            </a:extLst>
+          </p:cNvPr>
+          <p:cNvPicPr>
+            <a:picLocks noChangeAspect="1"/>
+          </p:cNvPicPr>
+          <p:nvPr/>
+        </p:nvPicPr>
+        <p:blipFill>
+          <a:blip r:embed="rId3">
+            <a:extLst>
+              <a:ext uri="{28A0092B-C50C-407E-A947-70E740481C1C}">
+                <a14:useLocalDpi xmlns:a14="http://schemas.microsoft.com/office/drawing/2010/main" val="0"/>
+              </a:ext>
+            </a:extLst>
+          </a:blip>
+          <a:stretch>
+            <a:fillRect/>
+          </a:stretch>
+        </p:blipFill>
+        <p:spPr>
+          <a:xfrm>
+            <a:off x="0" y="1537266"/>
+            <a:ext cx="6659495" cy="3538768"/>
+          </a:xfrm>
+          <a:prstGeom prst="rect">
+            <a:avLst/>
+          </a:prstGeom>
+        </p:spPr>
+      </p:pic>
+      <mc:AlternateContent xmlns:mc="http://schemas.openxmlformats.org/markup-compatibility/2006" xmlns:a14="http://schemas.microsoft.com/office/drawing/2010/main">
+        <mc:Choice Requires="a14">
+          <p:sp>
+            <p:nvSpPr>
+              <p:cNvPr id="8" name="CasellaDiTesto 7">
+                <a:extLst>
+                  <a:ext uri="{FF2B5EF4-FFF2-40B4-BE49-F238E27FC236}">
+                    <a16:creationId xmlns:a16="http://schemas.microsoft.com/office/drawing/2014/main" id="{FB87B9F4-35C1-4DD5-93DB-ACC2C9859F9B}"/>
+                  </a:ext>
+                </a:extLst>
+              </p:cNvPr>
+              <p:cNvSpPr txBox="1"/>
+              <p:nvPr/>
+            </p:nvSpPr>
+            <p:spPr>
+              <a:xfrm>
+                <a:off x="1530380" y="218941"/>
+                <a:ext cx="8862871" cy="558230"/>
+              </a:xfrm>
+              <a:prstGeom prst="rect">
+                <a:avLst/>
+              </a:prstGeom>
+              <a:noFill/>
+            </p:spPr>
+            <p:txBody>
+              <a:bodyPr wrap="square" rtlCol="0">
+                <a:spAutoFit/>
+              </a:bodyPr>
+              <a:lstStyle/>
+              <a:p>
+                <a14:m>
+                  <m:oMath xmlns:m="http://schemas.openxmlformats.org/officeDocument/2006/math">
+                    <m:sSub>
+                      <m:sSubPr>
+                        <m:ctrlPr>
+                          <a:rPr lang="en-US" sz="2800" i="1" smtClean="0">
+                            <a:latin typeface="Cambria Math" panose="02040503050406030204" pitchFamily="18" charset="0"/>
+                          </a:rPr>
+                        </m:ctrlPr>
+                      </m:sSubPr>
+                      <m:e>
+                        <m:r>
+                          <a:rPr lang="it-IT" sz="2800" b="0" i="1" smtClean="0">
+                            <a:latin typeface="Cambria Math" panose="02040503050406030204" pitchFamily="18" charset="0"/>
+                          </a:rPr>
+                          <m:t>𝐼</m:t>
+                        </m:r>
+                      </m:e>
+                      <m:sub>
+                        <m:r>
+                          <a:rPr lang="it-IT" sz="2800" b="0" i="1" smtClean="0">
+                            <a:latin typeface="Cambria Math" panose="02040503050406030204" pitchFamily="18" charset="0"/>
+                          </a:rPr>
+                          <m:t>𝑑𝑠</m:t>
+                        </m:r>
+                      </m:sub>
+                    </m:sSub>
+                    <m:r>
+                      <a:rPr lang="it-IT" sz="2800" b="0" i="0" smtClean="0">
+                        <a:latin typeface="Cambria Math" panose="02040503050406030204" pitchFamily="18" charset="0"/>
+                      </a:rPr>
+                      <m:t>−</m:t>
+                    </m:r>
+                    <m:sSub>
+                      <m:sSubPr>
+                        <m:ctrlPr>
+                          <a:rPr lang="en-US" sz="2800" i="1">
+                            <a:latin typeface="Cambria Math" panose="02040503050406030204" pitchFamily="18" charset="0"/>
+                          </a:rPr>
+                        </m:ctrlPr>
+                      </m:sSubPr>
+                      <m:e>
+                        <m:r>
+                          <a:rPr lang="it-IT" sz="2800" b="0" i="1" smtClean="0">
+                            <a:latin typeface="Cambria Math" panose="02040503050406030204" pitchFamily="18" charset="0"/>
+                          </a:rPr>
+                          <m:t>𝑉</m:t>
+                        </m:r>
+                      </m:e>
+                      <m:sub>
+                        <m:r>
+                          <a:rPr lang="it-IT" sz="2800" b="0" i="1" smtClean="0">
+                            <a:latin typeface="Cambria Math" panose="02040503050406030204" pitchFamily="18" charset="0"/>
+                          </a:rPr>
+                          <m:t>𝑑𝑠</m:t>
+                        </m:r>
+                      </m:sub>
+                    </m:sSub>
+                  </m:oMath>
+                </a14:m>
+                <a:r>
+                  <a:rPr lang="it-IT" sz="2800" dirty="0"/>
+                  <a:t> </a:t>
+                </a:r>
+                <a:r>
+                  <a:rPr lang="en-US" sz="2800" dirty="0"/>
+                  <a:t>curves recorded for different values of </a:t>
+                </a:r>
+                <a14:m>
+                  <m:oMath xmlns:m="http://schemas.openxmlformats.org/officeDocument/2006/math">
+                    <m:sSub>
+                      <m:sSubPr>
+                        <m:ctrlPr>
+                          <a:rPr lang="en-US" sz="2800" i="1">
+                            <a:latin typeface="Cambria Math" panose="02040503050406030204" pitchFamily="18" charset="0"/>
+                          </a:rPr>
+                        </m:ctrlPr>
+                      </m:sSubPr>
+                      <m:e>
+                        <m:r>
+                          <a:rPr lang="it-IT" sz="2800" b="0" i="1" smtClean="0">
+                            <a:latin typeface="Cambria Math" panose="02040503050406030204" pitchFamily="18" charset="0"/>
+                          </a:rPr>
+                          <m:t>𝑉</m:t>
+                        </m:r>
+                      </m:e>
+                      <m:sub>
+                        <m:r>
+                          <a:rPr lang="it-IT" sz="2800" b="0" i="1" smtClean="0">
+                            <a:latin typeface="Cambria Math" panose="02040503050406030204" pitchFamily="18" charset="0"/>
+                          </a:rPr>
+                          <m:t>𝑡𝑔</m:t>
+                        </m:r>
+                      </m:sub>
+                    </m:sSub>
+                  </m:oMath>
+                </a14:m>
+                <a:r>
+                  <a:rPr lang="en-US" sz="2800" dirty="0"/>
+                  <a:t>.</a:t>
+                </a:r>
+                <a:endParaRPr lang="it-IT" sz="2800" dirty="0"/>
+              </a:p>
+            </p:txBody>
+          </p:sp>
+        </mc:Choice>
+        <mc:Fallback xmlns="">
+          <p:sp>
+            <p:nvSpPr>
+              <p:cNvPr id="8" name="CasellaDiTesto 7">
+                <a:extLst>
+                  <a:ext uri="{FF2B5EF4-FFF2-40B4-BE49-F238E27FC236}">
+                    <a16:creationId xmlns:a16="http://schemas.microsoft.com/office/drawing/2014/main" id="{FB87B9F4-35C1-4DD5-93DB-ACC2C9859F9B}"/>
+                  </a:ext>
+                </a:extLst>
+              </p:cNvPr>
+              <p:cNvSpPr txBox="1">
+                <a:spLocks noRot="1" noChangeAspect="1" noMove="1" noResize="1" noEditPoints="1" noAdjustHandles="1" noChangeArrowheads="1" noChangeShapeType="1" noTextEdit="1"/>
+              </p:cNvSpPr>
+              <p:nvPr/>
+            </p:nvSpPr>
+            <p:spPr>
+              <a:xfrm>
+                <a:off x="1530380" y="218941"/>
+                <a:ext cx="8862871" cy="558230"/>
+              </a:xfrm>
+              <a:prstGeom prst="rect">
+                <a:avLst/>
+              </a:prstGeom>
+              <a:blipFill>
+                <a:blip r:embed="rId4"/>
+                <a:stretch>
+                  <a:fillRect t="-10989" b="-25275"/>
+                </a:stretch>
+              </a:blipFill>
+            </p:spPr>
+            <p:txBody>
+              <a:bodyPr/>
+              <a:lstStyle/>
+              <a:p>
+                <a:r>
+                  <a:rPr lang="it-IT">
+                    <a:noFill/>
+                  </a:rPr>
+                  <a:t> </a:t>
+                </a:r>
+              </a:p>
+            </p:txBody>
+          </p:sp>
+        </mc:Fallback>
+      </mc:AlternateContent>
+    </p:spTree>
+    <p:extLst>
+      <p:ext uri="{BB962C8B-B14F-4D97-AF65-F5344CB8AC3E}">
+        <p14:creationId xmlns:p14="http://schemas.microsoft.com/office/powerpoint/2010/main" val="4168825037"/>
       </p:ext>
     </p:extLst>
   </p:cSld>
@@ -3576,10 +4224,10 @@
       </p:grpSpPr>
       <p:pic>
         <p:nvPicPr>
-          <p:cNvPr id="5" name="Immagine 4" descr="Immagine che contiene testo, mappa&#10;&#10;Descrizione generata automaticamente">
-            <a:extLst>
-              <a:ext uri="{FF2B5EF4-FFF2-40B4-BE49-F238E27FC236}">
-                <a16:creationId xmlns:a16="http://schemas.microsoft.com/office/drawing/2014/main" id="{EAE9D030-87BF-426C-937A-5CFA04FBE6A6}"/>
+          <p:cNvPr id="3" name="Immagine 2" descr="Immagine che contiene testo&#10;&#10;Descrizione generata automaticamente">
+            <a:extLst>
+              <a:ext uri="{FF2B5EF4-FFF2-40B4-BE49-F238E27FC236}">
+                <a16:creationId xmlns:a16="http://schemas.microsoft.com/office/drawing/2014/main" id="{A98630E4-0129-48C1-890E-0B41A6116314}"/>
               </a:ext>
             </a:extLst>
           </p:cNvPr>
@@ -3602,20 +4250,149 @@
         </p:blipFill>
         <p:spPr>
           <a:xfrm>
-            <a:off x="1999895" y="290656"/>
-            <a:ext cx="3391255" cy="3105475"/>
+            <a:off x="7428218" y="1257008"/>
+            <a:ext cx="4763781" cy="4343984"/>
           </a:xfrm>
           <a:prstGeom prst="rect">
             <a:avLst/>
           </a:prstGeom>
         </p:spPr>
       </p:pic>
+      <mc:AlternateContent xmlns:mc="http://schemas.openxmlformats.org/markup-compatibility/2006">
+        <mc:Choice xmlns:a14="http://schemas.microsoft.com/office/drawing/2010/main" Requires="a14">
+          <p:sp>
+            <p:nvSpPr>
+              <p:cNvPr id="4" name="CasellaDiTesto 3">
+                <a:extLst>
+                  <a:ext uri="{FF2B5EF4-FFF2-40B4-BE49-F238E27FC236}">
+                    <a16:creationId xmlns:a16="http://schemas.microsoft.com/office/drawing/2014/main" id="{DC8110F5-800E-46F4-BF0A-769A85787E1A}"/>
+                  </a:ext>
+                </a:extLst>
+              </p:cNvPr>
+              <p:cNvSpPr txBox="1"/>
+              <p:nvPr/>
+            </p:nvSpPr>
+            <p:spPr>
+              <a:xfrm>
+                <a:off x="1851338" y="206777"/>
+                <a:ext cx="8489324" cy="558230"/>
+              </a:xfrm>
+              <a:prstGeom prst="rect">
+                <a:avLst/>
+              </a:prstGeom>
+              <a:noFill/>
+            </p:spPr>
+            <p:txBody>
+              <a:bodyPr wrap="square" rtlCol="0">
+                <a:spAutoFit/>
+              </a:bodyPr>
+              <a:lstStyle/>
+              <a:p>
+                <a:r>
+                  <a:rPr lang="en-US" sz="2800" dirty="0"/>
+                  <a:t>Output characteristics when </a:t>
+                </a:r>
+                <a14:m>
+                  <m:oMath xmlns:m="http://schemas.openxmlformats.org/officeDocument/2006/math">
+                    <m:sSub>
+                      <m:sSubPr>
+                        <m:ctrlPr>
+                          <a:rPr lang="en-US" sz="2800" i="1">
+                            <a:latin typeface="Cambria Math" panose="02040503050406030204" pitchFamily="18" charset="0"/>
+                          </a:rPr>
+                        </m:ctrlPr>
+                      </m:sSubPr>
+                      <m:e>
+                        <m:r>
+                          <a:rPr lang="it-IT" sz="2800" i="1">
+                            <a:latin typeface="Cambria Math" panose="02040503050406030204" pitchFamily="18" charset="0"/>
+                          </a:rPr>
+                          <m:t>𝑉</m:t>
+                        </m:r>
+                      </m:e>
+                      <m:sub>
+                        <m:r>
+                          <a:rPr lang="it-IT" sz="2800" b="0" i="1" smtClean="0">
+                            <a:latin typeface="Cambria Math" panose="02040503050406030204" pitchFamily="18" charset="0"/>
+                          </a:rPr>
+                          <m:t>𝑔</m:t>
+                        </m:r>
+                      </m:sub>
+                    </m:sSub>
+                    <m:r>
+                      <a:rPr lang="it-IT" sz="2800" b="0" i="1" smtClean="0">
+                        <a:latin typeface="Cambria Math" panose="02040503050406030204" pitchFamily="18" charset="0"/>
+                      </a:rPr>
+                      <m:t>=10</m:t>
+                    </m:r>
+                    <m:r>
+                      <a:rPr lang="it-IT" sz="2800" b="0" i="1" smtClean="0">
+                        <a:latin typeface="Cambria Math" panose="02040503050406030204" pitchFamily="18" charset="0"/>
+                      </a:rPr>
+                      <m:t>𝑉</m:t>
+                    </m:r>
+                  </m:oMath>
+                </a14:m>
+                <a:r>
+                  <a:rPr lang="en-US" sz="2800" dirty="0"/>
+                  <a:t> for a 1L thick FET. </a:t>
+                </a:r>
+                <a:endParaRPr lang="it-IT" sz="2800" dirty="0"/>
+              </a:p>
+            </p:txBody>
+          </p:sp>
+        </mc:Choice>
+        <mc:Fallback>
+          <p:sp>
+            <p:nvSpPr>
+              <p:cNvPr id="4" name="CasellaDiTesto 3">
+                <a:extLst>
+                  <a:ext uri="{FF2B5EF4-FFF2-40B4-BE49-F238E27FC236}">
+                    <a16:creationId xmlns:a16="http://schemas.microsoft.com/office/drawing/2014/main" id="{DC8110F5-800E-46F4-BF0A-769A85787E1A}"/>
+                  </a:ext>
+                </a:extLst>
+              </p:cNvPr>
+              <p:cNvSpPr txBox="1">
+                <a:spLocks noRot="1" noChangeAspect="1" noMove="1" noResize="1" noEditPoints="1" noAdjustHandles="1" noChangeArrowheads="1" noChangeShapeType="1" noTextEdit="1"/>
+              </p:cNvSpPr>
+              <p:nvPr/>
+            </p:nvSpPr>
+            <p:spPr>
+              <a:xfrm>
+                <a:off x="1851338" y="206777"/>
+                <a:ext cx="8489324" cy="558230"/>
+              </a:xfrm>
+              <a:prstGeom prst="rect">
+                <a:avLst/>
+              </a:prstGeom>
+              <a:blipFill>
+                <a:blip r:embed="rId3"/>
+                <a:stretch>
+                  <a:fillRect l="-1509" t="-10989" r="-431" b="-25275"/>
+                </a:stretch>
+              </a:blipFill>
+            </p:spPr>
+            <p:txBody>
+              <a:bodyPr/>
+              <a:lstStyle/>
+              <a:p>
+                <a:r>
+                  <a:rPr lang="it-IT">
+                    <a:noFill/>
+                  </a:rPr>
+                  <a:t> </a:t>
+                </a:r>
+              </a:p>
+            </p:txBody>
+          </p:sp>
+        </mc:Fallback>
+      </mc:AlternateContent>
       <p:pic>
         <p:nvPicPr>
-          <p:cNvPr id="7" name="Immagine 6" descr="Immagine che contiene mappa&#10;&#10;Descrizione generata automaticamente">
-            <a:extLst>
-              <a:ext uri="{FF2B5EF4-FFF2-40B4-BE49-F238E27FC236}">
-                <a16:creationId xmlns:a16="http://schemas.microsoft.com/office/drawing/2014/main" id="{6D9FAB28-C386-48E6-887D-DDDFE659993E}"/>
+          <p:cNvPr id="8" name="Immagine 7">
+            <a:extLst>
+              <a:ext uri="{FF2B5EF4-FFF2-40B4-BE49-F238E27FC236}">
+                <a16:creationId xmlns:a16="http://schemas.microsoft.com/office/drawing/2014/main" id="{7BF6B202-FC99-4204-8F3A-EBC552793F88}"/>
               </a:ext>
             </a:extLst>
           </p:cNvPr>
@@ -3625,7 +4402,7 @@
           <p:nvPr/>
         </p:nvPicPr>
         <p:blipFill>
-          <a:blip r:embed="rId3">
+          <a:blip r:embed="rId4">
             <a:extLst>
               <a:ext uri="{28A0092B-C50C-407E-A947-70E740481C1C}">
                 <a14:useLocalDpi xmlns:a14="http://schemas.microsoft.com/office/drawing/2010/main" val="0"/>
@@ -3638,43 +4415,8 @@
         </p:blipFill>
         <p:spPr>
           <a:xfrm>
-            <a:off x="961839" y="3545740"/>
-            <a:ext cx="5791200" cy="3077368"/>
-          </a:xfrm>
-          <a:prstGeom prst="rect">
-            <a:avLst/>
-          </a:prstGeom>
-        </p:spPr>
-      </p:pic>
-      <p:pic>
-        <p:nvPicPr>
-          <p:cNvPr id="9" name="Immagine 8" descr="Immagine che contiene testo, mappa&#10;&#10;Descrizione generata automaticamente">
-            <a:extLst>
-              <a:ext uri="{FF2B5EF4-FFF2-40B4-BE49-F238E27FC236}">
-                <a16:creationId xmlns:a16="http://schemas.microsoft.com/office/drawing/2014/main" id="{BA36F45D-762F-4018-8908-FA5ACE7A3CE8}"/>
-              </a:ext>
-            </a:extLst>
-          </p:cNvPr>
-          <p:cNvPicPr>
-            <a:picLocks noChangeAspect="1"/>
-          </p:cNvPicPr>
-          <p:nvPr/>
-        </p:nvPicPr>
-        <p:blipFill rotWithShape="1">
-          <a:blip r:embed="rId4">
-            <a:extLst>
-              <a:ext uri="{28A0092B-C50C-407E-A947-70E740481C1C}">
-                <a14:useLocalDpi xmlns:a14="http://schemas.microsoft.com/office/drawing/2010/main" val="0"/>
-              </a:ext>
-            </a:extLst>
-          </a:blip>
-          <a:srcRect l="50000"/>
-          <a:stretch/>
-        </p:blipFill>
-        <p:spPr>
-          <a:xfrm>
-            <a:off x="8114928" y="585114"/>
-            <a:ext cx="3295935" cy="5921253"/>
+            <a:off x="0" y="1360096"/>
+            <a:ext cx="7428218" cy="3947258"/>
           </a:xfrm>
           <a:prstGeom prst="rect">
             <a:avLst/>
@@ -3713,10 +4455,10 @@
       </p:grpSpPr>
       <p:pic>
         <p:nvPicPr>
-          <p:cNvPr id="2" name="Immagine 1" descr="Immagine che contiene testo, mappa&#10;&#10;Descrizione generata automaticamente">
-            <a:extLst>
-              <a:ext uri="{FF2B5EF4-FFF2-40B4-BE49-F238E27FC236}">
-                <a16:creationId xmlns:a16="http://schemas.microsoft.com/office/drawing/2014/main" id="{FF34E5F1-9326-48BF-BC77-1FCE7AE2CD65}"/>
+          <p:cNvPr id="3" name="Immagine 2" descr="Immagine che contiene testo, mappa&#10;&#10;Descrizione generata automaticamente">
+            <a:extLst>
+              <a:ext uri="{FF2B5EF4-FFF2-40B4-BE49-F238E27FC236}">
+                <a16:creationId xmlns:a16="http://schemas.microsoft.com/office/drawing/2014/main" id="{752C41D0-FB7C-472D-9B47-3D3411038B50}"/>
               </a:ext>
             </a:extLst>
           </p:cNvPr>
@@ -3725,7 +4467,7 @@
           </p:cNvPicPr>
           <p:nvPr/>
         </p:nvPicPr>
-        <p:blipFill rotWithShape="1">
+        <p:blipFill>
           <a:blip r:embed="rId2">
             <a:extLst>
               <a:ext uri="{28A0092B-C50C-407E-A947-70E740481C1C}">
@@ -3733,13 +4475,500 @@
               </a:ext>
             </a:extLst>
           </a:blip>
-          <a:srcRect r="50000"/>
-          <a:stretch/>
+          <a:stretch>
+            <a:fillRect/>
+          </a:stretch>
         </p:blipFill>
         <p:spPr>
           <a:xfrm>
-            <a:off x="7719682" y="468373"/>
-            <a:ext cx="3295936" cy="5921253"/>
+            <a:off x="7503977" y="1453479"/>
+            <a:ext cx="4688023" cy="4261839"/>
+          </a:xfrm>
+          <a:prstGeom prst="rect">
+            <a:avLst/>
+          </a:prstGeom>
+        </p:spPr>
+      </p:pic>
+      <mc:AlternateContent xmlns:mc="http://schemas.openxmlformats.org/markup-compatibility/2006">
+        <mc:Choice xmlns:a14="http://schemas.microsoft.com/office/drawing/2010/main" Requires="a14">
+          <p:sp>
+            <p:nvSpPr>
+              <p:cNvPr id="4" name="CasellaDiTesto 3">
+                <a:extLst>
+                  <a:ext uri="{FF2B5EF4-FFF2-40B4-BE49-F238E27FC236}">
+                    <a16:creationId xmlns:a16="http://schemas.microsoft.com/office/drawing/2014/main" id="{38A1F76B-707B-4CF4-BE8C-1BC6BB4AE17B}"/>
+                  </a:ext>
+                </a:extLst>
+              </p:cNvPr>
+              <p:cNvSpPr txBox="1"/>
+              <p:nvPr/>
+            </p:nvSpPr>
+            <p:spPr>
+              <a:xfrm>
+                <a:off x="1515413" y="412123"/>
+                <a:ext cx="9161173" cy="523220"/>
+              </a:xfrm>
+              <a:prstGeom prst="rect">
+                <a:avLst/>
+              </a:prstGeom>
+              <a:noFill/>
+            </p:spPr>
+            <p:txBody>
+              <a:bodyPr wrap="square" rtlCol="0">
+                <a:spAutoFit/>
+              </a:bodyPr>
+              <a:lstStyle/>
+              <a:p>
+                <a:r>
+                  <a:rPr lang="en-US" sz="2800" dirty="0"/>
+                  <a:t>Transfer characteristics when </a:t>
+                </a:r>
+                <a14:m>
+                  <m:oMath xmlns:m="http://schemas.openxmlformats.org/officeDocument/2006/math">
+                    <m:sSub>
+                      <m:sSubPr>
+                        <m:ctrlPr>
+                          <a:rPr lang="en-US" sz="2800" i="1">
+                            <a:latin typeface="Cambria Math" panose="02040503050406030204" pitchFamily="18" charset="0"/>
+                          </a:rPr>
+                        </m:ctrlPr>
+                      </m:sSubPr>
+                      <m:e>
+                        <m:r>
+                          <a:rPr lang="it-IT" sz="2800" i="1">
+                            <a:latin typeface="Cambria Math" panose="02040503050406030204" pitchFamily="18" charset="0"/>
+                          </a:rPr>
+                          <m:t>𝑉</m:t>
+                        </m:r>
+                      </m:e>
+                      <m:sub>
+                        <m:r>
+                          <a:rPr lang="it-IT" sz="2800" b="0" i="1" smtClean="0">
+                            <a:latin typeface="Cambria Math" panose="02040503050406030204" pitchFamily="18" charset="0"/>
+                          </a:rPr>
+                          <m:t>𝑑</m:t>
+                        </m:r>
+                      </m:sub>
+                    </m:sSub>
+                    <m:r>
+                      <a:rPr lang="it-IT" sz="2800" i="1">
+                        <a:latin typeface="Cambria Math" panose="02040503050406030204" pitchFamily="18" charset="0"/>
+                      </a:rPr>
+                      <m:t>=</m:t>
+                    </m:r>
+                    <m:r>
+                      <a:rPr lang="it-IT" sz="2800" b="0" i="1" smtClean="0">
+                        <a:latin typeface="Cambria Math" panose="02040503050406030204" pitchFamily="18" charset="0"/>
+                      </a:rPr>
+                      <m:t>0.05 </m:t>
+                    </m:r>
+                    <m:r>
+                      <a:rPr lang="it-IT" sz="2800" i="1">
+                        <a:latin typeface="Cambria Math" panose="02040503050406030204" pitchFamily="18" charset="0"/>
+                      </a:rPr>
+                      <m:t>𝑉</m:t>
+                    </m:r>
+                  </m:oMath>
+                </a14:m>
+                <a:r>
+                  <a:rPr lang="en-US" sz="2800" dirty="0"/>
+                  <a:t> for a 1L thick FET.</a:t>
+                </a:r>
+                <a:endParaRPr lang="it-IT" sz="2800" dirty="0"/>
+              </a:p>
+            </p:txBody>
+          </p:sp>
+        </mc:Choice>
+        <mc:Fallback>
+          <p:sp>
+            <p:nvSpPr>
+              <p:cNvPr id="4" name="CasellaDiTesto 3">
+                <a:extLst>
+                  <a:ext uri="{FF2B5EF4-FFF2-40B4-BE49-F238E27FC236}">
+                    <a16:creationId xmlns:a16="http://schemas.microsoft.com/office/drawing/2014/main" id="{38A1F76B-707B-4CF4-BE8C-1BC6BB4AE17B}"/>
+                  </a:ext>
+                </a:extLst>
+              </p:cNvPr>
+              <p:cNvSpPr txBox="1">
+                <a:spLocks noRot="1" noChangeAspect="1" noMove="1" noResize="1" noEditPoints="1" noAdjustHandles="1" noChangeArrowheads="1" noChangeShapeType="1" noTextEdit="1"/>
+              </p:cNvSpPr>
+              <p:nvPr/>
+            </p:nvSpPr>
+            <p:spPr>
+              <a:xfrm>
+                <a:off x="1515413" y="412123"/>
+                <a:ext cx="9161173" cy="523220"/>
+              </a:xfrm>
+              <a:prstGeom prst="rect">
+                <a:avLst/>
+              </a:prstGeom>
+              <a:blipFill>
+                <a:blip r:embed="rId3"/>
+                <a:stretch>
+                  <a:fillRect l="-1398" t="-11765" b="-34118"/>
+                </a:stretch>
+              </a:blipFill>
+            </p:spPr>
+            <p:txBody>
+              <a:bodyPr/>
+              <a:lstStyle/>
+              <a:p>
+                <a:r>
+                  <a:rPr lang="it-IT">
+                    <a:noFill/>
+                  </a:rPr>
+                  <a:t> </a:t>
+                </a:r>
+              </a:p>
+            </p:txBody>
+          </p:sp>
+        </mc:Fallback>
+      </mc:AlternateContent>
+      <p:pic>
+        <p:nvPicPr>
+          <p:cNvPr id="6" name="Immagine 5">
+            <a:extLst>
+              <a:ext uri="{FF2B5EF4-FFF2-40B4-BE49-F238E27FC236}">
+                <a16:creationId xmlns:a16="http://schemas.microsoft.com/office/drawing/2014/main" id="{DEF62BCA-CE68-4B66-99B2-B41FB5E5D1F2}"/>
+              </a:ext>
+            </a:extLst>
+          </p:cNvPr>
+          <p:cNvPicPr>
+            <a:picLocks noChangeAspect="1"/>
+          </p:cNvPicPr>
+          <p:nvPr/>
+        </p:nvPicPr>
+        <p:blipFill>
+          <a:blip r:embed="rId4">
+            <a:extLst>
+              <a:ext uri="{28A0092B-C50C-407E-A947-70E740481C1C}">
+                <a14:useLocalDpi xmlns:a14="http://schemas.microsoft.com/office/drawing/2010/main" val="0"/>
+              </a:ext>
+            </a:extLst>
+          </a:blip>
+          <a:stretch>
+            <a:fillRect/>
+          </a:stretch>
+        </p:blipFill>
+        <p:spPr>
+          <a:xfrm>
+            <a:off x="0" y="1608879"/>
+            <a:ext cx="7435335" cy="3951040"/>
+          </a:xfrm>
+          <a:prstGeom prst="rect">
+            <a:avLst/>
+          </a:prstGeom>
+        </p:spPr>
+      </p:pic>
+    </p:spTree>
+    <p:extLst>
+      <p:ext uri="{BB962C8B-B14F-4D97-AF65-F5344CB8AC3E}">
+        <p14:creationId xmlns:p14="http://schemas.microsoft.com/office/powerpoint/2010/main" val="1066051245"/>
+      </p:ext>
+    </p:extLst>
+  </p:cSld>
+  <p:clrMapOvr>
+    <a:masterClrMapping/>
+  </p:clrMapOvr>
+</p:sld>
+</file>
+
+<file path=ppt/slides/slide4.xml><?xml version="1.0" encoding="utf-8"?>
+<p:sld xmlns:a="http://schemas.openxmlformats.org/drawingml/2006/main" xmlns:r="http://schemas.openxmlformats.org/officeDocument/2006/relationships" xmlns:p="http://schemas.openxmlformats.org/presentationml/2006/main">
+  <p:cSld>
+    <p:spTree>
+      <p:nvGrpSpPr>
+        <p:cNvPr id="1" name=""/>
+        <p:cNvGrpSpPr/>
+        <p:nvPr/>
+      </p:nvGrpSpPr>
+      <p:grpSpPr>
+        <a:xfrm>
+          <a:off x="0" y="0"/>
+          <a:ext cx="0" cy="0"/>
+          <a:chOff x="0" y="0"/>
+          <a:chExt cx="0" cy="0"/>
+        </a:xfrm>
+      </p:grpSpPr>
+      <p:pic>
+        <p:nvPicPr>
+          <p:cNvPr id="5" name="Immagine 4" descr="Immagine che contiene mappa, testo&#10;&#10;Descrizione generata automaticamente">
+            <a:extLst>
+              <a:ext uri="{FF2B5EF4-FFF2-40B4-BE49-F238E27FC236}">
+                <a16:creationId xmlns:a16="http://schemas.microsoft.com/office/drawing/2014/main" id="{39CB754B-F5DD-44CE-8F6F-49A401AD39F1}"/>
+              </a:ext>
+            </a:extLst>
+          </p:cNvPr>
+          <p:cNvPicPr>
+            <a:picLocks noChangeAspect="1"/>
+          </p:cNvPicPr>
+          <p:nvPr/>
+        </p:nvPicPr>
+        <p:blipFill>
+          <a:blip r:embed="rId2">
+            <a:extLst>
+              <a:ext uri="{28A0092B-C50C-407E-A947-70E740481C1C}">
+                <a14:useLocalDpi xmlns:a14="http://schemas.microsoft.com/office/drawing/2010/main" val="0"/>
+              </a:ext>
+            </a:extLst>
+          </a:blip>
+          <a:stretch>
+            <a:fillRect/>
+          </a:stretch>
+        </p:blipFill>
+        <p:spPr>
+          <a:xfrm>
+            <a:off x="7554941" y="1596980"/>
+            <a:ext cx="4637059" cy="4209022"/>
+          </a:xfrm>
+          <a:prstGeom prst="rect">
+            <a:avLst/>
+          </a:prstGeom>
+        </p:spPr>
+      </p:pic>
+      <mc:AlternateContent xmlns:mc="http://schemas.openxmlformats.org/markup-compatibility/2006">
+        <mc:Choice xmlns:a14="http://schemas.microsoft.com/office/drawing/2010/main" Requires="a14">
+          <p:sp>
+            <p:nvSpPr>
+              <p:cNvPr id="6" name="CasellaDiTesto 5">
+                <a:extLst>
+                  <a:ext uri="{FF2B5EF4-FFF2-40B4-BE49-F238E27FC236}">
+                    <a16:creationId xmlns:a16="http://schemas.microsoft.com/office/drawing/2014/main" id="{9D47DB61-5E83-4AB4-90A3-DE0A5AE3EAF3}"/>
+                  </a:ext>
+                </a:extLst>
+              </p:cNvPr>
+              <p:cNvSpPr txBox="1"/>
+              <p:nvPr/>
+            </p:nvSpPr>
+            <p:spPr>
+              <a:xfrm>
+                <a:off x="1742941" y="274827"/>
+                <a:ext cx="8706118" cy="558230"/>
+              </a:xfrm>
+              <a:prstGeom prst="rect">
+                <a:avLst/>
+              </a:prstGeom>
+              <a:noFill/>
+            </p:spPr>
+            <p:txBody>
+              <a:bodyPr wrap="square" rtlCol="0">
+                <a:spAutoFit/>
+              </a:bodyPr>
+              <a:lstStyle/>
+              <a:p>
+                <a:r>
+                  <a:rPr lang="en-US" sz="2800" dirty="0"/>
+                  <a:t>Output characteristics when </a:t>
+                </a:r>
+                <a14:m>
+                  <m:oMath xmlns:m="http://schemas.openxmlformats.org/officeDocument/2006/math">
+                    <m:sSub>
+                      <m:sSubPr>
+                        <m:ctrlPr>
+                          <a:rPr lang="en-US" sz="2800" i="1">
+                            <a:latin typeface="Cambria Math" panose="02040503050406030204" pitchFamily="18" charset="0"/>
+                          </a:rPr>
+                        </m:ctrlPr>
+                      </m:sSubPr>
+                      <m:e>
+                        <m:r>
+                          <a:rPr lang="it-IT" sz="2800" i="1">
+                            <a:latin typeface="Cambria Math" panose="02040503050406030204" pitchFamily="18" charset="0"/>
+                          </a:rPr>
+                          <m:t>𝑉</m:t>
+                        </m:r>
+                      </m:e>
+                      <m:sub>
+                        <m:r>
+                          <a:rPr lang="it-IT" sz="2800" b="0" i="1" smtClean="0">
+                            <a:latin typeface="Cambria Math" panose="02040503050406030204" pitchFamily="18" charset="0"/>
+                          </a:rPr>
+                          <m:t>𝑔</m:t>
+                        </m:r>
+                      </m:sub>
+                    </m:sSub>
+                    <m:r>
+                      <a:rPr lang="it-IT" sz="2800" i="1">
+                        <a:latin typeface="Cambria Math" panose="02040503050406030204" pitchFamily="18" charset="0"/>
+                      </a:rPr>
+                      <m:t>=</m:t>
+                    </m:r>
+                    <m:r>
+                      <a:rPr lang="it-IT" sz="2800" i="1">
+                        <a:latin typeface="Cambria Math" panose="02040503050406030204" pitchFamily="18" charset="0"/>
+                      </a:rPr>
+                      <m:t>0.</m:t>
+                    </m:r>
+                    <m:r>
+                      <a:rPr lang="it-IT" sz="2800" b="0" i="1" smtClean="0">
+                        <a:latin typeface="Cambria Math" panose="02040503050406030204" pitchFamily="18" charset="0"/>
+                      </a:rPr>
+                      <m:t>1</m:t>
+                    </m:r>
+                    <m:r>
+                      <a:rPr lang="it-IT" sz="2800" i="1">
+                        <a:latin typeface="Cambria Math" panose="02040503050406030204" pitchFamily="18" charset="0"/>
+                      </a:rPr>
+                      <m:t> </m:t>
+                    </m:r>
+                    <m:r>
+                      <a:rPr lang="it-IT" sz="2800" i="1">
+                        <a:latin typeface="Cambria Math" panose="02040503050406030204" pitchFamily="18" charset="0"/>
+                      </a:rPr>
+                      <m:t>𝑉</m:t>
+                    </m:r>
+                  </m:oMath>
+                </a14:m>
+                <a:r>
+                  <a:rPr lang="en-US" sz="2800" dirty="0"/>
+                  <a:t> for a 4L thick FET.</a:t>
+                </a:r>
+                <a:endParaRPr lang="it-IT" sz="2800" dirty="0"/>
+              </a:p>
+            </p:txBody>
+          </p:sp>
+        </mc:Choice>
+        <mc:Fallback>
+          <p:sp>
+            <p:nvSpPr>
+              <p:cNvPr id="6" name="CasellaDiTesto 5">
+                <a:extLst>
+                  <a:ext uri="{FF2B5EF4-FFF2-40B4-BE49-F238E27FC236}">
+                    <a16:creationId xmlns:a16="http://schemas.microsoft.com/office/drawing/2014/main" id="{9D47DB61-5E83-4AB4-90A3-DE0A5AE3EAF3}"/>
+                  </a:ext>
+                </a:extLst>
+              </p:cNvPr>
+              <p:cNvSpPr txBox="1">
+                <a:spLocks noRot="1" noChangeAspect="1" noMove="1" noResize="1" noEditPoints="1" noAdjustHandles="1" noChangeArrowheads="1" noChangeShapeType="1" noTextEdit="1"/>
+              </p:cNvSpPr>
+              <p:nvPr/>
+            </p:nvSpPr>
+            <p:spPr>
+              <a:xfrm>
+                <a:off x="1742941" y="274827"/>
+                <a:ext cx="8706118" cy="558230"/>
+              </a:xfrm>
+              <a:prstGeom prst="rect">
+                <a:avLst/>
+              </a:prstGeom>
+              <a:blipFill>
+                <a:blip r:embed="rId3"/>
+                <a:stretch>
+                  <a:fillRect l="-1471" t="-9783" b="-23913"/>
+                </a:stretch>
+              </a:blipFill>
+            </p:spPr>
+            <p:txBody>
+              <a:bodyPr/>
+              <a:lstStyle/>
+              <a:p>
+                <a:r>
+                  <a:rPr lang="it-IT">
+                    <a:noFill/>
+                  </a:rPr>
+                  <a:t> </a:t>
+                </a:r>
+              </a:p>
+            </p:txBody>
+          </p:sp>
+        </mc:Fallback>
+      </mc:AlternateContent>
+      <p:pic>
+        <p:nvPicPr>
+          <p:cNvPr id="8" name="Immagine 7" descr="Immagine che contiene sedendo&#10;&#10;Descrizione generata automaticamente">
+            <a:extLst>
+              <a:ext uri="{FF2B5EF4-FFF2-40B4-BE49-F238E27FC236}">
+                <a16:creationId xmlns:a16="http://schemas.microsoft.com/office/drawing/2014/main" id="{D876FFF4-A608-4294-A925-E9A90781149B}"/>
+              </a:ext>
+            </a:extLst>
+          </p:cNvPr>
+          <p:cNvPicPr>
+            <a:picLocks noChangeAspect="1"/>
+          </p:cNvPicPr>
+          <p:nvPr/>
+        </p:nvPicPr>
+        <p:blipFill>
+          <a:blip r:embed="rId4">
+            <a:extLst>
+              <a:ext uri="{28A0092B-C50C-407E-A947-70E740481C1C}">
+                <a14:useLocalDpi xmlns:a14="http://schemas.microsoft.com/office/drawing/2010/main" val="0"/>
+              </a:ext>
+            </a:extLst>
+          </a:blip>
+          <a:stretch>
+            <a:fillRect/>
+          </a:stretch>
+        </p:blipFill>
+        <p:spPr>
+          <a:xfrm>
+            <a:off x="0" y="1596980"/>
+            <a:ext cx="7590047" cy="3866032"/>
+          </a:xfrm>
+          <a:prstGeom prst="rect">
+            <a:avLst/>
+          </a:prstGeom>
+        </p:spPr>
+      </p:pic>
+    </p:spTree>
+    <p:extLst>
+      <p:ext uri="{BB962C8B-B14F-4D97-AF65-F5344CB8AC3E}">
+        <p14:creationId xmlns:p14="http://schemas.microsoft.com/office/powerpoint/2010/main" val="4177784154"/>
+      </p:ext>
+    </p:extLst>
+  </p:cSld>
+  <p:clrMapOvr>
+    <a:masterClrMapping/>
+  </p:clrMapOvr>
+</p:sld>
+</file>
+
+<file path=ppt/slides/slide5.xml><?xml version="1.0" encoding="utf-8"?>
+<p:sld xmlns:a="http://schemas.openxmlformats.org/drawingml/2006/main" xmlns:r="http://schemas.openxmlformats.org/officeDocument/2006/relationships" xmlns:p="http://schemas.openxmlformats.org/presentationml/2006/main">
+  <p:cSld>
+    <p:spTree>
+      <p:nvGrpSpPr>
+        <p:cNvPr id="1" name=""/>
+        <p:cNvGrpSpPr/>
+        <p:nvPr/>
+      </p:nvGrpSpPr>
+      <p:grpSpPr>
+        <a:xfrm>
+          <a:off x="0" y="0"/>
+          <a:ext cx="0" cy="0"/>
+          <a:chOff x="0" y="0"/>
+          <a:chExt cx="0" cy="0"/>
+        </a:xfrm>
+      </p:grpSpPr>
+      <p:pic>
+        <p:nvPicPr>
+          <p:cNvPr id="5" name="Immagine 4" descr="Immagine che contiene testo, mappa&#10;&#10;Descrizione generata automaticamente">
+            <a:extLst>
+              <a:ext uri="{FF2B5EF4-FFF2-40B4-BE49-F238E27FC236}">
+                <a16:creationId xmlns:a16="http://schemas.microsoft.com/office/drawing/2014/main" id="{074B4F78-5ED8-4AD1-9B44-F51BC121B88B}"/>
+              </a:ext>
+            </a:extLst>
+          </p:cNvPr>
+          <p:cNvPicPr>
+            <a:picLocks noChangeAspect="1"/>
+          </p:cNvPicPr>
+          <p:nvPr/>
+        </p:nvPicPr>
+        <p:blipFill>
+          <a:blip r:embed="rId2">
+            <a:extLst>
+              <a:ext uri="{28A0092B-C50C-407E-A947-70E740481C1C}">
+                <a14:useLocalDpi xmlns:a14="http://schemas.microsoft.com/office/drawing/2010/main" val="0"/>
+              </a:ext>
+            </a:extLst>
+          </a:blip>
+          <a:stretch>
+            <a:fillRect/>
+          </a:stretch>
+        </p:blipFill>
+        <p:spPr>
+          <a:xfrm>
+            <a:off x="7287643" y="1596981"/>
+            <a:ext cx="4904357" cy="4311522"/>
           </a:xfrm>
           <a:prstGeom prst="rect">
             <a:avLst/>
@@ -3748,10 +4977,10 @@
       </p:pic>
       <p:pic>
         <p:nvPicPr>
-          <p:cNvPr id="4" name="Immagine 3" descr="Immagine che contiene testo, mappa&#10;&#10;Descrizione generata automaticamente">
-            <a:extLst>
-              <a:ext uri="{FF2B5EF4-FFF2-40B4-BE49-F238E27FC236}">
-                <a16:creationId xmlns:a16="http://schemas.microsoft.com/office/drawing/2014/main" id="{F065BCE7-A111-47A7-ACD3-5B9EF45E6D27}"/>
+          <p:cNvPr id="8" name="Immagine 7" descr="Immagine che contiene stella&#10;&#10;Descrizione generata automaticamente">
+            <a:extLst>
+              <a:ext uri="{FF2B5EF4-FFF2-40B4-BE49-F238E27FC236}">
+                <a16:creationId xmlns:a16="http://schemas.microsoft.com/office/drawing/2014/main" id="{79B04D8E-B3C1-4A5A-B5CC-9524EB2AF9C7}"/>
               </a:ext>
             </a:extLst>
           </p:cNvPr>
@@ -3774,50 +5003,143 @@
         </p:blipFill>
         <p:spPr>
           <a:xfrm>
-            <a:off x="609760" y="3429000"/>
-            <a:ext cx="6105366" cy="3244311"/>
+            <a:off x="0" y="1596981"/>
+            <a:ext cx="7240130" cy="3687800"/>
           </a:xfrm>
           <a:prstGeom prst="rect">
             <a:avLst/>
           </a:prstGeom>
         </p:spPr>
       </p:pic>
-      <p:pic>
-        <p:nvPicPr>
-          <p:cNvPr id="6" name="Immagine 5" descr="Immagine che contiene mappa, testo&#10;&#10;Descrizione generata automaticamente">
-            <a:extLst>
-              <a:ext uri="{FF2B5EF4-FFF2-40B4-BE49-F238E27FC236}">
-                <a16:creationId xmlns:a16="http://schemas.microsoft.com/office/drawing/2014/main" id="{640A3740-2348-45EF-BB07-66A8CAB2B4A2}"/>
-              </a:ext>
-            </a:extLst>
-          </p:cNvPr>
-          <p:cNvPicPr>
-            <a:picLocks noChangeAspect="1"/>
-          </p:cNvPicPr>
-          <p:nvPr/>
-        </p:nvPicPr>
-        <p:blipFill>
-          <a:blip r:embed="rId4">
-            <a:extLst>
-              <a:ext uri="{28A0092B-C50C-407E-A947-70E740481C1C}">
-                <a14:useLocalDpi xmlns:a14="http://schemas.microsoft.com/office/drawing/2010/main" val="0"/>
-              </a:ext>
-            </a:extLst>
-          </a:blip>
-          <a:stretch>
-            <a:fillRect/>
-          </a:stretch>
-        </p:blipFill>
-        <p:spPr>
-          <a:xfrm>
-            <a:off x="609760" y="0"/>
-            <a:ext cx="6105365" cy="3244311"/>
-          </a:xfrm>
-          <a:prstGeom prst="rect">
-            <a:avLst/>
-          </a:prstGeom>
-        </p:spPr>
-      </p:pic>
+      <mc:AlternateContent xmlns:mc="http://schemas.openxmlformats.org/markup-compatibility/2006">
+        <mc:Choice xmlns:a14="http://schemas.microsoft.com/office/drawing/2010/main" Requires="a14">
+          <p:sp>
+            <p:nvSpPr>
+              <p:cNvPr id="9" name="CasellaDiTesto 8">
+                <a:extLst>
+                  <a:ext uri="{FF2B5EF4-FFF2-40B4-BE49-F238E27FC236}">
+                    <a16:creationId xmlns:a16="http://schemas.microsoft.com/office/drawing/2014/main" id="{2BFF6ED6-64E3-47F9-A24B-04BF4E90A96B}"/>
+                  </a:ext>
+                </a:extLst>
+              </p:cNvPr>
+              <p:cNvSpPr txBox="1"/>
+              <p:nvPr/>
+            </p:nvSpPr>
+            <p:spPr>
+              <a:xfrm>
+                <a:off x="1620591" y="309093"/>
+                <a:ext cx="8950817" cy="523220"/>
+              </a:xfrm>
+              <a:prstGeom prst="rect">
+                <a:avLst/>
+              </a:prstGeom>
+              <a:noFill/>
+            </p:spPr>
+            <p:txBody>
+              <a:bodyPr wrap="square" rtlCol="0">
+                <a:spAutoFit/>
+              </a:bodyPr>
+              <a:lstStyle/>
+              <a:p>
+                <a:r>
+                  <a:rPr lang="en-US" sz="2800" dirty="0"/>
+                  <a:t>Transfer characteristics when </a:t>
+                </a:r>
+                <a14:m>
+                  <m:oMath xmlns:m="http://schemas.openxmlformats.org/officeDocument/2006/math">
+                    <m:sSub>
+                      <m:sSubPr>
+                        <m:ctrlPr>
+                          <a:rPr lang="en-US" sz="2800" i="1">
+                            <a:latin typeface="Cambria Math" panose="02040503050406030204" pitchFamily="18" charset="0"/>
+                          </a:rPr>
+                        </m:ctrlPr>
+                      </m:sSubPr>
+                      <m:e>
+                        <m:r>
+                          <a:rPr lang="it-IT" sz="2800" i="1">
+                            <a:latin typeface="Cambria Math" panose="02040503050406030204" pitchFamily="18" charset="0"/>
+                          </a:rPr>
+                          <m:t>𝑉</m:t>
+                        </m:r>
+                      </m:e>
+                      <m:sub>
+                        <m:r>
+                          <a:rPr lang="it-IT" sz="2800" b="0" i="1" smtClean="0">
+                            <a:latin typeface="Cambria Math" panose="02040503050406030204" pitchFamily="18" charset="0"/>
+                          </a:rPr>
+                          <m:t>𝑑</m:t>
+                        </m:r>
+                      </m:sub>
+                    </m:sSub>
+                    <m:r>
+                      <a:rPr lang="it-IT" sz="2800" b="0" i="1" smtClean="0">
+                        <a:latin typeface="Cambria Math" panose="02040503050406030204" pitchFamily="18" charset="0"/>
+                      </a:rPr>
+                      <m:t>=0.01 </m:t>
+                    </m:r>
+                    <m:r>
+                      <a:rPr lang="it-IT" sz="2800" b="0" i="1" smtClean="0">
+                        <a:latin typeface="Cambria Math" panose="02040503050406030204" pitchFamily="18" charset="0"/>
+                      </a:rPr>
+                      <m:t>𝑉</m:t>
+                    </m:r>
+                  </m:oMath>
+                </a14:m>
+                <a:r>
+                  <a:rPr lang="en-US" sz="2800" dirty="0"/>
+                  <a:t> for a 4L thick FET</a:t>
+                </a:r>
+                <a:endParaRPr lang="it-IT" sz="2800" dirty="0"/>
+              </a:p>
+            </p:txBody>
+          </p:sp>
+        </mc:Choice>
+        <mc:Fallback>
+          <p:sp>
+            <p:nvSpPr>
+              <p:cNvPr id="9" name="CasellaDiTesto 8">
+                <a:extLst>
+                  <a:ext uri="{FF2B5EF4-FFF2-40B4-BE49-F238E27FC236}">
+                    <a16:creationId xmlns:a16="http://schemas.microsoft.com/office/drawing/2014/main" id="{2BFF6ED6-64E3-47F9-A24B-04BF4E90A96B}"/>
+                  </a:ext>
+                </a:extLst>
+              </p:cNvPr>
+              <p:cNvSpPr txBox="1">
+                <a:spLocks noRot="1" noChangeAspect="1" noMove="1" noResize="1" noEditPoints="1" noAdjustHandles="1" noChangeArrowheads="1" noChangeShapeType="1" noTextEdit="1"/>
+              </p:cNvSpPr>
+              <p:nvPr/>
+            </p:nvSpPr>
+            <p:spPr>
+              <a:xfrm>
+                <a:off x="1620591" y="309093"/>
+                <a:ext cx="8950817" cy="523220"/>
+              </a:xfrm>
+              <a:prstGeom prst="rect">
+                <a:avLst/>
+              </a:prstGeom>
+              <a:blipFill>
+                <a:blip r:embed="rId4"/>
+                <a:stretch>
+                  <a:fillRect l="-1431" t="-11628" b="-32558"/>
+                </a:stretch>
+              </a:blipFill>
+            </p:spPr>
+            <p:txBody>
+              <a:bodyPr/>
+              <a:lstStyle/>
+              <a:p>
+                <a:r>
+                  <a:rPr lang="it-IT">
+                    <a:noFill/>
+                  </a:rPr>
+                  <a:t> </a:t>
+                </a:r>
+              </a:p>
+            </p:txBody>
+          </p:sp>
+        </mc:Fallback>
+      </mc:AlternateContent>
     </p:spTree>
     <p:extLst>
       <p:ext uri="{BB962C8B-B14F-4D97-AF65-F5344CB8AC3E}">
@@ -3831,7 +5153,7 @@
 </p:sld>
 </file>
 
-<file path=ppt/slides/slide4.xml><?xml version="1.0" encoding="utf-8"?>
+<file path=ppt/slides/slide6.xml><?xml version="1.0" encoding="utf-8"?>
 <p:sld xmlns:a="http://schemas.openxmlformats.org/drawingml/2006/main" xmlns:r="http://schemas.openxmlformats.org/officeDocument/2006/relationships" xmlns:p="http://schemas.openxmlformats.org/presentationml/2006/main">
   <p:cSld>
     <p:bg>
@@ -4075,7 +5397,7 @@
 </p:sld>
 </file>
 
-<file path=ppt/slides/slide5.xml><?xml version="1.0" encoding="utf-8"?>
+<file path=ppt/slides/slide7.xml><?xml version="1.0" encoding="utf-8"?>
 <p:sld xmlns:a="http://schemas.openxmlformats.org/drawingml/2006/main" xmlns:r="http://schemas.openxmlformats.org/officeDocument/2006/relationships" xmlns:p="http://schemas.openxmlformats.org/presentationml/2006/main">
   <p:cSld>
     <p:spTree>
@@ -4160,8 +5482,8 @@
           </a:xfrm>
         </p:spPr>
       </p:pic>
-      <mc:AlternateContent xmlns:mc="http://schemas.openxmlformats.org/markup-compatibility/2006">
-        <mc:Choice xmlns:a14="http://schemas.microsoft.com/office/drawing/2010/main" Requires="a14">
+      <mc:AlternateContent xmlns:mc="http://schemas.openxmlformats.org/markup-compatibility/2006" xmlns:a14="http://schemas.microsoft.com/office/drawing/2010/main">
+        <mc:Choice Requires="a14">
           <p:sp>
             <p:nvSpPr>
               <p:cNvPr id="5" name="CasellaDiTesto 4">
@@ -4376,7 +5698,7 @@
             </p:txBody>
           </p:sp>
         </mc:Choice>
-        <mc:Fallback>
+        <mc:Fallback xmlns="">
           <p:sp>
             <p:nvSpPr>
               <p:cNvPr id="5" name="CasellaDiTesto 4">
@@ -4434,7 +5756,7 @@
 </p:sld>
 </file>
 
-<file path=ppt/slides/slide6.xml><?xml version="1.0" encoding="utf-8"?>
+<file path=ppt/slides/slide8.xml><?xml version="1.0" encoding="utf-8"?>
 <p:sld xmlns:a="http://schemas.openxmlformats.org/drawingml/2006/main" xmlns:r="http://schemas.openxmlformats.org/officeDocument/2006/relationships" xmlns:p="http://schemas.openxmlformats.org/presentationml/2006/main">
   <p:cSld>
     <p:spTree>
@@ -4527,8 +5849,8 @@
           </a:prstGeom>
         </p:spPr>
       </p:pic>
-      <mc:AlternateContent xmlns:mc="http://schemas.openxmlformats.org/markup-compatibility/2006">
-        <mc:Choice xmlns:a14="http://schemas.microsoft.com/office/drawing/2010/main" Requires="a14">
+      <mc:AlternateContent xmlns:mc="http://schemas.openxmlformats.org/markup-compatibility/2006" xmlns:a14="http://schemas.microsoft.com/office/drawing/2010/main">
+        <mc:Choice Requires="a14">
           <p:sp>
             <p:nvSpPr>
               <p:cNvPr id="15" name="Titolo 14">
@@ -4668,7 +5990,7 @@
             </p:txBody>
           </p:sp>
         </mc:Choice>
-        <mc:Fallback>
+        <mc:Fallback xmlns="">
           <p:sp>
             <p:nvSpPr>
               <p:cNvPr id="15" name="Titolo 14">
@@ -4728,7 +6050,7 @@
 </p:sld>
 </file>
 
-<file path=ppt/slides/slide7.xml><?xml version="1.0" encoding="utf-8"?>
+<file path=ppt/slides/slide9.xml><?xml version="1.0" encoding="utf-8"?>
 <p:sld xmlns:a="http://schemas.openxmlformats.org/drawingml/2006/main" xmlns:r="http://schemas.openxmlformats.org/officeDocument/2006/relationships" xmlns:p="http://schemas.openxmlformats.org/presentationml/2006/main">
   <p:cSld>
     <p:spTree>
@@ -4817,8 +6139,8 @@
           </a:prstGeom>
         </p:spPr>
       </p:pic>
-      <mc:AlternateContent xmlns:mc="http://schemas.openxmlformats.org/markup-compatibility/2006">
-        <mc:Choice xmlns:a14="http://schemas.microsoft.com/office/drawing/2010/main" Requires="a14">
+      <mc:AlternateContent xmlns:mc="http://schemas.openxmlformats.org/markup-compatibility/2006" xmlns:a14="http://schemas.microsoft.com/office/drawing/2010/main">
+        <mc:Choice Requires="a14">
           <p:sp>
             <p:nvSpPr>
               <p:cNvPr id="9" name="CasellaDiTesto 8">
@@ -4927,7 +6249,7 @@
             </p:txBody>
           </p:sp>
         </mc:Choice>
-        <mc:Fallback>
+        <mc:Fallback xmlns="">
           <p:sp>
             <p:nvSpPr>
               <p:cNvPr id="9" name="CasellaDiTesto 8">
@@ -4976,652 +6298,6 @@
     <p:extLst>
       <p:ext uri="{BB962C8B-B14F-4D97-AF65-F5344CB8AC3E}">
         <p14:creationId xmlns:p14="http://schemas.microsoft.com/office/powerpoint/2010/main" val="4214566959"/>
-      </p:ext>
-    </p:extLst>
-  </p:cSld>
-  <p:clrMapOvr>
-    <a:masterClrMapping/>
-  </p:clrMapOvr>
-</p:sld>
-</file>
-
-<file path=ppt/slides/slide8.xml><?xml version="1.0" encoding="utf-8"?>
-<p:sld xmlns:a="http://schemas.openxmlformats.org/drawingml/2006/main" xmlns:r="http://schemas.openxmlformats.org/officeDocument/2006/relationships" xmlns:p="http://schemas.openxmlformats.org/presentationml/2006/main">
-  <p:cSld>
-    <p:spTree>
-      <p:nvGrpSpPr>
-        <p:cNvPr id="1" name=""/>
-        <p:cNvGrpSpPr/>
-        <p:nvPr/>
-      </p:nvGrpSpPr>
-      <p:grpSpPr>
-        <a:xfrm>
-          <a:off x="0" y="0"/>
-          <a:ext cx="0" cy="0"/>
-          <a:chOff x="0" y="0"/>
-          <a:chExt cx="0" cy="0"/>
-        </a:xfrm>
-      </p:grpSpPr>
-      <p:pic>
-        <p:nvPicPr>
-          <p:cNvPr id="4" name="Immagine 3" descr="Immagine che contiene testo, mappa&#10;&#10;Descrizione generata automaticamente">
-            <a:extLst>
-              <a:ext uri="{FF2B5EF4-FFF2-40B4-BE49-F238E27FC236}">
-                <a16:creationId xmlns:a16="http://schemas.microsoft.com/office/drawing/2014/main" id="{2AF9E266-F1DC-4F7C-B513-0881B40CB7E0}"/>
-              </a:ext>
-            </a:extLst>
-          </p:cNvPr>
-          <p:cNvPicPr>
-            <a:picLocks noChangeAspect="1"/>
-          </p:cNvPicPr>
-          <p:nvPr/>
-        </p:nvPicPr>
-        <p:blipFill>
-          <a:blip r:embed="rId2">
-            <a:extLst>
-              <a:ext uri="{28A0092B-C50C-407E-A947-70E740481C1C}">
-                <a14:useLocalDpi xmlns:a14="http://schemas.microsoft.com/office/drawing/2010/main" val="0"/>
-              </a:ext>
-            </a:extLst>
-          </a:blip>
-          <a:stretch>
-            <a:fillRect/>
-          </a:stretch>
-        </p:blipFill>
-        <p:spPr>
-          <a:xfrm>
-            <a:off x="8693239" y="2516615"/>
-            <a:ext cx="3498761" cy="2686146"/>
-          </a:xfrm>
-          <a:prstGeom prst="rect">
-            <a:avLst/>
-          </a:prstGeom>
-        </p:spPr>
-      </p:pic>
-      <p:pic>
-        <p:nvPicPr>
-          <p:cNvPr id="7" name="Immagine 6" descr="Immagine che contiene testo, mappa&#10;&#10;Descrizione generata automaticamente">
-            <a:extLst>
-              <a:ext uri="{FF2B5EF4-FFF2-40B4-BE49-F238E27FC236}">
-                <a16:creationId xmlns:a16="http://schemas.microsoft.com/office/drawing/2014/main" id="{7C2C6B5C-A78F-4033-B4C5-EF38FA28CA62}"/>
-              </a:ext>
-            </a:extLst>
-          </p:cNvPr>
-          <p:cNvPicPr>
-            <a:picLocks noChangeAspect="1"/>
-          </p:cNvPicPr>
-          <p:nvPr/>
-        </p:nvPicPr>
-        <p:blipFill>
-          <a:blip r:embed="rId3">
-            <a:extLst>
-              <a:ext uri="{28A0092B-C50C-407E-A947-70E740481C1C}">
-                <a14:useLocalDpi xmlns:a14="http://schemas.microsoft.com/office/drawing/2010/main" val="0"/>
-              </a:ext>
-            </a:extLst>
-          </a:blip>
-          <a:stretch>
-            <a:fillRect/>
-          </a:stretch>
-        </p:blipFill>
-        <p:spPr>
-          <a:xfrm>
-            <a:off x="0" y="1549952"/>
-            <a:ext cx="8693239" cy="4619473"/>
-          </a:xfrm>
-          <a:prstGeom prst="rect">
-            <a:avLst/>
-          </a:prstGeom>
-        </p:spPr>
-      </p:pic>
-      <mc:AlternateContent xmlns:mc="http://schemas.openxmlformats.org/markup-compatibility/2006">
-        <mc:Choice xmlns:a14="http://schemas.microsoft.com/office/drawing/2010/main" Requires="a14">
-          <p:sp>
-            <p:nvSpPr>
-              <p:cNvPr id="8" name="CasellaDiTesto 7">
-                <a:extLst>
-                  <a:ext uri="{FF2B5EF4-FFF2-40B4-BE49-F238E27FC236}">
-                    <a16:creationId xmlns:a16="http://schemas.microsoft.com/office/drawing/2014/main" id="{ECD81CD1-B376-4951-8157-577E18092CE9}"/>
-                  </a:ext>
-                </a:extLst>
-              </p:cNvPr>
-              <p:cNvSpPr txBox="1"/>
-              <p:nvPr/>
-            </p:nvSpPr>
-            <p:spPr>
-              <a:xfrm>
-                <a:off x="772732" y="90153"/>
-                <a:ext cx="10740981" cy="1024127"/>
-              </a:xfrm>
-              <a:prstGeom prst="rect">
-                <a:avLst/>
-              </a:prstGeom>
-              <a:noFill/>
-            </p:spPr>
-            <p:txBody>
-              <a:bodyPr wrap="square" rtlCol="0">
-                <a:spAutoFit/>
-              </a:bodyPr>
-              <a:lstStyle/>
-              <a:p>
-                <a14:m>
-                  <m:oMath xmlns:m="http://schemas.openxmlformats.org/officeDocument/2006/math">
-                    <m:sSub>
-                      <m:sSubPr>
-                        <m:ctrlPr>
-                          <a:rPr lang="en-US" sz="2800" i="1" smtClean="0">
-                            <a:latin typeface="Cambria Math" panose="02040503050406030204" pitchFamily="18" charset="0"/>
-                          </a:rPr>
-                        </m:ctrlPr>
-                      </m:sSubPr>
-                      <m:e>
-                        <m:r>
-                          <a:rPr lang="it-IT" sz="2800" b="0" i="1" smtClean="0">
-                            <a:latin typeface="Cambria Math" panose="02040503050406030204" pitchFamily="18" charset="0"/>
-                          </a:rPr>
-                          <m:t>𝐼</m:t>
-                        </m:r>
-                      </m:e>
-                      <m:sub>
-                        <m:r>
-                          <a:rPr lang="it-IT" sz="2800" b="0" i="1" smtClean="0">
-                            <a:latin typeface="Cambria Math" panose="02040503050406030204" pitchFamily="18" charset="0"/>
-                          </a:rPr>
-                          <m:t>𝑑𝑠</m:t>
-                        </m:r>
-                      </m:sub>
-                    </m:sSub>
-                    <m:r>
-                      <a:rPr lang="it-IT" sz="2800" b="0" i="0" smtClean="0">
-                        <a:latin typeface="Cambria Math" panose="02040503050406030204" pitchFamily="18" charset="0"/>
-                      </a:rPr>
-                      <m:t>−</m:t>
-                    </m:r>
-                    <m:sSub>
-                      <m:sSubPr>
-                        <m:ctrlPr>
-                          <a:rPr lang="en-US" sz="2800" i="1">
-                            <a:latin typeface="Cambria Math" panose="02040503050406030204" pitchFamily="18" charset="0"/>
-                          </a:rPr>
-                        </m:ctrlPr>
-                      </m:sSubPr>
-                      <m:e>
-                        <m:r>
-                          <a:rPr lang="it-IT" sz="2800" b="0" i="1" smtClean="0">
-                            <a:latin typeface="Cambria Math" panose="02040503050406030204" pitchFamily="18" charset="0"/>
-                          </a:rPr>
-                          <m:t>𝑉</m:t>
-                        </m:r>
-                      </m:e>
-                      <m:sub>
-                        <m:r>
-                          <a:rPr lang="it-IT" sz="2800" b="0" i="1" smtClean="0">
-                            <a:latin typeface="Cambria Math" panose="02040503050406030204" pitchFamily="18" charset="0"/>
-                          </a:rPr>
-                          <m:t>𝑡𝑔</m:t>
-                        </m:r>
-                      </m:sub>
-                    </m:sSub>
-                  </m:oMath>
-                </a14:m>
-                <a:r>
-                  <a:rPr lang="it-IT" sz="2800" dirty="0"/>
-                  <a:t> </a:t>
-                </a:r>
-                <a:r>
-                  <a:rPr lang="en-US" sz="2800" dirty="0"/>
-                  <a:t>curve. Measurements are performed with the back gate </a:t>
-                </a:r>
-                <a:r>
-                  <a:rPr lang="it-IT" sz="2800" dirty="0" err="1"/>
-                  <a:t>grounded</a:t>
-                </a:r>
-                <a:r>
-                  <a:rPr lang="it-IT" sz="2800" dirty="0"/>
-                  <a:t>. </a:t>
-                </a:r>
-                <a14:m>
-                  <m:oMath xmlns:m="http://schemas.openxmlformats.org/officeDocument/2006/math">
-                    <m:sSub>
-                      <m:sSubPr>
-                        <m:ctrlPr>
-                          <a:rPr lang="en-US" sz="2800" i="1">
-                            <a:latin typeface="Cambria Math" panose="02040503050406030204" pitchFamily="18" charset="0"/>
-                          </a:rPr>
-                        </m:ctrlPr>
-                      </m:sSubPr>
-                      <m:e>
-                        <m:r>
-                          <a:rPr lang="it-IT" sz="2800" b="0" i="1" smtClean="0">
-                            <a:latin typeface="Cambria Math" panose="02040503050406030204" pitchFamily="18" charset="0"/>
-                          </a:rPr>
-                          <m:t>𝐼</m:t>
-                        </m:r>
-                      </m:e>
-                      <m:sub>
-                        <m:r>
-                          <a:rPr lang="it-IT" sz="2800" b="0" i="1" smtClean="0">
-                            <a:latin typeface="Cambria Math" panose="02040503050406030204" pitchFamily="18" charset="0"/>
-                          </a:rPr>
-                          <m:t>𝑑𝑠</m:t>
-                        </m:r>
-                      </m:sub>
-                    </m:sSub>
-                  </m:oMath>
-                </a14:m>
-                <a:r>
-                  <a:rPr lang="en-US" sz="2800" dirty="0"/>
-                  <a:t>–</a:t>
-                </a:r>
-                <a14:m>
-                  <m:oMath xmlns:m="http://schemas.openxmlformats.org/officeDocument/2006/math">
-                    <m:sSub>
-                      <m:sSubPr>
-                        <m:ctrlPr>
-                          <a:rPr lang="en-US" sz="2800" i="1">
-                            <a:latin typeface="Cambria Math" panose="02040503050406030204" pitchFamily="18" charset="0"/>
-                          </a:rPr>
-                        </m:ctrlPr>
-                      </m:sSubPr>
-                      <m:e>
-                        <m:r>
-                          <a:rPr lang="it-IT" sz="2800" b="0" i="1" smtClean="0">
-                            <a:latin typeface="Cambria Math" panose="02040503050406030204" pitchFamily="18" charset="0"/>
-                          </a:rPr>
-                          <m:t>𝑉</m:t>
-                        </m:r>
-                      </m:e>
-                      <m:sub>
-                        <m:r>
-                          <a:rPr lang="it-IT" sz="2800" b="0" i="1" smtClean="0">
-                            <a:latin typeface="Cambria Math" panose="02040503050406030204" pitchFamily="18" charset="0"/>
-                          </a:rPr>
-                          <m:t>𝑡𝑔</m:t>
-                        </m:r>
-                      </m:sub>
-                    </m:sSub>
-                  </m:oMath>
-                </a14:m>
-                <a:r>
-                  <a:rPr lang="en-US" sz="2800" dirty="0"/>
-                  <a:t> for values of </a:t>
-                </a:r>
-                <a14:m>
-                  <m:oMath xmlns:m="http://schemas.openxmlformats.org/officeDocument/2006/math">
-                    <m:sSub>
-                      <m:sSubPr>
-                        <m:ctrlPr>
-                          <a:rPr lang="en-US" sz="2800" i="1">
-                            <a:latin typeface="Cambria Math" panose="02040503050406030204" pitchFamily="18" charset="0"/>
-                          </a:rPr>
-                        </m:ctrlPr>
-                      </m:sSubPr>
-                      <m:e>
-                        <m:r>
-                          <a:rPr lang="it-IT" sz="2800" b="0" i="1" smtClean="0">
-                            <a:latin typeface="Cambria Math" panose="02040503050406030204" pitchFamily="18" charset="0"/>
-                          </a:rPr>
-                          <m:t>𝑉</m:t>
-                        </m:r>
-                      </m:e>
-                      <m:sub>
-                        <m:r>
-                          <a:rPr lang="it-IT" sz="2800" b="0" i="1" smtClean="0">
-                            <a:latin typeface="Cambria Math" panose="02040503050406030204" pitchFamily="18" charset="0"/>
-                          </a:rPr>
-                          <m:t>𝑏𝑔</m:t>
-                        </m:r>
-                      </m:sub>
-                    </m:sSub>
-                    <m:r>
-                      <a:rPr lang="en-US" sz="2800" i="1">
-                        <a:latin typeface="Cambria Math" panose="02040503050406030204" pitchFamily="18" charset="0"/>
-                      </a:rPr>
-                      <m:t> </m:t>
-                    </m:r>
-                  </m:oMath>
-                </a14:m>
-                <a:r>
-                  <a:rPr lang="en-US" sz="2800" dirty="0"/>
-                  <a:t>=–10, –5, 0, 5 and 10 V.</a:t>
-                </a:r>
-                <a:endParaRPr lang="it-IT" sz="2800" dirty="0"/>
-              </a:p>
-            </p:txBody>
-          </p:sp>
-        </mc:Choice>
-        <mc:Fallback>
-          <p:sp>
-            <p:nvSpPr>
-              <p:cNvPr id="8" name="CasellaDiTesto 7">
-                <a:extLst>
-                  <a:ext uri="{FF2B5EF4-FFF2-40B4-BE49-F238E27FC236}">
-                    <a16:creationId xmlns:a16="http://schemas.microsoft.com/office/drawing/2014/main" id="{ECD81CD1-B376-4951-8157-577E18092CE9}"/>
-                  </a:ext>
-                </a:extLst>
-              </p:cNvPr>
-              <p:cNvSpPr txBox="1">
-                <a:spLocks noRot="1" noChangeAspect="1" noMove="1" noResize="1" noEditPoints="1" noAdjustHandles="1" noChangeArrowheads="1" noChangeShapeType="1" noTextEdit="1"/>
-              </p:cNvSpPr>
-              <p:nvPr/>
-            </p:nvSpPr>
-            <p:spPr>
-              <a:xfrm>
-                <a:off x="772732" y="90153"/>
-                <a:ext cx="10740981" cy="1024127"/>
-              </a:xfrm>
-              <a:prstGeom prst="rect">
-                <a:avLst/>
-              </a:prstGeom>
-              <a:blipFill>
-                <a:blip r:embed="rId4"/>
-                <a:stretch>
-                  <a:fillRect l="-1192" t="-5952" b="-13095"/>
-                </a:stretch>
-              </a:blipFill>
-            </p:spPr>
-            <p:txBody>
-              <a:bodyPr/>
-              <a:lstStyle/>
-              <a:p>
-                <a:r>
-                  <a:rPr lang="it-IT">
-                    <a:noFill/>
-                  </a:rPr>
-                  <a:t> </a:t>
-                </a:r>
-              </a:p>
-            </p:txBody>
-          </p:sp>
-        </mc:Fallback>
-      </mc:AlternateContent>
-    </p:spTree>
-    <p:extLst>
-      <p:ext uri="{BB962C8B-B14F-4D97-AF65-F5344CB8AC3E}">
-        <p14:creationId xmlns:p14="http://schemas.microsoft.com/office/powerpoint/2010/main" val="184799789"/>
-      </p:ext>
-    </p:extLst>
-  </p:cSld>
-  <p:clrMapOvr>
-    <a:masterClrMapping/>
-  </p:clrMapOvr>
-</p:sld>
-</file>
-
-<file path=ppt/slides/slide9.xml><?xml version="1.0" encoding="utf-8"?>
-<p:sld xmlns:a="http://schemas.openxmlformats.org/drawingml/2006/main" xmlns:r="http://schemas.openxmlformats.org/officeDocument/2006/relationships" xmlns:p="http://schemas.openxmlformats.org/presentationml/2006/main">
-  <p:cSld>
-    <p:spTree>
-      <p:nvGrpSpPr>
-        <p:cNvPr id="1" name=""/>
-        <p:cNvGrpSpPr/>
-        <p:nvPr/>
-      </p:nvGrpSpPr>
-      <p:grpSpPr>
-        <a:xfrm>
-          <a:off x="0" y="0"/>
-          <a:ext cx="0" cy="0"/>
-          <a:chOff x="0" y="0"/>
-          <a:chExt cx="0" cy="0"/>
-        </a:xfrm>
-      </p:grpSpPr>
-      <p:pic>
-        <p:nvPicPr>
-          <p:cNvPr id="3" name="Immagine 2" descr="Immagine che contiene mappa, testo&#10;&#10;Descrizione generata automaticamente">
-            <a:extLst>
-              <a:ext uri="{FF2B5EF4-FFF2-40B4-BE49-F238E27FC236}">
-                <a16:creationId xmlns:a16="http://schemas.microsoft.com/office/drawing/2014/main" id="{AAB1280C-8D08-489C-BEB3-30FF5F208E60}"/>
-              </a:ext>
-            </a:extLst>
-          </p:cNvPr>
-          <p:cNvPicPr>
-            <a:picLocks noChangeAspect="1"/>
-          </p:cNvPicPr>
-          <p:nvPr/>
-        </p:nvPicPr>
-        <p:blipFill>
-          <a:blip r:embed="rId2">
-            <a:extLst>
-              <a:ext uri="{28A0092B-C50C-407E-A947-70E740481C1C}">
-                <a14:useLocalDpi xmlns:a14="http://schemas.microsoft.com/office/drawing/2010/main" val="0"/>
-              </a:ext>
-            </a:extLst>
-          </a:blip>
-          <a:stretch>
-            <a:fillRect/>
-          </a:stretch>
-        </p:blipFill>
-        <p:spPr>
-          <a:xfrm>
-            <a:off x="6720566" y="1872117"/>
-            <a:ext cx="5471434" cy="3113765"/>
-          </a:xfrm>
-          <a:prstGeom prst="rect">
-            <a:avLst/>
-          </a:prstGeom>
-        </p:spPr>
-      </p:pic>
-      <p:pic>
-        <p:nvPicPr>
-          <p:cNvPr id="7" name="Immagine 6" descr="Immagine che contiene testo, mappa, tavolo&#10;&#10;Descrizione generata automaticamente">
-            <a:extLst>
-              <a:ext uri="{FF2B5EF4-FFF2-40B4-BE49-F238E27FC236}">
-                <a16:creationId xmlns:a16="http://schemas.microsoft.com/office/drawing/2014/main" id="{5C9AC49E-B754-4455-A816-767C0DED6774}"/>
-              </a:ext>
-            </a:extLst>
-          </p:cNvPr>
-          <p:cNvPicPr>
-            <a:picLocks noChangeAspect="1"/>
-          </p:cNvPicPr>
-          <p:nvPr/>
-        </p:nvPicPr>
-        <p:blipFill>
-          <a:blip r:embed="rId3">
-            <a:extLst>
-              <a:ext uri="{28A0092B-C50C-407E-A947-70E740481C1C}">
-                <a14:useLocalDpi xmlns:a14="http://schemas.microsoft.com/office/drawing/2010/main" val="0"/>
-              </a:ext>
-            </a:extLst>
-          </a:blip>
-          <a:stretch>
-            <a:fillRect/>
-          </a:stretch>
-        </p:blipFill>
-        <p:spPr>
-          <a:xfrm>
-            <a:off x="0" y="1537266"/>
-            <a:ext cx="6659495" cy="3538768"/>
-          </a:xfrm>
-          <a:prstGeom prst="rect">
-            <a:avLst/>
-          </a:prstGeom>
-        </p:spPr>
-      </p:pic>
-      <mc:AlternateContent xmlns:mc="http://schemas.openxmlformats.org/markup-compatibility/2006">
-        <mc:Choice xmlns:a14="http://schemas.microsoft.com/office/drawing/2010/main" Requires="a14">
-          <p:sp>
-            <p:nvSpPr>
-              <p:cNvPr id="8" name="CasellaDiTesto 7">
-                <a:extLst>
-                  <a:ext uri="{FF2B5EF4-FFF2-40B4-BE49-F238E27FC236}">
-                    <a16:creationId xmlns:a16="http://schemas.microsoft.com/office/drawing/2014/main" id="{FB87B9F4-35C1-4DD5-93DB-ACC2C9859F9B}"/>
-                  </a:ext>
-                </a:extLst>
-              </p:cNvPr>
-              <p:cNvSpPr txBox="1"/>
-              <p:nvPr/>
-            </p:nvSpPr>
-            <p:spPr>
-              <a:xfrm>
-                <a:off x="1530380" y="218941"/>
-                <a:ext cx="8862871" cy="558230"/>
-              </a:xfrm>
-              <a:prstGeom prst="rect">
-                <a:avLst/>
-              </a:prstGeom>
-              <a:noFill/>
-            </p:spPr>
-            <p:txBody>
-              <a:bodyPr wrap="square" rtlCol="0">
-                <a:spAutoFit/>
-              </a:bodyPr>
-              <a:lstStyle/>
-              <a:p>
-                <a14:m>
-                  <m:oMath xmlns:m="http://schemas.openxmlformats.org/officeDocument/2006/math">
-                    <m:sSub>
-                      <m:sSubPr>
-                        <m:ctrlPr>
-                          <a:rPr lang="en-US" sz="2800" i="1" smtClean="0">
-                            <a:latin typeface="Cambria Math" panose="02040503050406030204" pitchFamily="18" charset="0"/>
-                          </a:rPr>
-                        </m:ctrlPr>
-                      </m:sSubPr>
-                      <m:e>
-                        <m:r>
-                          <a:rPr lang="it-IT" sz="2800" b="0" i="1" smtClean="0">
-                            <a:latin typeface="Cambria Math" panose="02040503050406030204" pitchFamily="18" charset="0"/>
-                          </a:rPr>
-                          <m:t>𝐼</m:t>
-                        </m:r>
-                      </m:e>
-                      <m:sub>
-                        <m:r>
-                          <a:rPr lang="it-IT" sz="2800" b="0" i="1" smtClean="0">
-                            <a:latin typeface="Cambria Math" panose="02040503050406030204" pitchFamily="18" charset="0"/>
-                          </a:rPr>
-                          <m:t>𝑑𝑠</m:t>
-                        </m:r>
-                      </m:sub>
-                    </m:sSub>
-                    <m:r>
-                      <a:rPr lang="it-IT" sz="2800" b="0" i="0" smtClean="0">
-                        <a:latin typeface="Cambria Math" panose="02040503050406030204" pitchFamily="18" charset="0"/>
-                      </a:rPr>
-                      <m:t>−</m:t>
-                    </m:r>
-                    <m:sSub>
-                      <m:sSubPr>
-                        <m:ctrlPr>
-                          <a:rPr lang="en-US" sz="2800" i="1">
-                            <a:latin typeface="Cambria Math" panose="02040503050406030204" pitchFamily="18" charset="0"/>
-                          </a:rPr>
-                        </m:ctrlPr>
-                      </m:sSubPr>
-                      <m:e>
-                        <m:r>
-                          <a:rPr lang="it-IT" sz="2800" b="0" i="1" smtClean="0">
-                            <a:latin typeface="Cambria Math" panose="02040503050406030204" pitchFamily="18" charset="0"/>
-                          </a:rPr>
-                          <m:t>𝑉</m:t>
-                        </m:r>
-                      </m:e>
-                      <m:sub>
-                        <m:r>
-                          <a:rPr lang="it-IT" sz="2800" b="0" i="1" smtClean="0">
-                            <a:latin typeface="Cambria Math" panose="02040503050406030204" pitchFamily="18" charset="0"/>
-                          </a:rPr>
-                          <m:t>𝑑𝑠</m:t>
-                        </m:r>
-                      </m:sub>
-                    </m:sSub>
-                  </m:oMath>
-                </a14:m>
-                <a:r>
-                  <a:rPr lang="it-IT" sz="2800" dirty="0"/>
-                  <a:t> </a:t>
-                </a:r>
-                <a:r>
-                  <a:rPr lang="en-US" sz="2800" dirty="0"/>
-                  <a:t>curves recorded for different values of </a:t>
-                </a:r>
-                <a14:m>
-                  <m:oMath xmlns:m="http://schemas.openxmlformats.org/officeDocument/2006/math">
-                    <m:sSub>
-                      <m:sSubPr>
-                        <m:ctrlPr>
-                          <a:rPr lang="en-US" sz="2800" i="1">
-                            <a:latin typeface="Cambria Math" panose="02040503050406030204" pitchFamily="18" charset="0"/>
-                          </a:rPr>
-                        </m:ctrlPr>
-                      </m:sSubPr>
-                      <m:e>
-                        <m:r>
-                          <a:rPr lang="it-IT" sz="2800" b="0" i="1" smtClean="0">
-                            <a:latin typeface="Cambria Math" panose="02040503050406030204" pitchFamily="18" charset="0"/>
-                          </a:rPr>
-                          <m:t>𝑉</m:t>
-                        </m:r>
-                      </m:e>
-                      <m:sub>
-                        <m:r>
-                          <a:rPr lang="it-IT" sz="2800" b="0" i="1" smtClean="0">
-                            <a:latin typeface="Cambria Math" panose="02040503050406030204" pitchFamily="18" charset="0"/>
-                          </a:rPr>
-                          <m:t>𝑡𝑔</m:t>
-                        </m:r>
-                      </m:sub>
-                    </m:sSub>
-                  </m:oMath>
-                </a14:m>
-                <a:r>
-                  <a:rPr lang="en-US" sz="2800" dirty="0"/>
-                  <a:t>.</a:t>
-                </a:r>
-                <a:endParaRPr lang="it-IT" sz="2800" dirty="0"/>
-              </a:p>
-            </p:txBody>
-          </p:sp>
-        </mc:Choice>
-        <mc:Fallback>
-          <p:sp>
-            <p:nvSpPr>
-              <p:cNvPr id="8" name="CasellaDiTesto 7">
-                <a:extLst>
-                  <a:ext uri="{FF2B5EF4-FFF2-40B4-BE49-F238E27FC236}">
-                    <a16:creationId xmlns:a16="http://schemas.microsoft.com/office/drawing/2014/main" id="{FB87B9F4-35C1-4DD5-93DB-ACC2C9859F9B}"/>
-                  </a:ext>
-                </a:extLst>
-              </p:cNvPr>
-              <p:cNvSpPr txBox="1">
-                <a:spLocks noRot="1" noChangeAspect="1" noMove="1" noResize="1" noEditPoints="1" noAdjustHandles="1" noChangeArrowheads="1" noChangeShapeType="1" noTextEdit="1"/>
-              </p:cNvSpPr>
-              <p:nvPr/>
-            </p:nvSpPr>
-            <p:spPr>
-              <a:xfrm>
-                <a:off x="1530380" y="218941"/>
-                <a:ext cx="8862871" cy="558230"/>
-              </a:xfrm>
-              <a:prstGeom prst="rect">
-                <a:avLst/>
-              </a:prstGeom>
-              <a:blipFill>
-                <a:blip r:embed="rId4"/>
-                <a:stretch>
-                  <a:fillRect t="-10989" b="-25275"/>
-                </a:stretch>
-              </a:blipFill>
-            </p:spPr>
-            <p:txBody>
-              <a:bodyPr/>
-              <a:lstStyle/>
-              <a:p>
-                <a:r>
-                  <a:rPr lang="it-IT">
-                    <a:noFill/>
-                  </a:rPr>
-                  <a:t> </a:t>
-                </a:r>
-              </a:p>
-            </p:txBody>
-          </p:sp>
-        </mc:Fallback>
-      </mc:AlternateContent>
-    </p:spTree>
-    <p:extLst>
-      <p:ext uri="{BB962C8B-B14F-4D97-AF65-F5344CB8AC3E}">
-        <p14:creationId xmlns:p14="http://schemas.microsoft.com/office/powerpoint/2010/main" val="4168825037"/>
       </p:ext>
     </p:extLst>
   </p:cSld>

</xml_diff>

<commit_message>
update monolayer and 4 layer
</commit_message>
<xml_diff>
--- a/Presentazione COMSOL.pptx
+++ b/Presentazione COMSOL.pptx
@@ -271,7 +271,7 @@
           <a:p>
             <a:fld id="{3654AF55-DA74-4F8E-B7CA-625C9D81A063}" type="datetimeFigureOut">
               <a:rPr lang="it-IT" smtClean="0"/>
-              <a:t>29/05/2020</a:t>
+              <a:t>05/06/2020</a:t>
             </a:fld>
             <a:endParaRPr lang="it-IT"/>
           </a:p>
@@ -469,7 +469,7 @@
           <a:p>
             <a:fld id="{3654AF55-DA74-4F8E-B7CA-625C9D81A063}" type="datetimeFigureOut">
               <a:rPr lang="it-IT" smtClean="0"/>
-              <a:t>29/05/2020</a:t>
+              <a:t>05/06/2020</a:t>
             </a:fld>
             <a:endParaRPr lang="it-IT"/>
           </a:p>
@@ -677,7 +677,7 @@
           <a:p>
             <a:fld id="{3654AF55-DA74-4F8E-B7CA-625C9D81A063}" type="datetimeFigureOut">
               <a:rPr lang="it-IT" smtClean="0"/>
-              <a:t>29/05/2020</a:t>
+              <a:t>05/06/2020</a:t>
             </a:fld>
             <a:endParaRPr lang="it-IT"/>
           </a:p>
@@ -875,7 +875,7 @@
           <a:p>
             <a:fld id="{3654AF55-DA74-4F8E-B7CA-625C9D81A063}" type="datetimeFigureOut">
               <a:rPr lang="it-IT" smtClean="0"/>
-              <a:t>29/05/2020</a:t>
+              <a:t>05/06/2020</a:t>
             </a:fld>
             <a:endParaRPr lang="it-IT"/>
           </a:p>
@@ -1150,7 +1150,7 @@
           <a:p>
             <a:fld id="{3654AF55-DA74-4F8E-B7CA-625C9D81A063}" type="datetimeFigureOut">
               <a:rPr lang="it-IT" smtClean="0"/>
-              <a:t>29/05/2020</a:t>
+              <a:t>05/06/2020</a:t>
             </a:fld>
             <a:endParaRPr lang="it-IT"/>
           </a:p>
@@ -1415,7 +1415,7 @@
           <a:p>
             <a:fld id="{3654AF55-DA74-4F8E-B7CA-625C9D81A063}" type="datetimeFigureOut">
               <a:rPr lang="it-IT" smtClean="0"/>
-              <a:t>29/05/2020</a:t>
+              <a:t>05/06/2020</a:t>
             </a:fld>
             <a:endParaRPr lang="it-IT"/>
           </a:p>
@@ -1827,7 +1827,7 @@
           <a:p>
             <a:fld id="{3654AF55-DA74-4F8E-B7CA-625C9D81A063}" type="datetimeFigureOut">
               <a:rPr lang="it-IT" smtClean="0"/>
-              <a:t>29/05/2020</a:t>
+              <a:t>05/06/2020</a:t>
             </a:fld>
             <a:endParaRPr lang="it-IT"/>
           </a:p>
@@ -1968,7 +1968,7 @@
           <a:p>
             <a:fld id="{3654AF55-DA74-4F8E-B7CA-625C9D81A063}" type="datetimeFigureOut">
               <a:rPr lang="it-IT" smtClean="0"/>
-              <a:t>29/05/2020</a:t>
+              <a:t>05/06/2020</a:t>
             </a:fld>
             <a:endParaRPr lang="it-IT"/>
           </a:p>
@@ -2081,7 +2081,7 @@
           <a:p>
             <a:fld id="{3654AF55-DA74-4F8E-B7CA-625C9D81A063}" type="datetimeFigureOut">
               <a:rPr lang="it-IT" smtClean="0"/>
-              <a:t>29/05/2020</a:t>
+              <a:t>05/06/2020</a:t>
             </a:fld>
             <a:endParaRPr lang="it-IT"/>
           </a:p>
@@ -2392,7 +2392,7 @@
           <a:p>
             <a:fld id="{3654AF55-DA74-4F8E-B7CA-625C9D81A063}" type="datetimeFigureOut">
               <a:rPr lang="it-IT" smtClean="0"/>
-              <a:t>29/05/2020</a:t>
+              <a:t>05/06/2020</a:t>
             </a:fld>
             <a:endParaRPr lang="it-IT"/>
           </a:p>
@@ -2680,7 +2680,7 @@
           <a:p>
             <a:fld id="{3654AF55-DA74-4F8E-B7CA-625C9D81A063}" type="datetimeFigureOut">
               <a:rPr lang="it-IT" smtClean="0"/>
-              <a:t>29/05/2020</a:t>
+              <a:t>05/06/2020</a:t>
             </a:fld>
             <a:endParaRPr lang="it-IT"/>
           </a:p>
@@ -2921,7 +2921,7 @@
           <a:p>
             <a:fld id="{3654AF55-DA74-4F8E-B7CA-625C9D81A063}" type="datetimeFigureOut">
               <a:rPr lang="it-IT" smtClean="0"/>
-              <a:t>29/05/2020</a:t>
+              <a:t>05/06/2020</a:t>
             </a:fld>
             <a:endParaRPr lang="it-IT"/>
           </a:p>
@@ -3578,44 +3578,6 @@
           <a:chExt cx="0" cy="0"/>
         </a:xfrm>
       </p:grpSpPr>
-      <p:pic>
-        <p:nvPicPr>
-          <p:cNvPr id="14" name="Segnaposto contenuto 13" descr="Immagine che contiene screenshot&#10;&#10;Descrizione generata automaticamente">
-            <a:extLst>
-              <a:ext uri="{FF2B5EF4-FFF2-40B4-BE49-F238E27FC236}">
-                <a16:creationId xmlns:a16="http://schemas.microsoft.com/office/drawing/2014/main" id="{CECC5DE1-9F6E-4C63-A877-5D1016EB58CE}"/>
-              </a:ext>
-            </a:extLst>
-          </p:cNvPr>
-          <p:cNvPicPr>
-            <a:picLocks noGrp="1" noChangeAspect="1"/>
-          </p:cNvPicPr>
-          <p:nvPr>
-            <p:ph sz="half" idx="2"/>
-          </p:nvPr>
-        </p:nvPicPr>
-        <p:blipFill>
-          <a:blip r:embed="rId2">
-            <a:extLst>
-              <a:ext uri="{28A0092B-C50C-407E-A947-70E740481C1C}">
-                <a14:useLocalDpi xmlns:a14="http://schemas.microsoft.com/office/drawing/2010/main" val="0"/>
-              </a:ext>
-            </a:extLst>
-          </a:blip>
-          <a:stretch>
-            <a:fillRect/>
-          </a:stretch>
-        </p:blipFill>
-        <p:spPr>
-          <a:xfrm>
-            <a:off x="6829683" y="2055871"/>
-            <a:ext cx="5193819" cy="3933110"/>
-          </a:xfrm>
-          <a:prstGeom prst="rect">
-            <a:avLst/>
-          </a:prstGeom>
-        </p:spPr>
-      </p:pic>
       <mc:AlternateContent xmlns:mc="http://schemas.openxmlformats.org/markup-compatibility/2006" xmlns:a14="http://schemas.microsoft.com/office/drawing/2010/main">
         <mc:Choice Requires="a14">
           <p:sp>
@@ -3807,30 +3769,34 @@
       </mc:AlternateContent>
       <p:pic>
         <p:nvPicPr>
-          <p:cNvPr id="4" name="Segnaposto contenuto 3">
+          <p:cNvPr id="3" name="Immagine 2" descr="Immagine che contiene mappa&#10;&#10;Descrizione generata automaticamente">
             <a:extLst>
               <a:ext uri="{FF2B5EF4-FFF2-40B4-BE49-F238E27FC236}">
-                <a16:creationId xmlns:a16="http://schemas.microsoft.com/office/drawing/2014/main" id="{18D99A76-4728-4F13-A934-2576CED25CCC}"/>
+                <a16:creationId xmlns:a16="http://schemas.microsoft.com/office/drawing/2014/main" id="{1B6C72DB-FF24-4FCE-BD34-9C0375457618}"/>
               </a:ext>
             </a:extLst>
           </p:cNvPr>
           <p:cNvPicPr>
-            <a:picLocks noGrp="1" noChangeAspect="1"/>
+            <a:picLocks noChangeAspect="1"/>
           </p:cNvPicPr>
-          <p:nvPr>
-            <p:ph sz="half" idx="1"/>
-          </p:nvPr>
+          <p:nvPr/>
         </p:nvPicPr>
         <p:blipFill>
-          <a:blip r:embed="rId4"/>
+          <a:blip r:embed="rId4">
+            <a:extLst>
+              <a:ext uri="{28A0092B-C50C-407E-A947-70E740481C1C}">
+                <a14:useLocalDpi xmlns:a14="http://schemas.microsoft.com/office/drawing/2010/main" val="0"/>
+              </a:ext>
+            </a:extLst>
+          </a:blip>
           <a:stretch>
             <a:fillRect/>
           </a:stretch>
         </p:blipFill>
         <p:spPr>
           <a:xfrm>
-            <a:off x="428724" y="1471485"/>
-            <a:ext cx="5667276" cy="4536421"/>
+            <a:off x="2475738" y="1429677"/>
+            <a:ext cx="7240523" cy="5428323"/>
           </a:xfrm>
           <a:prstGeom prst="rect">
             <a:avLst/>
@@ -3867,42 +3833,6 @@
           <a:chExt cx="0" cy="0"/>
         </a:xfrm>
       </p:grpSpPr>
-      <p:pic>
-        <p:nvPicPr>
-          <p:cNvPr id="4" name="Immagine 3" descr="Immagine che contiene testo, mappa&#10;&#10;Descrizione generata automaticamente">
-            <a:extLst>
-              <a:ext uri="{FF2B5EF4-FFF2-40B4-BE49-F238E27FC236}">
-                <a16:creationId xmlns:a16="http://schemas.microsoft.com/office/drawing/2014/main" id="{80E64D1E-5AD0-4A09-8A31-170734A8BFBA}"/>
-              </a:ext>
-            </a:extLst>
-          </p:cNvPr>
-          <p:cNvPicPr>
-            <a:picLocks noChangeAspect="1"/>
-          </p:cNvPicPr>
-          <p:nvPr/>
-        </p:nvPicPr>
-        <p:blipFill>
-          <a:blip r:embed="rId2">
-            <a:extLst>
-              <a:ext uri="{28A0092B-C50C-407E-A947-70E740481C1C}">
-                <a14:useLocalDpi xmlns:a14="http://schemas.microsoft.com/office/drawing/2010/main" val="0"/>
-              </a:ext>
-            </a:extLst>
-          </a:blip>
-          <a:stretch>
-            <a:fillRect/>
-          </a:stretch>
-        </p:blipFill>
-        <p:spPr>
-          <a:xfrm>
-            <a:off x="6714446" y="1996225"/>
-            <a:ext cx="5477554" cy="4114009"/>
-          </a:xfrm>
-          <a:prstGeom prst="rect">
-            <a:avLst/>
-          </a:prstGeom>
-        </p:spPr>
-      </p:pic>
       <mc:AlternateContent xmlns:mc="http://schemas.openxmlformats.org/markup-compatibility/2006" xmlns:a14="http://schemas.microsoft.com/office/drawing/2010/main">
         <mc:Choice Requires="a14">
           <p:sp>
@@ -4061,10 +3991,10 @@
       </mc:AlternateContent>
       <p:pic>
         <p:nvPicPr>
-          <p:cNvPr id="2" name="Immagine 1">
+          <p:cNvPr id="3" name="Immagine 2" descr="Immagine che contiene testo, mappa&#10;&#10;Descrizione generata automaticamente">
             <a:extLst>
               <a:ext uri="{FF2B5EF4-FFF2-40B4-BE49-F238E27FC236}">
-                <a16:creationId xmlns:a16="http://schemas.microsoft.com/office/drawing/2014/main" id="{CC685619-9F25-4A96-A58A-03F64CA050E1}"/>
+                <a16:creationId xmlns:a16="http://schemas.microsoft.com/office/drawing/2014/main" id="{CE340F1F-1FC7-4549-925C-5CED89E2280C}"/>
               </a:ext>
             </a:extLst>
           </p:cNvPr>
@@ -4074,15 +4004,21 @@
           <p:nvPr/>
         </p:nvPicPr>
         <p:blipFill>
-          <a:blip r:embed="rId4"/>
+          <a:blip r:embed="rId4">
+            <a:extLst>
+              <a:ext uri="{28A0092B-C50C-407E-A947-70E740481C1C}">
+                <a14:useLocalDpi xmlns:a14="http://schemas.microsoft.com/office/drawing/2010/main" val="0"/>
+              </a:ext>
+            </a:extLst>
+          </a:blip>
           <a:stretch>
             <a:fillRect/>
           </a:stretch>
         </p:blipFill>
         <p:spPr>
           <a:xfrm>
-            <a:off x="618447" y="1630896"/>
-            <a:ext cx="5477553" cy="4334843"/>
+            <a:off x="2350789" y="1242324"/>
+            <a:ext cx="7490422" cy="5615676"/>
           </a:xfrm>
           <a:prstGeom prst="rect">
             <a:avLst/>
@@ -4119,42 +4055,6 @@
           <a:chExt cx="0" cy="0"/>
         </a:xfrm>
       </p:grpSpPr>
-      <p:pic>
-        <p:nvPicPr>
-          <p:cNvPr id="4" name="Immagine 3" descr="Immagine che contiene testo, mappa&#10;&#10;Descrizione generata automaticamente">
-            <a:extLst>
-              <a:ext uri="{FF2B5EF4-FFF2-40B4-BE49-F238E27FC236}">
-                <a16:creationId xmlns:a16="http://schemas.microsoft.com/office/drawing/2014/main" id="{2AF9E266-F1DC-4F7C-B513-0881B40CB7E0}"/>
-              </a:ext>
-            </a:extLst>
-          </p:cNvPr>
-          <p:cNvPicPr>
-            <a:picLocks noChangeAspect="1"/>
-          </p:cNvPicPr>
-          <p:nvPr/>
-        </p:nvPicPr>
-        <p:blipFill>
-          <a:blip r:embed="rId2">
-            <a:extLst>
-              <a:ext uri="{28A0092B-C50C-407E-A947-70E740481C1C}">
-                <a14:useLocalDpi xmlns:a14="http://schemas.microsoft.com/office/drawing/2010/main" val="0"/>
-              </a:ext>
-            </a:extLst>
-          </a:blip>
-          <a:stretch>
-            <a:fillRect/>
-          </a:stretch>
-        </p:blipFill>
-        <p:spPr>
-          <a:xfrm>
-            <a:off x="5820436" y="1868873"/>
-            <a:ext cx="6268533" cy="4812616"/>
-          </a:xfrm>
-          <a:prstGeom prst="rect">
-            <a:avLst/>
-          </a:prstGeom>
-        </p:spPr>
-      </p:pic>
       <mc:AlternateContent xmlns:mc="http://schemas.openxmlformats.org/markup-compatibility/2006" xmlns:a14="http://schemas.microsoft.com/office/drawing/2010/main">
         <mc:Choice Requires="a14">
           <p:sp>
@@ -4419,10 +4319,10 @@
       </mc:AlternateContent>
       <p:pic>
         <p:nvPicPr>
-          <p:cNvPr id="2" name="Immagine 1">
+          <p:cNvPr id="4" name="Immagine 3" descr="Immagine che contiene mappa&#10;&#10;Descrizione generata automaticamente">
             <a:extLst>
               <a:ext uri="{FF2B5EF4-FFF2-40B4-BE49-F238E27FC236}">
-                <a16:creationId xmlns:a16="http://schemas.microsoft.com/office/drawing/2014/main" id="{3344DAE9-B4E2-441D-BFFF-9762FBB605C7}"/>
+                <a16:creationId xmlns:a16="http://schemas.microsoft.com/office/drawing/2014/main" id="{C9601D24-3197-421A-81E3-0EB7F05F1457}"/>
               </a:ext>
             </a:extLst>
           </p:cNvPr>
@@ -4432,15 +4332,21 @@
           <p:nvPr/>
         </p:nvPicPr>
         <p:blipFill>
-          <a:blip r:embed="rId4"/>
+          <a:blip r:embed="rId4">
+            <a:extLst>
+              <a:ext uri="{28A0092B-C50C-407E-A947-70E740481C1C}">
+                <a14:useLocalDpi xmlns:a14="http://schemas.microsoft.com/office/drawing/2010/main" val="0"/>
+              </a:ext>
+            </a:extLst>
+          </a:blip>
           <a:stretch>
             <a:fillRect/>
           </a:stretch>
         </p:blipFill>
         <p:spPr>
           <a:xfrm>
-            <a:off x="581987" y="1478785"/>
-            <a:ext cx="5058959" cy="4416551"/>
+            <a:off x="504135" y="1200638"/>
+            <a:ext cx="11183730" cy="5657362"/>
           </a:xfrm>
           <a:prstGeom prst="rect">
             <a:avLst/>
@@ -4477,42 +4383,6 @@
           <a:chExt cx="0" cy="0"/>
         </a:xfrm>
       </p:grpSpPr>
-      <p:pic>
-        <p:nvPicPr>
-          <p:cNvPr id="3" name="Immagine 2" descr="Immagine che contiene mappa, testo&#10;&#10;Descrizione generata automaticamente">
-            <a:extLst>
-              <a:ext uri="{FF2B5EF4-FFF2-40B4-BE49-F238E27FC236}">
-                <a16:creationId xmlns:a16="http://schemas.microsoft.com/office/drawing/2014/main" id="{AAB1280C-8D08-489C-BEB3-30FF5F208E60}"/>
-              </a:ext>
-            </a:extLst>
-          </p:cNvPr>
-          <p:cNvPicPr>
-            <a:picLocks noChangeAspect="1"/>
-          </p:cNvPicPr>
-          <p:nvPr/>
-        </p:nvPicPr>
-        <p:blipFill>
-          <a:blip r:embed="rId2">
-            <a:extLst>
-              <a:ext uri="{28A0092B-C50C-407E-A947-70E740481C1C}">
-                <a14:useLocalDpi xmlns:a14="http://schemas.microsoft.com/office/drawing/2010/main" val="0"/>
-              </a:ext>
-            </a:extLst>
-          </a:blip>
-          <a:stretch>
-            <a:fillRect/>
-          </a:stretch>
-        </p:blipFill>
-        <p:spPr>
-          <a:xfrm>
-            <a:off x="6408283" y="1356972"/>
-            <a:ext cx="5471434" cy="4824897"/>
-          </a:xfrm>
-          <a:prstGeom prst="rect">
-            <a:avLst/>
-          </a:prstGeom>
-        </p:spPr>
-      </p:pic>
       <mc:AlternateContent xmlns:mc="http://schemas.openxmlformats.org/markup-compatibility/2006" xmlns:a14="http://schemas.microsoft.com/office/drawing/2010/main">
         <mc:Choice Requires="a14">
           <p:sp>
@@ -4697,10 +4567,10 @@
       </mc:AlternateContent>
       <p:pic>
         <p:nvPicPr>
-          <p:cNvPr id="2" name="Immagine 1">
+          <p:cNvPr id="4" name="Immagine 3" descr="Immagine che contiene mappa, testo&#10;&#10;Descrizione generata automaticamente">
             <a:extLst>
               <a:ext uri="{FF2B5EF4-FFF2-40B4-BE49-F238E27FC236}">
-                <a16:creationId xmlns:a16="http://schemas.microsoft.com/office/drawing/2014/main" id="{FBD3B712-DBC2-4827-8F4E-8D51D2F6B464}"/>
+                <a16:creationId xmlns:a16="http://schemas.microsoft.com/office/drawing/2014/main" id="{582C7973-D4D3-49D2-A59B-A898B7DA7F92}"/>
               </a:ext>
             </a:extLst>
           </p:cNvPr>
@@ -4710,15 +4580,21 @@
           <p:nvPr/>
         </p:nvPicPr>
         <p:blipFill>
-          <a:blip r:embed="rId4"/>
+          <a:blip r:embed="rId4">
+            <a:extLst>
+              <a:ext uri="{28A0092B-C50C-407E-A947-70E740481C1C}">
+                <a14:useLocalDpi xmlns:a14="http://schemas.microsoft.com/office/drawing/2010/main" val="0"/>
+              </a:ext>
+            </a:extLst>
+          </a:blip>
           <a:stretch>
             <a:fillRect/>
           </a:stretch>
         </p:blipFill>
         <p:spPr>
           <a:xfrm>
-            <a:off x="71125" y="867323"/>
-            <a:ext cx="6024875" cy="5259811"/>
+            <a:off x="2100531" y="867323"/>
+            <a:ext cx="7990937" cy="5990919"/>
           </a:xfrm>
           <a:prstGeom prst="rect">
             <a:avLst/>
@@ -4772,14 +4648,14 @@
               <p:nvPr>
                 <p:extLst>
                   <p:ext uri="{D42A27DB-BD31-4B8C-83A1-F6EECF244321}">
-                    <p14:modId xmlns:p14="http://schemas.microsoft.com/office/powerpoint/2010/main" val="1183912011"/>
+                    <p14:modId xmlns:p14="http://schemas.microsoft.com/office/powerpoint/2010/main" val="1616557773"/>
                   </p:ext>
                 </p:extLst>
               </p:nvPr>
             </p:nvGraphicFramePr>
             <p:xfrm>
-              <a:off x="328769" y="669396"/>
-              <a:ext cx="5664200" cy="4971550"/>
+              <a:off x="431798" y="1815882"/>
+              <a:ext cx="5664200" cy="4955121"/>
             </p:xfrm>
             <a:graphic>
               <a:graphicData uri="http://schemas.openxmlformats.org/drawingml/2006/table">
@@ -4803,7 +4679,7 @@
                       </a:extLst>
                     </a:gridCol>
                   </a:tblGrid>
-                  <a:tr h="0">
+                  <a:tr h="350580">
                     <a:tc>
                       <a:txBody>
                         <a:bodyPr/>
@@ -4837,7 +4713,7 @@
                       </a:ext>
                     </a:extLst>
                   </a:tr>
-                  <a:tr h="345907">
+                  <a:tr h="350580">
                     <a:tc>
                       <a:txBody>
                         <a:bodyPr/>
@@ -4951,7 +4827,7 @@
                       </a:ext>
                     </a:extLst>
                   </a:tr>
-                  <a:tr h="345907">
+                  <a:tr h="350580">
                     <a:tc>
                       <a:txBody>
                         <a:bodyPr/>
@@ -5054,7 +4930,7 @@
                       </a:ext>
                     </a:extLst>
                   </a:tr>
-                  <a:tr h="345907">
+                  <a:tr h="350580">
                     <a:tc>
                       <a:txBody>
                         <a:bodyPr/>
@@ -5116,7 +4992,7 @@
                       </a:ext>
                     </a:extLst>
                   </a:tr>
-                  <a:tr h="345907">
+                  <a:tr h="350580">
                     <a:tc>
                       <a:txBody>
                         <a:bodyPr/>
@@ -5195,7 +5071,7 @@
                       </a:ext>
                     </a:extLst>
                   </a:tr>
-                  <a:tr h="345907">
+                  <a:tr h="350580">
                     <a:tc>
                       <a:txBody>
                         <a:bodyPr/>
@@ -5275,7 +5151,7 @@
                       </a:ext>
                     </a:extLst>
                   </a:tr>
-                  <a:tr h="340556">
+                  <a:tr h="350580">
                     <a:tc>
                       <a:txBody>
                         <a:bodyPr/>
@@ -5354,7 +5230,7 @@
                       </a:ext>
                     </a:extLst>
                   </a:tr>
-                  <a:tr h="345907">
+                  <a:tr h="350580">
                     <a:tc>
                       <a:txBody>
                         <a:bodyPr/>
@@ -5433,7 +5309,7 @@
                       </a:ext>
                     </a:extLst>
                   </a:tr>
-                  <a:tr h="607080">
+                  <a:tr h="615281">
                     <a:tc>
                       <a:txBody>
                         <a:bodyPr/>
@@ -5516,7 +5392,7 @@
                                           <a:rPr lang="it-IT" b="0" i="1" smtClean="0">
                                             <a:latin typeface="Cambria Math" panose="02040503050406030204" pitchFamily="18" charset="0"/>
                                           </a:rPr>
-                                          <m:t>10</m:t>
+                                          <m:t>6</m:t>
                                         </m:r>
                                         <m:r>
                                           <a:rPr lang="it-IT" b="0" i="1" smtClean="0">
@@ -5558,7 +5434,7 @@
                       </a:ext>
                     </a:extLst>
                   </a:tr>
-                  <a:tr h="607080">
+                  <a:tr h="615281">
                     <a:tc>
                       <a:txBody>
                         <a:bodyPr/>
@@ -5641,7 +5517,7 @@
                                           <a:rPr lang="it-IT" b="0" i="1" smtClean="0">
                                             <a:latin typeface="Cambria Math" panose="02040503050406030204" pitchFamily="18" charset="0"/>
                                           </a:rPr>
-                                          <m:t>30</m:t>
+                                          <m:t>25</m:t>
                                         </m:r>
                                         <m:r>
                                           <a:rPr lang="it-IT" b="0" i="1" smtClean="0">
@@ -5683,7 +5559,7 @@
                       </a:ext>
                     </a:extLst>
                   </a:tr>
-                  <a:tr h="362381">
+                  <a:tr h="350580">
                     <a:tc>
                       <a:txBody>
                         <a:bodyPr/>
@@ -5764,7 +5640,7 @@
                       </a:ext>
                     </a:extLst>
                   </a:tr>
-                  <a:tr h="395866">
+                  <a:tr h="379437">
                     <a:tc>
                       <a:txBody>
                         <a:bodyPr/>
@@ -5866,14 +5742,14 @@
               <p:nvPr>
                 <p:extLst>
                   <p:ext uri="{D42A27DB-BD31-4B8C-83A1-F6EECF244321}">
-                    <p14:modId xmlns:p14="http://schemas.microsoft.com/office/powerpoint/2010/main" val="1183912011"/>
+                    <p14:modId xmlns:p14="http://schemas.microsoft.com/office/powerpoint/2010/main" val="1616557773"/>
                   </p:ext>
                 </p:extLst>
               </p:nvPr>
             </p:nvGraphicFramePr>
             <p:xfrm>
-              <a:off x="328769" y="669396"/>
-              <a:ext cx="5664200" cy="4971550"/>
+              <a:off x="431798" y="1815882"/>
+              <a:ext cx="5664200" cy="4955121"/>
             </p:xfrm>
             <a:graphic>
               <a:graphicData uri="http://schemas.openxmlformats.org/drawingml/2006/table">
@@ -6588,7 +6464,7 @@
                         <a:blipFill>
                           <a:blip r:embed="rId2"/>
                           <a:stretch>
-                            <a:fillRect l="-100430" t="-462857" r="-860" b="-229524"/>
+                            <a:fillRect l="-100215" t="-462857" r="-1075" b="-229524"/>
                           </a:stretch>
                         </a:blipFill>
                       </a:tcPr>
@@ -6660,7 +6536,7 @@
                         <a:blipFill>
                           <a:blip r:embed="rId2"/>
                           <a:stretch>
-                            <a:fillRect l="-100430" t="-557547" r="-860" b="-127358"/>
+                            <a:fillRect l="-100215" t="-557547" r="-1075" b="-127358"/>
                           </a:stretch>
                         </a:blipFill>
                       </a:tcPr>
@@ -6733,7 +6609,6 @@
                         <a:bodyPr/>
                         <a:lstStyle/>
                         <a:p>
-                          <a:pPr/>
                           <a:r>
                             <a:rPr lang="it-IT" dirty="0"/>
                             <a:t>Ideal </a:t>
@@ -6753,7 +6628,7 @@
                       </a:ext>
                     </a:extLst>
                   </a:tr>
-                  <a:tr h="395866">
+                  <a:tr h="379437">
                     <a:tc>
                       <a:txBody>
                         <a:bodyPr/>
@@ -6815,7 +6690,6 @@
                         <a:bodyPr/>
                         <a:lstStyle/>
                         <a:p>
-                          <a:pPr/>
                           <a:r>
                             <a:rPr lang="it-IT" dirty="0"/>
                             <a:t>Ideal </a:t>
@@ -6858,13 +6732,13 @@
               <p:nvPr>
                 <p:extLst>
                   <p:ext uri="{D42A27DB-BD31-4B8C-83A1-F6EECF244321}">
-                    <p14:modId xmlns:p14="http://schemas.microsoft.com/office/powerpoint/2010/main" val="3815450332"/>
+                    <p14:modId xmlns:p14="http://schemas.microsoft.com/office/powerpoint/2010/main" val="2145387242"/>
                   </p:ext>
                 </p:extLst>
               </p:nvPr>
             </p:nvGraphicFramePr>
             <p:xfrm>
-              <a:off x="6311184" y="669396"/>
+              <a:off x="6311898" y="1815882"/>
               <a:ext cx="5664200" cy="4389120"/>
             </p:xfrm>
             <a:graphic>
@@ -7697,13 +7571,13 @@
               <p:nvPr>
                 <p:extLst>
                   <p:ext uri="{D42A27DB-BD31-4B8C-83A1-F6EECF244321}">
-                    <p14:modId xmlns:p14="http://schemas.microsoft.com/office/powerpoint/2010/main" val="3815450332"/>
+                    <p14:modId xmlns:p14="http://schemas.microsoft.com/office/powerpoint/2010/main" val="2145387242"/>
                   </p:ext>
                 </p:extLst>
               </p:nvPr>
             </p:nvGraphicFramePr>
             <p:xfrm>
-              <a:off x="6311184" y="669396"/>
+              <a:off x="6311898" y="1815882"/>
               <a:ext cx="5664200" cy="4389120"/>
             </p:xfrm>
             <a:graphic>
@@ -8350,6 +8224,127 @@
           </p:graphicFrame>
         </mc:Fallback>
       </mc:AlternateContent>
+      <p:sp>
+        <p:nvSpPr>
+          <p:cNvPr id="3" name="CasellaDiTesto 2">
+            <a:extLst>
+              <a:ext uri="{FF2B5EF4-FFF2-40B4-BE49-F238E27FC236}">
+                <a16:creationId xmlns:a16="http://schemas.microsoft.com/office/drawing/2014/main" id="{5C0C35E3-FCDC-409B-B037-48B1D5B2146D}"/>
+              </a:ext>
+            </a:extLst>
+          </p:cNvPr>
+          <p:cNvSpPr txBox="1"/>
+          <p:nvPr/>
+        </p:nvSpPr>
+        <p:spPr>
+          <a:xfrm>
+            <a:off x="-1" y="0"/>
+            <a:ext cx="12191999" cy="1815882"/>
+          </a:xfrm>
+          <a:prstGeom prst="rect">
+            <a:avLst/>
+          </a:prstGeom>
+          <a:noFill/>
+        </p:spPr>
+        <p:txBody>
+          <a:bodyPr wrap="square" rtlCol="0">
+            <a:spAutoFit/>
+          </a:bodyPr>
+          <a:lstStyle/>
+          <a:p>
+            <a:pPr algn="ctr"/>
+            <a:r>
+              <a:rPr lang="it-IT" sz="2800" dirty="0"/>
+              <a:t>Source: Sarah L. </a:t>
+            </a:r>
+            <a:r>
+              <a:rPr lang="it-IT" sz="2800" dirty="0" err="1"/>
+              <a:t>Howell</a:t>
+            </a:r>
+            <a:r>
+              <a:rPr lang="it-IT" sz="2800" dirty="0"/>
+              <a:t>, Deep </a:t>
+            </a:r>
+            <a:r>
+              <a:rPr lang="it-IT" sz="2800" dirty="0" err="1"/>
+              <a:t>Jariwala</a:t>
+            </a:r>
+            <a:r>
+              <a:rPr lang="it-IT" sz="2800" dirty="0"/>
+              <a:t>, Chung-Chiang </a:t>
+            </a:r>
+            <a:r>
+              <a:rPr lang="it-IT" sz="2800" dirty="0" err="1"/>
+              <a:t>Wu</a:t>
+            </a:r>
+            <a:r>
+              <a:rPr lang="it-IT" sz="2800" dirty="0"/>
+              <a:t>, </a:t>
+            </a:r>
+            <a:r>
+              <a:rPr lang="it-IT" sz="2800" dirty="0" err="1"/>
+              <a:t>Kan-Sheng</a:t>
+            </a:r>
+            <a:r>
+              <a:rPr lang="it-IT" sz="2800" dirty="0"/>
+              <a:t> Chen, </a:t>
+            </a:r>
+            <a:r>
+              <a:rPr lang="it-IT" sz="2800" dirty="0" err="1"/>
+              <a:t>Vinod</a:t>
+            </a:r>
+            <a:r>
+              <a:rPr lang="it-IT" sz="2800" dirty="0"/>
+              <a:t> K. </a:t>
+            </a:r>
+            <a:r>
+              <a:rPr lang="it-IT" sz="2800" dirty="0" err="1"/>
+              <a:t>Sangwan</a:t>
+            </a:r>
+            <a:r>
+              <a:rPr lang="it-IT" sz="2800" dirty="0"/>
+              <a:t>, </a:t>
+            </a:r>
+            <a:r>
+              <a:rPr lang="it-IT" sz="2800" dirty="0" err="1"/>
+              <a:t>Junmo</a:t>
+            </a:r>
+            <a:r>
+              <a:rPr lang="it-IT" sz="2800" dirty="0"/>
+              <a:t> Kang, Tobin J. </a:t>
+            </a:r>
+            <a:r>
+              <a:rPr lang="it-IT" sz="2800" dirty="0" err="1"/>
+              <a:t>Marks</a:t>
+            </a:r>
+            <a:r>
+              <a:rPr lang="it-IT" sz="2800" dirty="0"/>
+              <a:t>, Mark C. </a:t>
+            </a:r>
+            <a:r>
+              <a:rPr lang="it-IT" sz="2800" dirty="0" err="1"/>
+              <a:t>Hersam</a:t>
+            </a:r>
+            <a:r>
+              <a:rPr lang="it-IT" sz="2800" dirty="0"/>
+              <a:t> and Lincoln J. </a:t>
+            </a:r>
+            <a:r>
+              <a:rPr lang="it-IT" sz="2800" dirty="0" err="1"/>
+              <a:t>Lauhon</a:t>
+            </a:r>
+            <a:r>
+              <a:rPr lang="it-IT" sz="2800" dirty="0"/>
+              <a:t>, </a:t>
+            </a:r>
+            <a:r>
+              <a:rPr lang="en-US" sz="2800" b="1" dirty="0"/>
+              <a:t>“Investigation of Band-Offsets at Monolayer-Multilayer MoS2 Junctions by Scanning Photocurrent”</a:t>
+            </a:r>
+            <a:endParaRPr lang="it-IT" sz="2800" dirty="0"/>
+          </a:p>
+        </p:txBody>
+      </p:sp>
     </p:spTree>
     <p:extLst>
       <p:ext uri="{BB962C8B-B14F-4D97-AF65-F5344CB8AC3E}">
@@ -8380,42 +8375,6 @@
           <a:chExt cx="0" cy="0"/>
         </a:xfrm>
       </p:grpSpPr>
-      <p:pic>
-        <p:nvPicPr>
-          <p:cNvPr id="3" name="Immagine 2" descr="Immagine che contiene testo&#10;&#10;Descrizione generata automaticamente">
-            <a:extLst>
-              <a:ext uri="{FF2B5EF4-FFF2-40B4-BE49-F238E27FC236}">
-                <a16:creationId xmlns:a16="http://schemas.microsoft.com/office/drawing/2014/main" id="{A98630E4-0129-48C1-890E-0B41A6116314}"/>
-              </a:ext>
-            </a:extLst>
-          </p:cNvPr>
-          <p:cNvPicPr>
-            <a:picLocks noChangeAspect="1"/>
-          </p:cNvPicPr>
-          <p:nvPr/>
-        </p:nvPicPr>
-        <p:blipFill>
-          <a:blip r:embed="rId2">
-            <a:extLst>
-              <a:ext uri="{28A0092B-C50C-407E-A947-70E740481C1C}">
-                <a14:useLocalDpi xmlns:a14="http://schemas.microsoft.com/office/drawing/2010/main" val="0"/>
-              </a:ext>
-            </a:extLst>
-          </a:blip>
-          <a:stretch>
-            <a:fillRect/>
-          </a:stretch>
-        </p:blipFill>
-        <p:spPr>
-          <a:xfrm>
-            <a:off x="6825803" y="1444704"/>
-            <a:ext cx="5095742" cy="4646692"/>
-          </a:xfrm>
-          <a:prstGeom prst="rect">
-            <a:avLst/>
-          </a:prstGeom>
-        </p:spPr>
-      </p:pic>
       <mc:AlternateContent xmlns:mc="http://schemas.openxmlformats.org/markup-compatibility/2006" xmlns:a14="http://schemas.microsoft.com/office/drawing/2010/main">
         <mc:Choice Requires="a14">
           <p:sp>
@@ -8548,10 +8507,10 @@
       </mc:AlternateContent>
       <p:pic>
         <p:nvPicPr>
-          <p:cNvPr id="6" name="Immagine 5">
+          <p:cNvPr id="3" name="Immagine 2" descr="Immagine che contiene mappa, testo&#10;&#10;Descrizione generata automaticamente">
             <a:extLst>
               <a:ext uri="{FF2B5EF4-FFF2-40B4-BE49-F238E27FC236}">
-                <a16:creationId xmlns:a16="http://schemas.microsoft.com/office/drawing/2014/main" id="{C40E728F-4466-4786-84D5-169B5730C029}"/>
+                <a16:creationId xmlns:a16="http://schemas.microsoft.com/office/drawing/2014/main" id="{625FE28A-3690-44C9-89A2-085FA0F6E876}"/>
               </a:ext>
             </a:extLst>
           </p:cNvPr>
@@ -8561,15 +8520,21 @@
           <p:nvPr/>
         </p:nvPicPr>
         <p:blipFill>
-          <a:blip r:embed="rId4"/>
+          <a:blip r:embed="rId4">
+            <a:extLst>
+              <a:ext uri="{28A0092B-C50C-407E-A947-70E740481C1C}">
+                <a14:useLocalDpi xmlns:a14="http://schemas.microsoft.com/office/drawing/2010/main" val="0"/>
+              </a:ext>
+            </a:extLst>
+          </a:blip>
           <a:stretch>
             <a:fillRect/>
           </a:stretch>
         </p:blipFill>
         <p:spPr>
           <a:xfrm>
-            <a:off x="270455" y="892983"/>
-            <a:ext cx="6284891" cy="5030797"/>
+            <a:off x="2033521" y="766604"/>
+            <a:ext cx="8124957" cy="6091396"/>
           </a:xfrm>
           <a:prstGeom prst="rect">
             <a:avLst/>
@@ -8606,42 +8571,6 @@
           <a:chExt cx="0" cy="0"/>
         </a:xfrm>
       </p:grpSpPr>
-      <p:pic>
-        <p:nvPicPr>
-          <p:cNvPr id="3" name="Immagine 2" descr="Immagine che contiene testo, mappa&#10;&#10;Descrizione generata automaticamente">
-            <a:extLst>
-              <a:ext uri="{FF2B5EF4-FFF2-40B4-BE49-F238E27FC236}">
-                <a16:creationId xmlns:a16="http://schemas.microsoft.com/office/drawing/2014/main" id="{752C41D0-FB7C-472D-9B47-3D3411038B50}"/>
-              </a:ext>
-            </a:extLst>
-          </p:cNvPr>
-          <p:cNvPicPr>
-            <a:picLocks noChangeAspect="1"/>
-          </p:cNvPicPr>
-          <p:nvPr/>
-        </p:nvPicPr>
-        <p:blipFill>
-          <a:blip r:embed="rId2">
-            <a:extLst>
-              <a:ext uri="{28A0092B-C50C-407E-A947-70E740481C1C}">
-                <a14:useLocalDpi xmlns:a14="http://schemas.microsoft.com/office/drawing/2010/main" val="0"/>
-              </a:ext>
-            </a:extLst>
-          </a:blip>
-          <a:stretch>
-            <a:fillRect/>
-          </a:stretch>
-        </p:blipFill>
-        <p:spPr>
-          <a:xfrm>
-            <a:off x="6503831" y="1276818"/>
-            <a:ext cx="5043724" cy="4585204"/>
-          </a:xfrm>
-          <a:prstGeom prst="rect">
-            <a:avLst/>
-          </a:prstGeom>
-        </p:spPr>
-      </p:pic>
       <mc:AlternateContent xmlns:mc="http://schemas.openxmlformats.org/markup-compatibility/2006" xmlns:a14="http://schemas.microsoft.com/office/drawing/2010/main">
         <mc:Choice Requires="a14">
           <p:sp>
@@ -8780,10 +8709,10 @@
       </mc:AlternateContent>
       <p:pic>
         <p:nvPicPr>
-          <p:cNvPr id="5" name="Immagine 4">
+          <p:cNvPr id="5" name="Immagine 4" descr="Immagine che contiene mappa, screenshot&#10;&#10;Descrizione generata automaticamente">
             <a:extLst>
               <a:ext uri="{FF2B5EF4-FFF2-40B4-BE49-F238E27FC236}">
-                <a16:creationId xmlns:a16="http://schemas.microsoft.com/office/drawing/2014/main" id="{98661E2C-8E48-4084-9C41-6AC7A7DE8593}"/>
+                <a16:creationId xmlns:a16="http://schemas.microsoft.com/office/drawing/2014/main" id="{B6F9321E-F9DC-4DC0-A08B-E2D7350FF4CB}"/>
               </a:ext>
             </a:extLst>
           </p:cNvPr>
@@ -8793,15 +8722,21 @@
           <p:nvPr/>
         </p:nvPicPr>
         <p:blipFill>
-          <a:blip r:embed="rId4"/>
+          <a:blip r:embed="rId4">
+            <a:extLst>
+              <a:ext uri="{28A0092B-C50C-407E-A947-70E740481C1C}">
+                <a14:useLocalDpi xmlns:a14="http://schemas.microsoft.com/office/drawing/2010/main" val="0"/>
+              </a:ext>
+            </a:extLst>
+          </a:blip>
           <a:stretch>
             <a:fillRect/>
           </a:stretch>
         </p:blipFill>
         <p:spPr>
           <a:xfrm>
-            <a:off x="206564" y="845191"/>
-            <a:ext cx="6168479" cy="4937613"/>
+            <a:off x="2085932" y="845191"/>
+            <a:ext cx="8020135" cy="6012809"/>
           </a:xfrm>
           <a:prstGeom prst="rect">
             <a:avLst/>
@@ -8838,42 +8773,6 @@
           <a:chExt cx="0" cy="0"/>
         </a:xfrm>
       </p:grpSpPr>
-      <p:pic>
-        <p:nvPicPr>
-          <p:cNvPr id="5" name="Immagine 4" descr="Immagine che contiene mappa, testo&#10;&#10;Descrizione generata automaticamente">
-            <a:extLst>
-              <a:ext uri="{FF2B5EF4-FFF2-40B4-BE49-F238E27FC236}">
-                <a16:creationId xmlns:a16="http://schemas.microsoft.com/office/drawing/2014/main" id="{39CB754B-F5DD-44CE-8F6F-49A401AD39F1}"/>
-              </a:ext>
-            </a:extLst>
-          </p:cNvPr>
-          <p:cNvPicPr>
-            <a:picLocks noChangeAspect="1"/>
-          </p:cNvPicPr>
-          <p:nvPr/>
-        </p:nvPicPr>
-        <p:blipFill>
-          <a:blip r:embed="rId2">
-            <a:extLst>
-              <a:ext uri="{28A0092B-C50C-407E-A947-70E740481C1C}">
-                <a14:useLocalDpi xmlns:a14="http://schemas.microsoft.com/office/drawing/2010/main" val="0"/>
-              </a:ext>
-            </a:extLst>
-          </a:blip>
-          <a:stretch>
-            <a:fillRect/>
-          </a:stretch>
-        </p:blipFill>
-        <p:spPr>
-          <a:xfrm>
-            <a:off x="6423406" y="1533670"/>
-            <a:ext cx="4808737" cy="4364853"/>
-          </a:xfrm>
-          <a:prstGeom prst="rect">
-            <a:avLst/>
-          </a:prstGeom>
-        </p:spPr>
-      </p:pic>
       <mc:AlternateContent xmlns:mc="http://schemas.openxmlformats.org/markup-compatibility/2006" xmlns:a14="http://schemas.microsoft.com/office/drawing/2010/main">
         <mc:Choice Requires="a14">
           <p:sp>
@@ -9018,10 +8917,10 @@
       </mc:AlternateContent>
       <p:pic>
         <p:nvPicPr>
-          <p:cNvPr id="2" name="Immagine 1">
+          <p:cNvPr id="4" name="Immagine 3" descr="Immagine che contiene mappa, tavolo, camion, gruppo&#10;&#10;Descrizione generata automaticamente">
             <a:extLst>
               <a:ext uri="{FF2B5EF4-FFF2-40B4-BE49-F238E27FC236}">
-                <a16:creationId xmlns:a16="http://schemas.microsoft.com/office/drawing/2014/main" id="{CC850F58-77FD-4512-B3FA-19AEA945B191}"/>
+                <a16:creationId xmlns:a16="http://schemas.microsoft.com/office/drawing/2014/main" id="{900748FB-5ECF-4AC2-944D-8EDD5A4C1E80}"/>
               </a:ext>
             </a:extLst>
           </p:cNvPr>
@@ -9031,15 +8930,21 @@
           <p:nvPr/>
         </p:nvPicPr>
         <p:blipFill>
-          <a:blip r:embed="rId4"/>
+          <a:blip r:embed="rId4">
+            <a:extLst>
+              <a:ext uri="{28A0092B-C50C-407E-A947-70E740481C1C}">
+                <a14:useLocalDpi xmlns:a14="http://schemas.microsoft.com/office/drawing/2010/main" val="0"/>
+              </a:ext>
+            </a:extLst>
+          </a:blip>
           <a:stretch>
             <a:fillRect/>
           </a:stretch>
         </p:blipFill>
         <p:spPr>
           <a:xfrm>
-            <a:off x="413223" y="1184955"/>
-            <a:ext cx="5183695" cy="4488089"/>
+            <a:off x="-1" y="833057"/>
+            <a:ext cx="12192000" cy="6024943"/>
           </a:xfrm>
           <a:prstGeom prst="rect">
             <a:avLst/>
@@ -9076,42 +8981,6 @@
           <a:chExt cx="0" cy="0"/>
         </a:xfrm>
       </p:grpSpPr>
-      <p:pic>
-        <p:nvPicPr>
-          <p:cNvPr id="5" name="Immagine 4" descr="Immagine che contiene testo, mappa&#10;&#10;Descrizione generata automaticamente">
-            <a:extLst>
-              <a:ext uri="{FF2B5EF4-FFF2-40B4-BE49-F238E27FC236}">
-                <a16:creationId xmlns:a16="http://schemas.microsoft.com/office/drawing/2014/main" id="{074B4F78-5ED8-4AD1-9B44-F51BC121B88B}"/>
-              </a:ext>
-            </a:extLst>
-          </p:cNvPr>
-          <p:cNvPicPr>
-            <a:picLocks noChangeAspect="1"/>
-          </p:cNvPicPr>
-          <p:nvPr/>
-        </p:nvPicPr>
-        <p:blipFill>
-          <a:blip r:embed="rId2">
-            <a:extLst>
-              <a:ext uri="{28A0092B-C50C-407E-A947-70E740481C1C}">
-                <a14:useLocalDpi xmlns:a14="http://schemas.microsoft.com/office/drawing/2010/main" val="0"/>
-              </a:ext>
-            </a:extLst>
-          </a:blip>
-          <a:stretch>
-            <a:fillRect/>
-          </a:stretch>
-        </p:blipFill>
-        <p:spPr>
-          <a:xfrm>
-            <a:off x="6656578" y="1506828"/>
-            <a:ext cx="4904357" cy="4311522"/>
-          </a:xfrm>
-          <a:prstGeom prst="rect">
-            <a:avLst/>
-          </a:prstGeom>
-        </p:spPr>
-      </p:pic>
       <mc:AlternateContent xmlns:mc="http://schemas.openxmlformats.org/markup-compatibility/2006" xmlns:a14="http://schemas.microsoft.com/office/drawing/2010/main">
         <mc:Choice Requires="a14">
           <p:sp>
@@ -9244,10 +9113,10 @@
       </mc:AlternateContent>
       <p:pic>
         <p:nvPicPr>
-          <p:cNvPr id="2" name="Immagine 1">
+          <p:cNvPr id="4" name="Immagine 3" descr="Immagine che contiene testo, mappa&#10;&#10;Descrizione generata automaticamente">
             <a:extLst>
               <a:ext uri="{FF2B5EF4-FFF2-40B4-BE49-F238E27FC236}">
-                <a16:creationId xmlns:a16="http://schemas.microsoft.com/office/drawing/2014/main" id="{BBEA894D-4256-4FD9-990F-79A2767CAA90}"/>
+                <a16:creationId xmlns:a16="http://schemas.microsoft.com/office/drawing/2014/main" id="{9BE35883-AAB6-418B-A2A2-CAC4E4364B02}"/>
               </a:ext>
             </a:extLst>
           </p:cNvPr>
@@ -9257,15 +9126,21 @@
           <p:nvPr/>
         </p:nvPicPr>
         <p:blipFill>
-          <a:blip r:embed="rId4"/>
+          <a:blip r:embed="rId4">
+            <a:extLst>
+              <a:ext uri="{28A0092B-C50C-407E-A947-70E740481C1C}">
+                <a14:useLocalDpi xmlns:a14="http://schemas.microsoft.com/office/drawing/2010/main" val="0"/>
+              </a:ext>
+            </a:extLst>
+          </a:blip>
           <a:stretch>
             <a:fillRect/>
           </a:stretch>
         </p:blipFill>
         <p:spPr>
           <a:xfrm>
-            <a:off x="786710" y="1184955"/>
-            <a:ext cx="5183695" cy="4488089"/>
+            <a:off x="2077344" y="832313"/>
+            <a:ext cx="8037312" cy="6025687"/>
           </a:xfrm>
           <a:prstGeom prst="rect">
             <a:avLst/>
@@ -9563,13 +9438,13 @@
               <p:nvPr>
                 <p:extLst>
                   <p:ext uri="{D42A27DB-BD31-4B8C-83A1-F6EECF244321}">
-                    <p14:modId xmlns:p14="http://schemas.microsoft.com/office/powerpoint/2010/main" val="490115528"/>
+                    <p14:modId xmlns:p14="http://schemas.microsoft.com/office/powerpoint/2010/main" val="3420919154"/>
                   </p:ext>
                 </p:extLst>
               </p:nvPr>
             </p:nvGraphicFramePr>
             <p:xfrm>
-              <a:off x="292458" y="822039"/>
+              <a:off x="292458" y="1440225"/>
               <a:ext cx="5664200" cy="5213922"/>
             </p:xfrm>
             <a:graphic>
@@ -10545,13 +10420,13 @@
               <p:nvPr>
                 <p:extLst>
                   <p:ext uri="{D42A27DB-BD31-4B8C-83A1-F6EECF244321}">
-                    <p14:modId xmlns:p14="http://schemas.microsoft.com/office/powerpoint/2010/main" val="490115528"/>
+                    <p14:modId xmlns:p14="http://schemas.microsoft.com/office/powerpoint/2010/main" val="3420919154"/>
                   </p:ext>
                 </p:extLst>
               </p:nvPr>
             </p:nvGraphicFramePr>
             <p:xfrm>
-              <a:off x="292458" y="822039"/>
+              <a:off x="292458" y="1440225"/>
               <a:ext cx="5664200" cy="5213922"/>
             </p:xfrm>
             <a:graphic>
@@ -11103,7 +10978,7 @@
                         <a:blipFill>
                           <a:blip r:embed="rId2"/>
                           <a:stretch>
-                            <a:fillRect l="-100430" t="-348571" r="-860" b="-386667"/>
+                            <a:fillRect l="-100430" t="-344340" r="-860" b="-383019"/>
                           </a:stretch>
                         </a:blipFill>
                       </a:tcPr>
@@ -11476,13 +11351,13 @@
               <p:nvPr>
                 <p:extLst>
                   <p:ext uri="{D42A27DB-BD31-4B8C-83A1-F6EECF244321}">
-                    <p14:modId xmlns:p14="http://schemas.microsoft.com/office/powerpoint/2010/main" val="3655751562"/>
+                    <p14:modId xmlns:p14="http://schemas.microsoft.com/office/powerpoint/2010/main" val="3003672838"/>
                   </p:ext>
                 </p:extLst>
               </p:nvPr>
             </p:nvGraphicFramePr>
             <p:xfrm>
-              <a:off x="6096000" y="822039"/>
+              <a:off x="6235344" y="1440225"/>
               <a:ext cx="5191697" cy="3931920"/>
             </p:xfrm>
             <a:graphic>
@@ -12109,13 +11984,13 @@
               <p:nvPr>
                 <p:extLst>
                   <p:ext uri="{D42A27DB-BD31-4B8C-83A1-F6EECF244321}">
-                    <p14:modId xmlns:p14="http://schemas.microsoft.com/office/powerpoint/2010/main" val="3655751562"/>
+                    <p14:modId xmlns:p14="http://schemas.microsoft.com/office/powerpoint/2010/main" val="3003672838"/>
                   </p:ext>
                 </p:extLst>
               </p:nvPr>
             </p:nvGraphicFramePr>
             <p:xfrm>
-              <a:off x="6096000" y="822039"/>
+              <a:off x="6235344" y="1440225"/>
               <a:ext cx="5191697" cy="3931920"/>
             </p:xfrm>
             <a:graphic>
@@ -12246,7 +12121,7 @@
                         <a:blipFill>
                           <a:blip r:embed="rId3"/>
                           <a:stretch>
-                            <a:fillRect l="-83656" t="-283333" r="-860" b="-728333"/>
+                            <a:fillRect l="-83656" t="-283333" r="-860" b="-726667"/>
                           </a:stretch>
                         </a:blipFill>
                       </a:tcPr>
@@ -12295,7 +12170,7 @@
                         <a:blipFill>
                           <a:blip r:embed="rId3"/>
                           <a:stretch>
-                            <a:fillRect l="-83656" t="-383333" r="-860" b="-628333"/>
+                            <a:fillRect l="-83656" t="-383333" r="-860" b="-626667"/>
                           </a:stretch>
                         </a:blipFill>
                       </a:tcPr>
@@ -12602,7 +12477,7 @@
                         <a:blipFill>
                           <a:blip r:embed="rId3"/>
                           <a:stretch>
-                            <a:fillRect l="-83656" t="-985000" r="-860" b="-26667"/>
+                            <a:fillRect l="-83656" t="-985000" r="-860" b="-25000"/>
                           </a:stretch>
                         </a:blipFill>
                       </a:tcPr>
@@ -12619,6 +12494,91 @@
           </p:graphicFrame>
         </mc:Fallback>
       </mc:AlternateContent>
+      <p:sp>
+        <p:nvSpPr>
+          <p:cNvPr id="3" name="CasellaDiTesto 2">
+            <a:extLst>
+              <a:ext uri="{FF2B5EF4-FFF2-40B4-BE49-F238E27FC236}">
+                <a16:creationId xmlns:a16="http://schemas.microsoft.com/office/drawing/2014/main" id="{D35E51B5-772F-483E-A014-C73AFD16BEE7}"/>
+              </a:ext>
+            </a:extLst>
+          </p:cNvPr>
+          <p:cNvSpPr txBox="1"/>
+          <p:nvPr/>
+        </p:nvSpPr>
+        <p:spPr>
+          <a:xfrm>
+            <a:off x="34344" y="203853"/>
+            <a:ext cx="12192000" cy="954107"/>
+          </a:xfrm>
+          <a:prstGeom prst="rect">
+            <a:avLst/>
+          </a:prstGeom>
+          <a:noFill/>
+        </p:spPr>
+        <p:txBody>
+          <a:bodyPr wrap="square" rtlCol="0">
+            <a:spAutoFit/>
+          </a:bodyPr>
+          <a:lstStyle/>
+          <a:p>
+            <a:pPr algn="ctr"/>
+            <a:r>
+              <a:rPr lang="it-IT" sz="2800" dirty="0"/>
+              <a:t>Source: B. </a:t>
+            </a:r>
+            <a:r>
+              <a:rPr lang="it-IT" sz="2800" dirty="0" err="1"/>
+              <a:t>Radisavljevic</a:t>
+            </a:r>
+            <a:r>
+              <a:rPr lang="it-IT" sz="2800" dirty="0"/>
+              <a:t>, A. </a:t>
+            </a:r>
+            <a:r>
+              <a:rPr lang="it-IT" sz="2800" dirty="0" err="1"/>
+              <a:t>Radenovic</a:t>
+            </a:r>
+            <a:r>
+              <a:rPr lang="it-IT" sz="2800" dirty="0"/>
+              <a:t>, J. Brivio, V. Giacometti and A. </a:t>
+            </a:r>
+            <a:r>
+              <a:rPr lang="it-IT" sz="2800" dirty="0" err="1"/>
+              <a:t>Kis</a:t>
+            </a:r>
+            <a:r>
+              <a:rPr lang="it-IT" sz="2800" dirty="0"/>
+              <a:t>, </a:t>
+            </a:r>
+            <a:r>
+              <a:rPr lang="en-US" sz="2800" b="1" dirty="0"/>
+              <a:t>“</a:t>
+            </a:r>
+            <a:r>
+              <a:rPr lang="it-IT" sz="2800" b="1" dirty="0"/>
+              <a:t>Single-</a:t>
+            </a:r>
+            <a:r>
+              <a:rPr lang="it-IT" sz="2800" b="1" dirty="0" err="1"/>
+              <a:t>layer</a:t>
+            </a:r>
+            <a:r>
+              <a:rPr lang="it-IT" sz="2800" b="1" dirty="0"/>
+              <a:t> MoS2 </a:t>
+            </a:r>
+            <a:r>
+              <a:rPr lang="it-IT" sz="2800" b="1" dirty="0" err="1"/>
+              <a:t>transistors</a:t>
+            </a:r>
+            <a:r>
+              <a:rPr lang="en-US" sz="2800" b="1" dirty="0"/>
+              <a:t>”</a:t>
+            </a:r>
+            <a:endParaRPr lang="it-IT" sz="2800" b="1" dirty="0"/>
+          </a:p>
+        </p:txBody>
+      </p:sp>
     </p:spTree>
     <p:extLst>
       <p:ext uri="{BB962C8B-B14F-4D97-AF65-F5344CB8AC3E}">
@@ -12649,42 +12609,8 @@
           <a:chExt cx="0" cy="0"/>
         </a:xfrm>
       </p:grpSpPr>
-      <p:pic>
-        <p:nvPicPr>
-          <p:cNvPr id="8" name="Segnaposto contenuto 7">
-            <a:extLst>
-              <a:ext uri="{FF2B5EF4-FFF2-40B4-BE49-F238E27FC236}">
-                <a16:creationId xmlns:a16="http://schemas.microsoft.com/office/drawing/2014/main" id="{24A2864D-007A-4855-9783-1AA8550AB9AD}"/>
-              </a:ext>
-            </a:extLst>
-          </p:cNvPr>
-          <p:cNvPicPr>
-            <a:picLocks noGrp="1" noChangeAspect="1"/>
-          </p:cNvPicPr>
-          <p:nvPr>
-            <p:ph sz="half" idx="2"/>
-          </p:nvPr>
-        </p:nvPicPr>
-        <p:blipFill>
-          <a:blip r:embed="rId2">
-            <a:extLst>
-              <a:ext uri="{28A0092B-C50C-407E-A947-70E740481C1C}">
-                <a14:useLocalDpi xmlns:a14="http://schemas.microsoft.com/office/drawing/2010/main" val="0"/>
-              </a:ext>
-            </a:extLst>
-          </a:blip>
-          <a:srcRect/>
-          <a:stretch/>
-        </p:blipFill>
-        <p:spPr>
-          <a:xfrm>
-            <a:off x="6383630" y="2289789"/>
-            <a:ext cx="4978159" cy="4329842"/>
-          </a:xfrm>
-        </p:spPr>
-      </p:pic>
-      <mc:AlternateContent xmlns:mc="http://schemas.openxmlformats.org/markup-compatibility/2006">
-        <mc:Choice xmlns:a14="http://schemas.microsoft.com/office/drawing/2010/main" Requires="a14">
+      <mc:AlternateContent xmlns:mc="http://schemas.openxmlformats.org/markup-compatibility/2006" xmlns:a14="http://schemas.microsoft.com/office/drawing/2010/main">
+        <mc:Choice Requires="a14">
           <p:sp>
             <p:nvSpPr>
               <p:cNvPr id="5" name="CasellaDiTesto 4">
@@ -12715,7 +12641,7 @@
               <a:p>
                 <a:pPr algn="ctr"/>
                 <a:r>
-                  <a:rPr lang="en-US" sz="2800"/>
+                  <a:rPr lang="en-US" sz="2800" dirty="0" err="1"/>
                   <a:t>Backgate</a:t>
                 </a:r>
                 <a:r>
@@ -12856,14 +12782,14 @@
                 </a14:m>
                 <a:r>
                   <a:rPr lang="en-US" sz="2800" dirty="0"/>
-                  <a:t> values of 0, 1 and 5 V.</a:t>
+                  <a:t> values of 1 and 5 V.</a:t>
                 </a:r>
                 <a:endParaRPr lang="it-IT" sz="2800" dirty="0"/>
               </a:p>
             </p:txBody>
           </p:sp>
         </mc:Choice>
-        <mc:Fallback>
+        <mc:Fallback xmlns="">
           <p:sp>
             <p:nvSpPr>
               <p:cNvPr id="5" name="CasellaDiTesto 4">
@@ -12887,7 +12813,7 @@
                 <a:avLst/>
               </a:prstGeom>
               <a:blipFill>
-                <a:blip r:embed="rId3"/>
+                <a:blip r:embed="rId2"/>
                 <a:stretch>
                   <a:fillRect t="-5952" r="-550" b="-13095"/>
                 </a:stretch>
@@ -12910,30 +12836,34 @@
       </mc:AlternateContent>
       <p:pic>
         <p:nvPicPr>
-          <p:cNvPr id="12" name="Segnaposto contenuto 11">
+          <p:cNvPr id="3" name="Immagine 2" descr="Immagine che contiene mappa&#10;&#10;Descrizione generata automaticamente">
             <a:extLst>
               <a:ext uri="{FF2B5EF4-FFF2-40B4-BE49-F238E27FC236}">
-                <a16:creationId xmlns:a16="http://schemas.microsoft.com/office/drawing/2014/main" id="{C9CA988A-0EF8-4D03-90E6-F35D8933A79E}"/>
+                <a16:creationId xmlns:a16="http://schemas.microsoft.com/office/drawing/2014/main" id="{C2719DF2-7618-4DA6-9858-C0D938308CA5}"/>
               </a:ext>
             </a:extLst>
           </p:cNvPr>
           <p:cNvPicPr>
-            <a:picLocks noGrp="1" noChangeAspect="1"/>
+            <a:picLocks noChangeAspect="1"/>
           </p:cNvPicPr>
-          <p:nvPr>
-            <p:ph sz="half" idx="1"/>
-          </p:nvPr>
+          <p:nvPr/>
         </p:nvPicPr>
         <p:blipFill>
-          <a:blip r:embed="rId4"/>
+          <a:blip r:embed="rId3">
+            <a:extLst>
+              <a:ext uri="{28A0092B-C50C-407E-A947-70E740481C1C}">
+                <a14:useLocalDpi xmlns:a14="http://schemas.microsoft.com/office/drawing/2010/main" val="0"/>
+              </a:ext>
+            </a:extLst>
+          </a:blip>
           <a:stretch>
             <a:fillRect/>
           </a:stretch>
         </p:blipFill>
         <p:spPr>
           <a:xfrm>
-            <a:off x="720644" y="1926664"/>
-            <a:ext cx="4978159" cy="3984811"/>
+            <a:off x="2289573" y="1150535"/>
+            <a:ext cx="7612854" cy="5707465"/>
           </a:xfrm>
           <a:prstGeom prst="rect">
             <a:avLst/>

</xml_diff>

<commit_message>
update Id(Vtg) varying Vds
</commit_message>
<xml_diff>
--- a/Presentazione COMSOL.pptx
+++ b/Presentazione COMSOL.pptx
@@ -3833,8 +3833,8 @@
           <a:chExt cx="0" cy="0"/>
         </a:xfrm>
       </p:grpSpPr>
-      <mc:AlternateContent xmlns:mc="http://schemas.openxmlformats.org/markup-compatibility/2006">
-        <mc:Choice xmlns:a14="http://schemas.microsoft.com/office/drawing/2010/main" Requires="a14">
+      <mc:AlternateContent xmlns:mc="http://schemas.openxmlformats.org/markup-compatibility/2006" xmlns:a14="http://schemas.microsoft.com/office/drawing/2010/main">
+        <mc:Choice Requires="a14">
           <p:sp>
             <p:nvSpPr>
               <p:cNvPr id="9" name="CasellaDiTesto 8">
@@ -3944,7 +3944,7 @@
             </p:txBody>
           </p:sp>
         </mc:Choice>
-        <mc:Fallback>
+        <mc:Fallback xmlns="">
           <p:sp>
             <p:nvSpPr>
               <p:cNvPr id="9" name="CasellaDiTesto 8">
@@ -3991,10 +3991,10 @@
       </mc:AlternateContent>
       <p:pic>
         <p:nvPicPr>
-          <p:cNvPr id="4" name="Immagine 3" descr="Immagine che contiene mappa, testo&#10;&#10;Descrizione generata automaticamente">
+          <p:cNvPr id="3" name="Immagine 2" descr="Immagine che contiene testo, mappa&#10;&#10;Descrizione generata automaticamente">
             <a:extLst>
               <a:ext uri="{FF2B5EF4-FFF2-40B4-BE49-F238E27FC236}">
-                <a16:creationId xmlns:a16="http://schemas.microsoft.com/office/drawing/2014/main" id="{D7B2B01E-23EF-4881-860A-663AFD5B45C6}"/>
+                <a16:creationId xmlns:a16="http://schemas.microsoft.com/office/drawing/2014/main" id="{B6DA269C-99F5-497F-A36B-BF4A5C437AB5}"/>
               </a:ext>
             </a:extLst>
           </p:cNvPr>
@@ -4017,8 +4017,8 @@
         </p:blipFill>
         <p:spPr>
           <a:xfrm>
-            <a:off x="2357230" y="1242324"/>
-            <a:ext cx="7477539" cy="5606017"/>
+            <a:off x="2350789" y="1242324"/>
+            <a:ext cx="7490422" cy="5615676"/>
           </a:xfrm>
           <a:prstGeom prst="rect">
             <a:avLst/>
@@ -4055,8 +4055,8 @@
           <a:chExt cx="0" cy="0"/>
         </a:xfrm>
       </p:grpSpPr>
-      <mc:AlternateContent xmlns:mc="http://schemas.openxmlformats.org/markup-compatibility/2006">
-        <mc:Choice xmlns:a14="http://schemas.microsoft.com/office/drawing/2010/main" Requires="a14">
+      <mc:AlternateContent xmlns:mc="http://schemas.openxmlformats.org/markup-compatibility/2006" xmlns:a14="http://schemas.microsoft.com/office/drawing/2010/main">
+        <mc:Choice Requires="a14">
           <p:sp>
             <p:nvSpPr>
               <p:cNvPr id="8" name="CasellaDiTesto 7">
@@ -4263,7 +4263,7 @@
             </p:txBody>
           </p:sp>
         </mc:Choice>
-        <mc:Fallback>
+        <mc:Fallback xmlns="">
           <p:sp>
             <p:nvSpPr>
               <p:cNvPr id="8" name="CasellaDiTesto 7">
@@ -4374,8 +4374,8 @@
           <a:chExt cx="0" cy="0"/>
         </a:xfrm>
       </p:grpSpPr>
-      <mc:AlternateContent xmlns:mc="http://schemas.openxmlformats.org/markup-compatibility/2006">
-        <mc:Choice xmlns:a14="http://schemas.microsoft.com/office/drawing/2010/main" Requires="a14">
+      <mc:AlternateContent xmlns:mc="http://schemas.openxmlformats.org/markup-compatibility/2006" xmlns:a14="http://schemas.microsoft.com/office/drawing/2010/main">
+        <mc:Choice Requires="a14">
           <p:sp>
             <p:nvSpPr>
               <p:cNvPr id="8" name="CasellaDiTesto 7">
@@ -4518,7 +4518,7 @@
             </p:txBody>
           </p:sp>
         </mc:Choice>
-        <mc:Fallback>
+        <mc:Fallback xmlns="">
           <p:sp>
             <p:nvSpPr>
               <p:cNvPr id="8" name="CasellaDiTesto 7">
@@ -9411,8 +9411,8 @@
           <a:chExt cx="0" cy="0"/>
         </a:xfrm>
       </p:grpSpPr>
-      <mc:AlternateContent xmlns:mc="http://schemas.openxmlformats.org/markup-compatibility/2006">
-        <mc:Choice xmlns:a14="http://schemas.microsoft.com/office/drawing/2010/main" Requires="a14">
+      <mc:AlternateContent xmlns:mc="http://schemas.openxmlformats.org/markup-compatibility/2006" xmlns:a14="http://schemas.microsoft.com/office/drawing/2010/main">
+        <mc:Choice Requires="a14">
           <p:graphicFrame>
             <p:nvGraphicFramePr>
               <p:cNvPr id="2" name="Tabella 2">
@@ -10394,7 +10394,7 @@
             </a:graphic>
           </p:graphicFrame>
         </mc:Choice>
-        <mc:Fallback>
+        <mc:Fallback xmlns="">
           <p:graphicFrame>
             <p:nvGraphicFramePr>
               <p:cNvPr id="2" name="Tabella 2">

</xml_diff>